<commit_message>
Added LATEX file for paper. Also continued work on presentation
</commit_message>
<xml_diff>
--- a/Final-Presentation/Presentation.pptx
+++ b/Final-Presentation/Presentation.pptx
@@ -2,10 +2,20 @@
 <file path=ppt/presentation.xml><?xml version="1.0" encoding="utf-8"?>
 <p:presentation xmlns:a="http://schemas.openxmlformats.org/drawingml/2006/main" xmlns:r="http://schemas.openxmlformats.org/officeDocument/2006/relationships" xmlns:p="http://schemas.openxmlformats.org/presentationml/2006/main" saveSubsetFonts="1">
   <p:sldMasterIdLst>
-    <p:sldMasterId id="2147483648" r:id="rId1"/>
+    <p:sldMasterId id="2147483696" r:id="rId1"/>
   </p:sldMasterIdLst>
   <p:sldIdLst>
     <p:sldId id="256" r:id="rId2"/>
+    <p:sldId id="258" r:id="rId3"/>
+    <p:sldId id="266" r:id="rId4"/>
+    <p:sldId id="260" r:id="rId5"/>
+    <p:sldId id="264" r:id="rId6"/>
+    <p:sldId id="262" r:id="rId7"/>
+    <p:sldId id="263" r:id="rId8"/>
+    <p:sldId id="257" r:id="rId9"/>
+    <p:sldId id="259" r:id="rId10"/>
+    <p:sldId id="261" r:id="rId11"/>
+    <p:sldId id="265" r:id="rId12"/>
   </p:sldIdLst>
   <p:sldSz cx="12192000" cy="6858000"/>
   <p:notesSz cx="6858000" cy="9144000"/>
@@ -13,7 +23,7 @@
     <a:defPPr>
       <a:defRPr lang="en-US"/>
     </a:defPPr>
-    <a:lvl1pPr marL="0" algn="l" defTabSz="914400" rtl="0" eaLnBrk="1" latinLnBrk="0" hangingPunct="1">
+    <a:lvl1pPr marL="0" algn="l" defTabSz="457200" rtl="0" eaLnBrk="1" latinLnBrk="0" hangingPunct="1">
       <a:defRPr sz="1800" kern="1200">
         <a:solidFill>
           <a:schemeClr val="tx1"/>
@@ -23,7 +33,7 @@
         <a:cs typeface="+mn-cs"/>
       </a:defRPr>
     </a:lvl1pPr>
-    <a:lvl2pPr marL="457200" algn="l" defTabSz="914400" rtl="0" eaLnBrk="1" latinLnBrk="0" hangingPunct="1">
+    <a:lvl2pPr marL="457200" algn="l" defTabSz="457200" rtl="0" eaLnBrk="1" latinLnBrk="0" hangingPunct="1">
       <a:defRPr sz="1800" kern="1200">
         <a:solidFill>
           <a:schemeClr val="tx1"/>
@@ -33,7 +43,7 @@
         <a:cs typeface="+mn-cs"/>
       </a:defRPr>
     </a:lvl2pPr>
-    <a:lvl3pPr marL="914400" algn="l" defTabSz="914400" rtl="0" eaLnBrk="1" latinLnBrk="0" hangingPunct="1">
+    <a:lvl3pPr marL="914400" algn="l" defTabSz="457200" rtl="0" eaLnBrk="1" latinLnBrk="0" hangingPunct="1">
       <a:defRPr sz="1800" kern="1200">
         <a:solidFill>
           <a:schemeClr val="tx1"/>
@@ -43,7 +53,7 @@
         <a:cs typeface="+mn-cs"/>
       </a:defRPr>
     </a:lvl3pPr>
-    <a:lvl4pPr marL="1371600" algn="l" defTabSz="914400" rtl="0" eaLnBrk="1" latinLnBrk="0" hangingPunct="1">
+    <a:lvl4pPr marL="1371600" algn="l" defTabSz="457200" rtl="0" eaLnBrk="1" latinLnBrk="0" hangingPunct="1">
       <a:defRPr sz="1800" kern="1200">
         <a:solidFill>
           <a:schemeClr val="tx1"/>
@@ -53,7 +63,7 @@
         <a:cs typeface="+mn-cs"/>
       </a:defRPr>
     </a:lvl4pPr>
-    <a:lvl5pPr marL="1828800" algn="l" defTabSz="914400" rtl="0" eaLnBrk="1" latinLnBrk="0" hangingPunct="1">
+    <a:lvl5pPr marL="1828800" algn="l" defTabSz="457200" rtl="0" eaLnBrk="1" latinLnBrk="0" hangingPunct="1">
       <a:defRPr sz="1800" kern="1200">
         <a:solidFill>
           <a:schemeClr val="tx1"/>
@@ -63,7 +73,7 @@
         <a:cs typeface="+mn-cs"/>
       </a:defRPr>
     </a:lvl5pPr>
-    <a:lvl6pPr marL="2286000" algn="l" defTabSz="914400" rtl="0" eaLnBrk="1" latinLnBrk="0" hangingPunct="1">
+    <a:lvl6pPr marL="2286000" algn="l" defTabSz="457200" rtl="0" eaLnBrk="1" latinLnBrk="0" hangingPunct="1">
       <a:defRPr sz="1800" kern="1200">
         <a:solidFill>
           <a:schemeClr val="tx1"/>
@@ -73,7 +83,7 @@
         <a:cs typeface="+mn-cs"/>
       </a:defRPr>
     </a:lvl6pPr>
-    <a:lvl7pPr marL="2743200" algn="l" defTabSz="914400" rtl="0" eaLnBrk="1" latinLnBrk="0" hangingPunct="1">
+    <a:lvl7pPr marL="2743200" algn="l" defTabSz="457200" rtl="0" eaLnBrk="1" latinLnBrk="0" hangingPunct="1">
       <a:defRPr sz="1800" kern="1200">
         <a:solidFill>
           <a:schemeClr val="tx1"/>
@@ -83,7 +93,7 @@
         <a:cs typeface="+mn-cs"/>
       </a:defRPr>
     </a:lvl7pPr>
-    <a:lvl8pPr marL="3200400" algn="l" defTabSz="914400" rtl="0" eaLnBrk="1" latinLnBrk="0" hangingPunct="1">
+    <a:lvl8pPr marL="3200400" algn="l" defTabSz="457200" rtl="0" eaLnBrk="1" latinLnBrk="0" hangingPunct="1">
       <a:defRPr sz="1800" kern="1200">
         <a:solidFill>
           <a:schemeClr val="tx1"/>
@@ -93,7 +103,7 @@
         <a:cs typeface="+mn-cs"/>
       </a:defRPr>
     </a:lvl8pPr>
-    <a:lvl9pPr marL="3657600" algn="l" defTabSz="914400" rtl="0" eaLnBrk="1" latinLnBrk="0" hangingPunct="1">
+    <a:lvl9pPr marL="3657600" algn="l" defTabSz="457200" rtl="0" eaLnBrk="1" latinLnBrk="0" hangingPunct="1">
       <a:defRPr sz="1800" kern="1200">
         <a:solidFill>
           <a:schemeClr val="tx1"/>
@@ -104,11 +114,40 @@
       </a:defRPr>
     </a:lvl9pPr>
   </p:defaultTextStyle>
+  <p:extLst>
+    <p:ext uri="{521415D9-36F7-43E2-AB2F-B90AF26B5E84}">
+      <p14:sectionLst xmlns:p14="http://schemas.microsoft.com/office/powerpoint/2010/main">
+        <p14:section name="Default Section" id="{593A3DF0-34A1-455D-8943-26FA71ED3DCC}">
+          <p14:sldIdLst>
+            <p14:sldId id="256"/>
+          </p14:sldIdLst>
+        </p14:section>
+        <p14:section name="Introduction" id="{B02D16C7-6FD9-4FF5-9199-179129663227}">
+          <p14:sldIdLst>
+            <p14:sldId id="258"/>
+            <p14:sldId id="266"/>
+            <p14:sldId id="260"/>
+            <p14:sldId id="264"/>
+          </p14:sldIdLst>
+        </p14:section>
+        <p14:section name="Implementation" id="{04ADD487-94DA-47EC-AF72-3116CF1CA6D9}">
+          <p14:sldIdLst>
+            <p14:sldId id="262"/>
+            <p14:sldId id="263"/>
+            <p14:sldId id="257"/>
+            <p14:sldId id="259"/>
+            <p14:sldId id="261"/>
+            <p14:sldId id="265"/>
+          </p14:sldIdLst>
+        </p14:section>
+      </p14:sectionLst>
+    </p:ext>
+  </p:extLst>
 </p:presentation>
 </file>
 
 <file path=ppt/slideLayouts/slideLayout1.xml><?xml version="1.0" encoding="utf-8"?>
-<p:sldLayout xmlns:a="http://schemas.openxmlformats.org/drawingml/2006/main" xmlns:r="http://schemas.openxmlformats.org/officeDocument/2006/relationships" xmlns:p="http://schemas.openxmlformats.org/presentationml/2006/main" type="title" preserve="1">
+<p:sldLayout xmlns:a="http://schemas.openxmlformats.org/drawingml/2006/main" xmlns:r="http://schemas.openxmlformats.org/officeDocument/2006/relationships" xmlns:p="http://schemas.openxmlformats.org/presentationml/2006/main" showMasterSp="0" type="title" preserve="1">
   <p:cSld name="Title Slide">
     <p:spTree>
       <p:nvGrpSpPr>
@@ -126,6 +165,82 @@
       </p:grpSpPr>
       <p:sp>
         <p:nvSpPr>
+          <p:cNvPr id="7" name="Rectangle 6"/>
+          <p:cNvSpPr/>
+          <p:nvPr/>
+        </p:nvSpPr>
+        <p:spPr>
+          <a:xfrm>
+            <a:off x="15" y="6400800"/>
+            <a:ext cx="12191985" cy="457200"/>
+          </a:xfrm>
+          <a:prstGeom prst="rect">
+            <a:avLst/>
+          </a:prstGeom>
+          <a:solidFill>
+            <a:schemeClr val="accent2"/>
+          </a:solidFill>
+          <a:ln>
+            <a:noFill/>
+          </a:ln>
+        </p:spPr>
+        <p:style>
+          <a:lnRef idx="2">
+            <a:schemeClr val="accent1">
+              <a:shade val="50000"/>
+            </a:schemeClr>
+          </a:lnRef>
+          <a:fillRef idx="1">
+            <a:schemeClr val="accent1"/>
+          </a:fillRef>
+          <a:effectRef idx="0">
+            <a:schemeClr val="accent1"/>
+          </a:effectRef>
+          <a:fontRef idx="minor">
+            <a:schemeClr val="lt1"/>
+          </a:fontRef>
+        </p:style>
+      </p:sp>
+      <p:sp>
+        <p:nvSpPr>
+          <p:cNvPr id="8" name="Rectangle 7"/>
+          <p:cNvSpPr/>
+          <p:nvPr/>
+        </p:nvSpPr>
+        <p:spPr>
+          <a:xfrm>
+            <a:off x="15" y="6334316"/>
+            <a:ext cx="12188825" cy="64008"/>
+          </a:xfrm>
+          <a:prstGeom prst="rect">
+            <a:avLst/>
+          </a:prstGeom>
+          <a:solidFill>
+            <a:schemeClr val="accent1"/>
+          </a:solidFill>
+          <a:ln>
+            <a:noFill/>
+          </a:ln>
+        </p:spPr>
+        <p:style>
+          <a:lnRef idx="2">
+            <a:schemeClr val="accent1">
+              <a:shade val="50000"/>
+            </a:schemeClr>
+          </a:lnRef>
+          <a:fillRef idx="1">
+            <a:schemeClr val="accent1"/>
+          </a:fillRef>
+          <a:effectRef idx="0">
+            <a:schemeClr val="accent1"/>
+          </a:effectRef>
+          <a:fontRef idx="minor">
+            <a:schemeClr val="lt1"/>
+          </a:fontRef>
+        </p:style>
+      </p:sp>
+      <p:sp>
+        <p:nvSpPr>
           <p:cNvPr id="2" name="Title 1"/>
           <p:cNvSpPr>
             <a:spLocks noGrp="1"/>
@@ -136,23 +251,34 @@
         </p:nvSpPr>
         <p:spPr>
           <a:xfrm>
-            <a:off x="1524000" y="1122363"/>
-            <a:ext cx="9144000" cy="2387600"/>
-          </a:xfrm>
-        </p:spPr>
-        <p:txBody>
-          <a:bodyPr anchor="b"/>
+            <a:off x="1097280" y="1347018"/>
+            <a:ext cx="10058400" cy="1651819"/>
+          </a:xfrm>
+        </p:spPr>
+        <p:txBody>
+          <a:bodyPr anchor="b">
+            <a:normAutofit/>
+          </a:bodyPr>
           <a:lstStyle>
             <a:lvl1pPr algn="ctr">
-              <a:defRPr sz="6000"/>
+              <a:lnSpc>
+                <a:spcPct val="85000"/>
+              </a:lnSpc>
+              <a:defRPr sz="6000" spc="-50" baseline="0">
+                <a:solidFill>
+                  <a:schemeClr val="tx1">
+                    <a:lumMod val="85000"/>
+                    <a:lumOff val="15000"/>
+                  </a:schemeClr>
+                </a:solidFill>
+              </a:defRPr>
             </a:lvl1pPr>
           </a:lstStyle>
           <a:p>
             <a:r>
-              <a:rPr lang="en-US"/>
+              <a:rPr lang="en-US" dirty="0"/>
               <a:t>Click to edit Master title style</a:t>
             </a:r>
-            <a:endParaRPr lang="en-US"/>
           </a:p>
         </p:txBody>
       </p:sp>
@@ -168,56 +294,62 @@
         </p:nvSpPr>
         <p:spPr>
           <a:xfrm>
-            <a:off x="1524000" y="3602038"/>
-            <a:ext cx="9144000" cy="1655762"/>
-          </a:xfrm>
-        </p:spPr>
-        <p:txBody>
-          <a:bodyPr/>
+            <a:off x="1065227" y="3964008"/>
+            <a:ext cx="10058400" cy="1143000"/>
+          </a:xfrm>
+        </p:spPr>
+        <p:txBody>
+          <a:bodyPr lIns="91440" rIns="91440">
+            <a:normAutofit/>
+          </a:bodyPr>
           <a:lstStyle>
             <a:lvl1pPr marL="0" indent="0" algn="ctr">
               <a:buNone/>
-              <a:defRPr sz="2400"/>
+              <a:defRPr sz="2400" cap="none" spc="200" baseline="0">
+                <a:solidFill>
+                  <a:schemeClr val="tx2"/>
+                </a:solidFill>
+                <a:latin typeface="+mj-lt"/>
+              </a:defRPr>
             </a:lvl1pPr>
             <a:lvl2pPr marL="457200" indent="0" algn="ctr">
               <a:buNone/>
-              <a:defRPr sz="2000"/>
+              <a:defRPr sz="2400"/>
             </a:lvl2pPr>
             <a:lvl3pPr marL="914400" indent="0" algn="ctr">
               <a:buNone/>
-              <a:defRPr sz="1800"/>
+              <a:defRPr sz="2400"/>
             </a:lvl3pPr>
             <a:lvl4pPr marL="1371600" indent="0" algn="ctr">
               <a:buNone/>
-              <a:defRPr sz="1600"/>
+              <a:defRPr sz="2000"/>
             </a:lvl4pPr>
             <a:lvl5pPr marL="1828800" indent="0" algn="ctr">
               <a:buNone/>
-              <a:defRPr sz="1600"/>
+              <a:defRPr sz="2000"/>
             </a:lvl5pPr>
             <a:lvl6pPr marL="2286000" indent="0" algn="ctr">
               <a:buNone/>
-              <a:defRPr sz="1600"/>
+              <a:defRPr sz="2000"/>
             </a:lvl6pPr>
             <a:lvl7pPr marL="2743200" indent="0" algn="ctr">
               <a:buNone/>
-              <a:defRPr sz="1600"/>
+              <a:defRPr sz="2000"/>
             </a:lvl7pPr>
             <a:lvl8pPr marL="3200400" indent="0" algn="ctr">
               <a:buNone/>
-              <a:defRPr sz="1600"/>
+              <a:defRPr sz="2000"/>
             </a:lvl8pPr>
             <a:lvl9pPr marL="3657600" indent="0" algn="ctr">
               <a:buNone/>
-              <a:defRPr sz="1600"/>
+              <a:defRPr sz="2000"/>
             </a:lvl9pPr>
           </a:lstStyle>
           <a:p>
             <a:r>
-              <a:rPr lang="en-US"/>
+              <a:rPr lang="en-US" dirty="0"/>
               <a:t>Click to edit Master subtitle style</a:t>
             </a:r>
-            <a:endParaRPr lang="en-US"/>
           </a:p>
         </p:txBody>
       </p:sp>
@@ -257,9 +389,13 @@
         <p:spPr/>
         <p:txBody>
           <a:bodyPr/>
-          <a:lstStyle/>
-          <a:p>
-            <a:endParaRPr lang="en-US"/>
+          <a:lstStyle>
+            <a:lvl1pPr>
+              <a:defRPr cap="none" baseline="0"/>
+            </a:lvl1pPr>
+          </a:lstStyle>
+          <a:p>
+            <a:endParaRPr lang="en-US" dirty="0"/>
           </a:p>
         </p:txBody>
       </p:sp>
@@ -289,7 +425,7 @@
     </p:spTree>
     <p:extLst>
       <p:ext uri="{BB962C8B-B14F-4D97-AF65-F5344CB8AC3E}">
-        <p14:creationId xmlns:p14="http://schemas.microsoft.com/office/powerpoint/2010/main" val="2809491671"/>
+        <p14:creationId xmlns:p14="http://schemas.microsoft.com/office/powerpoint/2010/main" val="239011070"/>
       </p:ext>
     </p:extLst>
   </p:cSld>
@@ -335,7 +471,7 @@
               <a:rPr lang="en-US"/>
               <a:t>Click to edit Master title style</a:t>
             </a:r>
-            <a:endParaRPr lang="en-US"/>
+            <a:endParaRPr lang="en-US" dirty="0"/>
           </a:p>
         </p:txBody>
       </p:sp>
@@ -351,7 +487,7 @@
         </p:nvSpPr>
         <p:spPr/>
         <p:txBody>
-          <a:bodyPr vert="eaVert"/>
+          <a:bodyPr vert="eaVert" lIns="45720" tIns="0" rIns="45720" bIns="0"/>
           <a:lstStyle/>
           <a:p>
             <a:pPr lvl="0"/>
@@ -387,7 +523,7 @@
               <a:rPr lang="en-US"/>
               <a:t>Fifth level</a:t>
             </a:r>
-            <a:endParaRPr lang="en-US"/>
+            <a:endParaRPr lang="en-US" dirty="0"/>
           </a:p>
         </p:txBody>
       </p:sp>
@@ -459,7 +595,7 @@
     </p:spTree>
     <p:extLst>
       <p:ext uri="{BB962C8B-B14F-4D97-AF65-F5344CB8AC3E}">
-        <p14:creationId xmlns:p14="http://schemas.microsoft.com/office/powerpoint/2010/main" val="2555816712"/>
+        <p14:creationId xmlns:p14="http://schemas.microsoft.com/office/powerpoint/2010/main" val="2137827176"/>
       </p:ext>
     </p:extLst>
   </p:cSld>
@@ -470,7 +606,7 @@
 </file>
 
 <file path=ppt/slideLayouts/slideLayout11.xml><?xml version="1.0" encoding="utf-8"?>
-<p:sldLayout xmlns:a="http://schemas.openxmlformats.org/drawingml/2006/main" xmlns:r="http://schemas.openxmlformats.org/officeDocument/2006/relationships" xmlns:p="http://schemas.openxmlformats.org/presentationml/2006/main" type="vertTitleAndTx" preserve="1">
+<p:sldLayout xmlns:a="http://schemas.openxmlformats.org/drawingml/2006/main" xmlns:r="http://schemas.openxmlformats.org/officeDocument/2006/relationships" xmlns:p="http://schemas.openxmlformats.org/presentationml/2006/main" showMasterSp="0" type="vertTitleAndTx" preserve="1">
   <p:cSld name="Vertical Title and Text">
     <p:spTree>
       <p:nvGrpSpPr>
@@ -488,6 +624,82 @@
       </p:grpSpPr>
       <p:sp>
         <p:nvSpPr>
+          <p:cNvPr id="7" name="Rectangle 6"/>
+          <p:cNvSpPr/>
+          <p:nvPr/>
+        </p:nvSpPr>
+        <p:spPr>
+          <a:xfrm>
+            <a:off x="3175" y="6400800"/>
+            <a:ext cx="12188825" cy="457200"/>
+          </a:xfrm>
+          <a:prstGeom prst="rect">
+            <a:avLst/>
+          </a:prstGeom>
+          <a:solidFill>
+            <a:schemeClr val="accent2"/>
+          </a:solidFill>
+          <a:ln>
+            <a:noFill/>
+          </a:ln>
+        </p:spPr>
+        <p:style>
+          <a:lnRef idx="2">
+            <a:schemeClr val="accent1">
+              <a:shade val="50000"/>
+            </a:schemeClr>
+          </a:lnRef>
+          <a:fillRef idx="1">
+            <a:schemeClr val="accent1"/>
+          </a:fillRef>
+          <a:effectRef idx="0">
+            <a:schemeClr val="accent1"/>
+          </a:effectRef>
+          <a:fontRef idx="minor">
+            <a:schemeClr val="lt1"/>
+          </a:fontRef>
+        </p:style>
+      </p:sp>
+      <p:sp>
+        <p:nvSpPr>
+          <p:cNvPr id="8" name="Rectangle 7"/>
+          <p:cNvSpPr/>
+          <p:nvPr/>
+        </p:nvSpPr>
+        <p:spPr>
+          <a:xfrm>
+            <a:off x="15" y="6334316"/>
+            <a:ext cx="12188825" cy="64008"/>
+          </a:xfrm>
+          <a:prstGeom prst="rect">
+            <a:avLst/>
+          </a:prstGeom>
+          <a:solidFill>
+            <a:schemeClr val="accent1"/>
+          </a:solidFill>
+          <a:ln>
+            <a:noFill/>
+          </a:ln>
+        </p:spPr>
+        <p:style>
+          <a:lnRef idx="2">
+            <a:schemeClr val="accent1">
+              <a:shade val="50000"/>
+            </a:schemeClr>
+          </a:lnRef>
+          <a:fillRef idx="1">
+            <a:schemeClr val="accent1"/>
+          </a:fillRef>
+          <a:effectRef idx="0">
+            <a:schemeClr val="accent1"/>
+          </a:effectRef>
+          <a:fontRef idx="minor">
+            <a:schemeClr val="lt1"/>
+          </a:fontRef>
+        </p:style>
+      </p:sp>
+      <p:sp>
+        <p:nvSpPr>
           <p:cNvPr id="2" name="Vertical Title 1"/>
           <p:cNvSpPr>
             <a:spLocks noGrp="1"/>
@@ -498,8 +710,8 @@
         </p:nvSpPr>
         <p:spPr>
           <a:xfrm>
-            <a:off x="8724900" y="365125"/>
-            <a:ext cx="2628900" cy="5811838"/>
+            <a:off x="8724900" y="414778"/>
+            <a:ext cx="2628900" cy="5757421"/>
           </a:xfrm>
         </p:spPr>
         <p:txBody>
@@ -510,7 +722,7 @@
               <a:rPr lang="en-US"/>
               <a:t>Click to edit Master title style</a:t>
             </a:r>
-            <a:endParaRPr lang="en-US"/>
+            <a:endParaRPr lang="en-US" dirty="0"/>
           </a:p>
         </p:txBody>
       </p:sp>
@@ -526,12 +738,12 @@
         </p:nvSpPr>
         <p:spPr>
           <a:xfrm>
-            <a:off x="838200" y="365125"/>
-            <a:ext cx="7734300" cy="5811838"/>
-          </a:xfrm>
-        </p:spPr>
-        <p:txBody>
-          <a:bodyPr vert="eaVert"/>
+            <a:off x="838200" y="414778"/>
+            <a:ext cx="7734300" cy="5757422"/>
+          </a:xfrm>
+        </p:spPr>
+        <p:txBody>
+          <a:bodyPr vert="eaVert" lIns="45720" tIns="0" rIns="45720" bIns="0"/>
           <a:lstStyle/>
           <a:p>
             <a:pPr lvl="0"/>
@@ -567,7 +779,7 @@
               <a:rPr lang="en-US"/>
               <a:t>Fifth level</a:t>
             </a:r>
-            <a:endParaRPr lang="en-US"/>
+            <a:endParaRPr lang="en-US" dirty="0"/>
           </a:p>
         </p:txBody>
       </p:sp>
@@ -639,7 +851,7 @@
     </p:spTree>
     <p:extLst>
       <p:ext uri="{BB962C8B-B14F-4D97-AF65-F5344CB8AC3E}">
-        <p14:creationId xmlns:p14="http://schemas.microsoft.com/office/powerpoint/2010/main" val="3272617633"/>
+        <p14:creationId xmlns:p14="http://schemas.microsoft.com/office/powerpoint/2010/main" val="1768660862"/>
       </p:ext>
     </p:extLst>
   </p:cSld>
@@ -679,13 +891,17 @@
         <p:spPr/>
         <p:txBody>
           <a:bodyPr/>
-          <a:lstStyle/>
+          <a:lstStyle>
+            <a:lvl1pPr marL="0">
+              <a:defRPr/>
+            </a:lvl1pPr>
+          </a:lstStyle>
           <a:p>
             <a:r>
               <a:rPr lang="en-US"/>
               <a:t>Click to edit Master title style</a:t>
             </a:r>
-            <a:endParaRPr lang="en-US"/>
+            <a:endParaRPr lang="en-US" dirty="0"/>
           </a:p>
         </p:txBody>
       </p:sp>
@@ -702,42 +918,45 @@
         <p:spPr/>
         <p:txBody>
           <a:bodyPr/>
-          <a:lstStyle/>
+          <a:lstStyle>
+            <a:lvl1pPr marL="285750" indent="-227013">
+              <a:defRPr/>
+            </a:lvl1pPr>
+          </a:lstStyle>
           <a:p>
             <a:pPr lvl="0"/>
             <a:r>
-              <a:rPr lang="en-US"/>
+              <a:rPr lang="en-US" dirty="0"/>
               <a:t>Edit Master text styles</a:t>
             </a:r>
           </a:p>
           <a:p>
             <a:pPr lvl="1"/>
             <a:r>
-              <a:rPr lang="en-US"/>
+              <a:rPr lang="en-US" dirty="0"/>
               <a:t>Second level</a:t>
             </a:r>
           </a:p>
           <a:p>
             <a:pPr lvl="2"/>
             <a:r>
-              <a:rPr lang="en-US"/>
+              <a:rPr lang="en-US" dirty="0"/>
               <a:t>Third level</a:t>
             </a:r>
           </a:p>
           <a:p>
             <a:pPr lvl="3"/>
             <a:r>
-              <a:rPr lang="en-US"/>
+              <a:rPr lang="en-US" dirty="0"/>
               <a:t>Fourth level</a:t>
             </a:r>
           </a:p>
           <a:p>
             <a:pPr lvl="4"/>
             <a:r>
-              <a:rPr lang="en-US"/>
+              <a:rPr lang="en-US" dirty="0"/>
               <a:t>Fifth level</a:t>
             </a:r>
-            <a:endParaRPr lang="en-US"/>
           </a:p>
         </p:txBody>
       </p:sp>
@@ -809,7 +1028,7 @@
     </p:spTree>
     <p:extLst>
       <p:ext uri="{BB962C8B-B14F-4D97-AF65-F5344CB8AC3E}">
-        <p14:creationId xmlns:p14="http://schemas.microsoft.com/office/powerpoint/2010/main" val="1903535020"/>
+        <p14:creationId xmlns:p14="http://schemas.microsoft.com/office/powerpoint/2010/main" val="2712330962"/>
       </p:ext>
     </p:extLst>
   </p:cSld>
@@ -820,8 +1039,16 @@
 </file>
 
 <file path=ppt/slideLayouts/slideLayout3.xml><?xml version="1.0" encoding="utf-8"?>
-<p:sldLayout xmlns:a="http://schemas.openxmlformats.org/drawingml/2006/main" xmlns:r="http://schemas.openxmlformats.org/officeDocument/2006/relationships" xmlns:p="http://schemas.openxmlformats.org/presentationml/2006/main" type="secHead" preserve="1">
+<p:sldLayout xmlns:a="http://schemas.openxmlformats.org/drawingml/2006/main" xmlns:r="http://schemas.openxmlformats.org/officeDocument/2006/relationships" xmlns:p="http://schemas.openxmlformats.org/presentationml/2006/main" showMasterSp="0" type="secHead" preserve="1">
   <p:cSld name="Section Header">
+    <p:bg>
+      <p:bgPr>
+        <a:solidFill>
+          <a:schemeClr val="bg1"/>
+        </a:solidFill>
+        <a:effectLst/>
+      </p:bgPr>
+    </p:bg>
     <p:spTree>
       <p:nvGrpSpPr>
         <p:cNvPr id="1" name=""/>
@@ -838,6 +1065,82 @@
       </p:grpSpPr>
       <p:sp>
         <p:nvSpPr>
+          <p:cNvPr id="7" name="Rectangle 6"/>
+          <p:cNvSpPr/>
+          <p:nvPr/>
+        </p:nvSpPr>
+        <p:spPr>
+          <a:xfrm>
+            <a:off x="3175" y="6400800"/>
+            <a:ext cx="12188825" cy="457200"/>
+          </a:xfrm>
+          <a:prstGeom prst="rect">
+            <a:avLst/>
+          </a:prstGeom>
+          <a:solidFill>
+            <a:schemeClr val="accent2"/>
+          </a:solidFill>
+          <a:ln>
+            <a:noFill/>
+          </a:ln>
+        </p:spPr>
+        <p:style>
+          <a:lnRef idx="2">
+            <a:schemeClr val="accent1">
+              <a:shade val="50000"/>
+            </a:schemeClr>
+          </a:lnRef>
+          <a:fillRef idx="1">
+            <a:schemeClr val="accent1"/>
+          </a:fillRef>
+          <a:effectRef idx="0">
+            <a:schemeClr val="accent1"/>
+          </a:effectRef>
+          <a:fontRef idx="minor">
+            <a:schemeClr val="lt1"/>
+          </a:fontRef>
+        </p:style>
+      </p:sp>
+      <p:sp>
+        <p:nvSpPr>
+          <p:cNvPr id="8" name="Rectangle 7"/>
+          <p:cNvSpPr/>
+          <p:nvPr/>
+        </p:nvSpPr>
+        <p:spPr>
+          <a:xfrm>
+            <a:off x="15" y="6334316"/>
+            <a:ext cx="12188825" cy="64008"/>
+          </a:xfrm>
+          <a:prstGeom prst="rect">
+            <a:avLst/>
+          </a:prstGeom>
+          <a:solidFill>
+            <a:schemeClr val="accent1"/>
+          </a:solidFill>
+          <a:ln>
+            <a:noFill/>
+          </a:ln>
+        </p:spPr>
+        <p:style>
+          <a:lnRef idx="2">
+            <a:schemeClr val="accent1">
+              <a:shade val="50000"/>
+            </a:schemeClr>
+          </a:lnRef>
+          <a:fillRef idx="1">
+            <a:schemeClr val="accent1"/>
+          </a:fillRef>
+          <a:effectRef idx="0">
+            <a:schemeClr val="accent1"/>
+          </a:effectRef>
+          <a:fontRef idx="minor">
+            <a:schemeClr val="lt1"/>
+          </a:fontRef>
+        </p:style>
+      </p:sp>
+      <p:sp>
+        <p:nvSpPr>
           <p:cNvPr id="2" name="Title 1"/>
           <p:cNvSpPr>
             <a:spLocks noGrp="1"/>
@@ -848,58 +1151,71 @@
         </p:nvSpPr>
         <p:spPr>
           <a:xfrm>
-            <a:off x="831850" y="1709738"/>
-            <a:ext cx="10515600" cy="2852737"/>
-          </a:xfrm>
-        </p:spPr>
-        <p:txBody>
-          <a:bodyPr anchor="b"/>
+            <a:off x="1097280" y="758952"/>
+            <a:ext cx="10058400" cy="3566160"/>
+          </a:xfrm>
+        </p:spPr>
+        <p:txBody>
+          <a:bodyPr anchor="b" anchorCtr="0">
+            <a:normAutofit/>
+          </a:bodyPr>
           <a:lstStyle>
             <a:lvl1pPr>
-              <a:defRPr sz="6000"/>
-            </a:lvl1pPr>
-          </a:lstStyle>
-          <a:p>
-            <a:r>
-              <a:rPr lang="en-US"/>
-              <a:t>Click to edit Master title style</a:t>
-            </a:r>
-            <a:endParaRPr lang="en-US"/>
-          </a:p>
-        </p:txBody>
-      </p:sp>
-      <p:sp>
-        <p:nvSpPr>
-          <p:cNvPr id="3" name="Text Placeholder 2"/>
-          <p:cNvSpPr>
-            <a:spLocks noGrp="1"/>
-          </p:cNvSpPr>
-          <p:nvPr>
-            <p:ph type="body" idx="1"/>
-          </p:nvPr>
-        </p:nvSpPr>
-        <p:spPr>
-          <a:xfrm>
-            <a:off x="831850" y="4589463"/>
-            <a:ext cx="10515600" cy="1500187"/>
-          </a:xfrm>
-        </p:spPr>
-        <p:txBody>
-          <a:bodyPr/>
-          <a:lstStyle>
-            <a:lvl1pPr marL="0" indent="0">
-              <a:buNone/>
-              <a:defRPr sz="2400">
+              <a:lnSpc>
+                <a:spcPct val="85000"/>
+              </a:lnSpc>
+              <a:defRPr sz="8000" b="0">
                 <a:solidFill>
                   <a:schemeClr val="tx1">
-                    <a:tint val="75000"/>
+                    <a:lumMod val="85000"/>
+                    <a:lumOff val="15000"/>
                   </a:schemeClr>
                 </a:solidFill>
               </a:defRPr>
             </a:lvl1pPr>
+          </a:lstStyle>
+          <a:p>
+            <a:r>
+              <a:rPr lang="en-US"/>
+              <a:t>Click to edit Master title style</a:t>
+            </a:r>
+            <a:endParaRPr lang="en-US" dirty="0"/>
+          </a:p>
+        </p:txBody>
+      </p:sp>
+      <p:sp>
+        <p:nvSpPr>
+          <p:cNvPr id="3" name="Text Placeholder 2"/>
+          <p:cNvSpPr>
+            <a:spLocks noGrp="1"/>
+          </p:cNvSpPr>
+          <p:nvPr>
+            <p:ph type="body" idx="1"/>
+          </p:nvPr>
+        </p:nvSpPr>
+        <p:spPr>
+          <a:xfrm>
+            <a:off x="1097280" y="4453128"/>
+            <a:ext cx="10058400" cy="1143000"/>
+          </a:xfrm>
+        </p:spPr>
+        <p:txBody>
+          <a:bodyPr lIns="91440" rIns="91440" anchor="t" anchorCtr="0">
+            <a:normAutofit/>
+          </a:bodyPr>
+          <a:lstStyle>
+            <a:lvl1pPr marL="0" indent="0">
+              <a:buNone/>
+              <a:defRPr sz="2400" cap="all" spc="200" baseline="0">
+                <a:solidFill>
+                  <a:schemeClr val="tx2"/>
+                </a:solidFill>
+                <a:latin typeface="+mj-lt"/>
+              </a:defRPr>
+            </a:lvl1pPr>
             <a:lvl2pPr marL="457200" indent="0">
               <a:buNone/>
-              <a:defRPr sz="2000">
+              <a:defRPr sz="1800">
                 <a:solidFill>
                   <a:schemeClr val="tx1">
                     <a:tint val="75000"/>
@@ -909,7 +1225,7 @@
             </a:lvl2pPr>
             <a:lvl3pPr marL="914400" indent="0">
               <a:buNone/>
-              <a:defRPr sz="1800">
+              <a:defRPr sz="1600">
                 <a:solidFill>
                   <a:schemeClr val="tx1">
                     <a:tint val="75000"/>
@@ -919,7 +1235,7 @@
             </a:lvl3pPr>
             <a:lvl4pPr marL="1371600" indent="0">
               <a:buNone/>
-              <a:defRPr sz="1600">
+              <a:defRPr sz="1400">
                 <a:solidFill>
                   <a:schemeClr val="tx1">
                     <a:tint val="75000"/>
@@ -929,7 +1245,7 @@
             </a:lvl4pPr>
             <a:lvl5pPr marL="1828800" indent="0">
               <a:buNone/>
-              <a:defRPr sz="1600">
+              <a:defRPr sz="1400">
                 <a:solidFill>
                   <a:schemeClr val="tx1">
                     <a:tint val="75000"/>
@@ -939,7 +1255,7 @@
             </a:lvl5pPr>
             <a:lvl6pPr marL="2286000" indent="0">
               <a:buNone/>
-              <a:defRPr sz="1600">
+              <a:defRPr sz="1400">
                 <a:solidFill>
                   <a:schemeClr val="tx1">
                     <a:tint val="75000"/>
@@ -949,7 +1265,7 @@
             </a:lvl6pPr>
             <a:lvl7pPr marL="2743200" indent="0">
               <a:buNone/>
-              <a:defRPr sz="1600">
+              <a:defRPr sz="1400">
                 <a:solidFill>
                   <a:schemeClr val="tx1">
                     <a:tint val="75000"/>
@@ -959,7 +1275,7 @@
             </a:lvl7pPr>
             <a:lvl8pPr marL="3200400" indent="0">
               <a:buNone/>
-              <a:defRPr sz="1600">
+              <a:defRPr sz="1400">
                 <a:solidFill>
                   <a:schemeClr val="tx1">
                     <a:tint val="75000"/>
@@ -969,7 +1285,7 @@
             </a:lvl8pPr>
             <a:lvl9pPr marL="3657600" indent="0">
               <a:buNone/>
-              <a:defRPr sz="1600">
+              <a:defRPr sz="1400">
                 <a:solidFill>
                   <a:schemeClr val="tx1">
                     <a:tint val="75000"/>
@@ -1052,10 +1368,48 @@
           </a:p>
         </p:txBody>
       </p:sp>
+      <p:cxnSp>
+        <p:nvCxnSpPr>
+          <p:cNvPr id="9" name="Straight Connector 8"/>
+          <p:cNvCxnSpPr/>
+          <p:nvPr/>
+        </p:nvCxnSpPr>
+        <p:spPr>
+          <a:xfrm>
+            <a:off x="1207658" y="4343400"/>
+            <a:ext cx="9875520" cy="0"/>
+          </a:xfrm>
+          <a:prstGeom prst="line">
+            <a:avLst/>
+          </a:prstGeom>
+          <a:ln w="6350">
+            <a:solidFill>
+              <a:schemeClr val="tx1">
+                <a:lumMod val="50000"/>
+                <a:lumOff val="50000"/>
+              </a:schemeClr>
+            </a:solidFill>
+          </a:ln>
+        </p:spPr>
+        <p:style>
+          <a:lnRef idx="1">
+            <a:schemeClr val="accent1"/>
+          </a:lnRef>
+          <a:fillRef idx="0">
+            <a:schemeClr val="accent1"/>
+          </a:fillRef>
+          <a:effectRef idx="0">
+            <a:schemeClr val="accent1"/>
+          </a:effectRef>
+          <a:fontRef idx="minor">
+            <a:schemeClr val="tx1"/>
+          </a:fontRef>
+        </p:style>
+      </p:cxnSp>
     </p:spTree>
     <p:extLst>
       <p:ext uri="{BB962C8B-B14F-4D97-AF65-F5344CB8AC3E}">
-        <p14:creationId xmlns:p14="http://schemas.microsoft.com/office/powerpoint/2010/main" val="4174802538"/>
+        <p14:creationId xmlns:p14="http://schemas.microsoft.com/office/powerpoint/2010/main" val="4128700683"/>
       </p:ext>
     </p:extLst>
   </p:cSld>
@@ -1084,7 +1438,7 @@
       </p:grpSpPr>
       <p:sp>
         <p:nvSpPr>
-          <p:cNvPr id="2" name="Title 1"/>
+          <p:cNvPr id="8" name="Title 7"/>
           <p:cNvSpPr>
             <a:spLocks noGrp="1"/>
           </p:cNvSpPr>
@@ -1092,7 +1446,12 @@
             <p:ph type="title"/>
           </p:nvPr>
         </p:nvSpPr>
-        <p:spPr/>
+        <p:spPr>
+          <a:xfrm>
+            <a:off x="1097280" y="286603"/>
+            <a:ext cx="10058400" cy="1450757"/>
+          </a:xfrm>
+        </p:spPr>
         <p:txBody>
           <a:bodyPr/>
           <a:lstStyle/>
@@ -1101,7 +1460,7 @@
               <a:rPr lang="en-US"/>
               <a:t>Click to edit Master title style</a:t>
             </a:r>
-            <a:endParaRPr lang="en-US"/>
+            <a:endParaRPr lang="en-US" dirty="0"/>
           </a:p>
         </p:txBody>
       </p:sp>
@@ -1117,8 +1476,8 @@
         </p:nvSpPr>
         <p:spPr>
           <a:xfrm>
-            <a:off x="838200" y="1825625"/>
-            <a:ext cx="5181600" cy="4351338"/>
+            <a:off x="1097279" y="1845734"/>
+            <a:ext cx="4937760" cy="4023360"/>
           </a:xfrm>
         </p:spPr>
         <p:txBody>
@@ -1158,7 +1517,7 @@
               <a:rPr lang="en-US"/>
               <a:t>Fifth level</a:t>
             </a:r>
-            <a:endParaRPr lang="en-US"/>
+            <a:endParaRPr lang="en-US" dirty="0"/>
           </a:p>
         </p:txBody>
       </p:sp>
@@ -1174,8 +1533,8 @@
         </p:nvSpPr>
         <p:spPr>
           <a:xfrm>
-            <a:off x="6172200" y="1825625"/>
-            <a:ext cx="5181600" cy="4351338"/>
+            <a:off x="6217920" y="1845735"/>
+            <a:ext cx="4937760" cy="4023360"/>
           </a:xfrm>
         </p:spPr>
         <p:txBody>
@@ -1215,7 +1574,7 @@
               <a:rPr lang="en-US"/>
               <a:t>Fifth level</a:t>
             </a:r>
-            <a:endParaRPr lang="en-US"/>
+            <a:endParaRPr lang="en-US" dirty="0"/>
           </a:p>
         </p:txBody>
       </p:sp>
@@ -1287,7 +1646,7 @@
     </p:spTree>
     <p:extLst>
       <p:ext uri="{BB962C8B-B14F-4D97-AF65-F5344CB8AC3E}">
-        <p14:creationId xmlns:p14="http://schemas.microsoft.com/office/powerpoint/2010/main" val="1806422544"/>
+        <p14:creationId xmlns:p14="http://schemas.microsoft.com/office/powerpoint/2010/main" val="340290046"/>
       </p:ext>
     </p:extLst>
   </p:cSld>
@@ -1316,7 +1675,7 @@
       </p:grpSpPr>
       <p:sp>
         <p:nvSpPr>
-          <p:cNvPr id="2" name="Title 1"/>
+          <p:cNvPr id="10" name="Title 9"/>
           <p:cNvSpPr>
             <a:spLocks noGrp="1"/>
           </p:cNvSpPr>
@@ -1326,8 +1685,8 @@
         </p:nvSpPr>
         <p:spPr>
           <a:xfrm>
-            <a:off x="839788" y="365125"/>
-            <a:ext cx="10515600" cy="1325563"/>
+            <a:off x="1097280" y="286603"/>
+            <a:ext cx="10058400" cy="1450757"/>
           </a:xfrm>
         </p:spPr>
         <p:txBody>
@@ -1338,7 +1697,7 @@
               <a:rPr lang="en-US"/>
               <a:t>Click to edit Master title style</a:t>
             </a:r>
-            <a:endParaRPr lang="en-US"/>
+            <a:endParaRPr lang="en-US" dirty="0"/>
           </a:p>
         </p:txBody>
       </p:sp>
@@ -1354,16 +1713,22 @@
         </p:nvSpPr>
         <p:spPr>
           <a:xfrm>
-            <a:off x="839788" y="1681163"/>
-            <a:ext cx="5157787" cy="823912"/>
-          </a:xfrm>
-        </p:spPr>
-        <p:txBody>
-          <a:bodyPr anchor="b"/>
+            <a:off x="1097280" y="1846052"/>
+            <a:ext cx="4937760" cy="736282"/>
+          </a:xfrm>
+        </p:spPr>
+        <p:txBody>
+          <a:bodyPr lIns="91440" rIns="91440" anchor="ctr">
+            <a:normAutofit/>
+          </a:bodyPr>
           <a:lstStyle>
             <a:lvl1pPr marL="0" indent="0">
               <a:buNone/>
-              <a:defRPr sz="2400" b="1"/>
+              <a:defRPr sz="2000" b="0" cap="all" baseline="0">
+                <a:solidFill>
+                  <a:schemeClr val="tx2"/>
+                </a:solidFill>
+              </a:defRPr>
             </a:lvl1pPr>
             <a:lvl2pPr marL="457200" indent="0">
               <a:buNone/>
@@ -1419,8 +1784,8 @@
         </p:nvSpPr>
         <p:spPr>
           <a:xfrm>
-            <a:off x="839788" y="2505075"/>
-            <a:ext cx="5157787" cy="3684588"/>
+            <a:off x="1097280" y="2582334"/>
+            <a:ext cx="4937760" cy="3378200"/>
           </a:xfrm>
         </p:spPr>
         <p:txBody>
@@ -1460,7 +1825,7 @@
               <a:rPr lang="en-US"/>
               <a:t>Fifth level</a:t>
             </a:r>
-            <a:endParaRPr lang="en-US"/>
+            <a:endParaRPr lang="en-US" dirty="0"/>
           </a:p>
         </p:txBody>
       </p:sp>
@@ -1476,16 +1841,22 @@
         </p:nvSpPr>
         <p:spPr>
           <a:xfrm>
-            <a:off x="6172200" y="1681163"/>
-            <a:ext cx="5183188" cy="823912"/>
-          </a:xfrm>
-        </p:spPr>
-        <p:txBody>
-          <a:bodyPr anchor="b"/>
+            <a:off x="6217920" y="1846052"/>
+            <a:ext cx="4937760" cy="736282"/>
+          </a:xfrm>
+        </p:spPr>
+        <p:txBody>
+          <a:bodyPr lIns="91440" rIns="91440" anchor="ctr">
+            <a:normAutofit/>
+          </a:bodyPr>
           <a:lstStyle>
             <a:lvl1pPr marL="0" indent="0">
               <a:buNone/>
-              <a:defRPr sz="2400" b="1"/>
+              <a:defRPr sz="2000" b="0" cap="all" baseline="0">
+                <a:solidFill>
+                  <a:schemeClr val="tx2"/>
+                </a:solidFill>
+              </a:defRPr>
             </a:lvl1pPr>
             <a:lvl2pPr marL="457200" indent="0">
               <a:buNone/>
@@ -1541,8 +1912,8 @@
         </p:nvSpPr>
         <p:spPr>
           <a:xfrm>
-            <a:off x="6172200" y="2505075"/>
-            <a:ext cx="5183188" cy="3684588"/>
+            <a:off x="6217920" y="2582334"/>
+            <a:ext cx="4937760" cy="3378200"/>
           </a:xfrm>
         </p:spPr>
         <p:txBody>
@@ -1582,7 +1953,7 @@
               <a:rPr lang="en-US"/>
               <a:t>Fifth level</a:t>
             </a:r>
-            <a:endParaRPr lang="en-US"/>
+            <a:endParaRPr lang="en-US" dirty="0"/>
           </a:p>
         </p:txBody>
       </p:sp>
@@ -1654,7 +2025,7 @@
     </p:spTree>
     <p:extLst>
       <p:ext uri="{BB962C8B-B14F-4D97-AF65-F5344CB8AC3E}">
-        <p14:creationId xmlns:p14="http://schemas.microsoft.com/office/powerpoint/2010/main" val="3539849692"/>
+        <p14:creationId xmlns:p14="http://schemas.microsoft.com/office/powerpoint/2010/main" val="425982820"/>
       </p:ext>
     </p:extLst>
   </p:cSld>
@@ -1700,7 +2071,7 @@
               <a:rPr lang="en-US"/>
               <a:t>Click to edit Master title style</a:t>
             </a:r>
-            <a:endParaRPr lang="en-US"/>
+            <a:endParaRPr lang="en-US" dirty="0"/>
           </a:p>
         </p:txBody>
       </p:sp>
@@ -1772,7 +2143,7 @@
     </p:spTree>
     <p:extLst>
       <p:ext uri="{BB962C8B-B14F-4D97-AF65-F5344CB8AC3E}">
-        <p14:creationId xmlns:p14="http://schemas.microsoft.com/office/powerpoint/2010/main" val="3299068548"/>
+        <p14:creationId xmlns:p14="http://schemas.microsoft.com/office/powerpoint/2010/main" val="1865538170"/>
       </p:ext>
     </p:extLst>
   </p:cSld>
@@ -1783,7 +2154,7 @@
 </file>
 
 <file path=ppt/slideLayouts/slideLayout7.xml><?xml version="1.0" encoding="utf-8"?>
-<p:sldLayout xmlns:a="http://schemas.openxmlformats.org/drawingml/2006/main" xmlns:r="http://schemas.openxmlformats.org/officeDocument/2006/relationships" xmlns:p="http://schemas.openxmlformats.org/presentationml/2006/main" type="blank" preserve="1">
+<p:sldLayout xmlns:a="http://schemas.openxmlformats.org/drawingml/2006/main" xmlns:r="http://schemas.openxmlformats.org/officeDocument/2006/relationships" xmlns:p="http://schemas.openxmlformats.org/presentationml/2006/main" showMasterSp="0" type="blank" preserve="1">
   <p:cSld name="Blank">
     <p:spTree>
       <p:nvGrpSpPr>
@@ -1801,7 +2172,83 @@
       </p:grpSpPr>
       <p:sp>
         <p:nvSpPr>
-          <p:cNvPr id="2" name="Date Placeholder 1"/>
+          <p:cNvPr id="5" name="Rectangle 4"/>
+          <p:cNvSpPr/>
+          <p:nvPr/>
+        </p:nvSpPr>
+        <p:spPr>
+          <a:xfrm>
+            <a:off x="3175" y="6400800"/>
+            <a:ext cx="12188825" cy="457200"/>
+          </a:xfrm>
+          <a:prstGeom prst="rect">
+            <a:avLst/>
+          </a:prstGeom>
+          <a:solidFill>
+            <a:schemeClr val="accent2"/>
+          </a:solidFill>
+          <a:ln>
+            <a:noFill/>
+          </a:ln>
+        </p:spPr>
+        <p:style>
+          <a:lnRef idx="2">
+            <a:schemeClr val="accent1">
+              <a:shade val="50000"/>
+            </a:schemeClr>
+          </a:lnRef>
+          <a:fillRef idx="1">
+            <a:schemeClr val="accent1"/>
+          </a:fillRef>
+          <a:effectRef idx="0">
+            <a:schemeClr val="accent1"/>
+          </a:effectRef>
+          <a:fontRef idx="minor">
+            <a:schemeClr val="lt1"/>
+          </a:fontRef>
+        </p:style>
+      </p:sp>
+      <p:sp>
+        <p:nvSpPr>
+          <p:cNvPr id="6" name="Rectangle 5"/>
+          <p:cNvSpPr/>
+          <p:nvPr/>
+        </p:nvSpPr>
+        <p:spPr>
+          <a:xfrm>
+            <a:off x="15" y="6334316"/>
+            <a:ext cx="12188825" cy="64008"/>
+          </a:xfrm>
+          <a:prstGeom prst="rect">
+            <a:avLst/>
+          </a:prstGeom>
+          <a:solidFill>
+            <a:schemeClr val="accent1"/>
+          </a:solidFill>
+          <a:ln>
+            <a:noFill/>
+          </a:ln>
+        </p:spPr>
+        <p:style>
+          <a:lnRef idx="2">
+            <a:schemeClr val="accent1">
+              <a:shade val="50000"/>
+            </a:schemeClr>
+          </a:lnRef>
+          <a:fillRef idx="1">
+            <a:schemeClr val="accent1"/>
+          </a:fillRef>
+          <a:effectRef idx="0">
+            <a:schemeClr val="accent1"/>
+          </a:effectRef>
+          <a:fontRef idx="minor">
+            <a:schemeClr val="lt1"/>
+          </a:fontRef>
+        </p:style>
+      </p:sp>
+      <p:sp>
+        <p:nvSpPr>
+          <p:cNvPr id="7" name="Date Placeholder 6"/>
           <p:cNvSpPr>
             <a:spLocks noGrp="1"/>
           </p:cNvSpPr>
@@ -1824,7 +2271,7 @@
       </p:sp>
       <p:sp>
         <p:nvSpPr>
-          <p:cNvPr id="3" name="Footer Placeholder 2"/>
+          <p:cNvPr id="8" name="Footer Placeholder 7"/>
           <p:cNvSpPr>
             <a:spLocks noGrp="1"/>
           </p:cNvSpPr>
@@ -1835,7 +2282,15 @@
         <p:spPr/>
         <p:txBody>
           <a:bodyPr/>
-          <a:lstStyle/>
+          <a:lstStyle>
+            <a:lvl1pPr>
+              <a:defRPr>
+                <a:solidFill>
+                  <a:srgbClr val="FFFFFF"/>
+                </a:solidFill>
+              </a:defRPr>
+            </a:lvl1pPr>
+          </a:lstStyle>
           <a:p>
             <a:endParaRPr lang="en-US"/>
           </a:p>
@@ -1843,7 +2298,7 @@
       </p:sp>
       <p:sp>
         <p:nvSpPr>
-          <p:cNvPr id="4" name="Slide Number Placeholder 3"/>
+          <p:cNvPr id="9" name="Slide Number Placeholder 8"/>
           <p:cNvSpPr>
             <a:spLocks noGrp="1"/>
           </p:cNvSpPr>
@@ -1867,7 +2322,7 @@
     </p:spTree>
     <p:extLst>
       <p:ext uri="{BB962C8B-B14F-4D97-AF65-F5344CB8AC3E}">
-        <p14:creationId xmlns:p14="http://schemas.microsoft.com/office/powerpoint/2010/main" val="3475934610"/>
+        <p14:creationId xmlns:p14="http://schemas.microsoft.com/office/powerpoint/2010/main" val="1843518521"/>
       </p:ext>
     </p:extLst>
   </p:cSld>
@@ -1878,7 +2333,7 @@
 </file>
 
 <file path=ppt/slideLayouts/slideLayout8.xml><?xml version="1.0" encoding="utf-8"?>
-<p:sldLayout xmlns:a="http://schemas.openxmlformats.org/drawingml/2006/main" xmlns:r="http://schemas.openxmlformats.org/officeDocument/2006/relationships" xmlns:p="http://schemas.openxmlformats.org/presentationml/2006/main" type="objTx" preserve="1">
+<p:sldLayout xmlns:a="http://schemas.openxmlformats.org/drawingml/2006/main" xmlns:r="http://schemas.openxmlformats.org/officeDocument/2006/relationships" xmlns:p="http://schemas.openxmlformats.org/presentationml/2006/main" showMasterSp="0" type="objTx" preserve="1">
   <p:cSld name="Content with Caption">
     <p:spTree>
       <p:nvGrpSpPr>
@@ -1896,6 +2351,82 @@
       </p:grpSpPr>
       <p:sp>
         <p:nvSpPr>
+          <p:cNvPr id="8" name="Rectangle 7"/>
+          <p:cNvSpPr/>
+          <p:nvPr/>
+        </p:nvSpPr>
+        <p:spPr>
+          <a:xfrm>
+            <a:off x="16" y="0"/>
+            <a:ext cx="4050791" cy="6858000"/>
+          </a:xfrm>
+          <a:prstGeom prst="rect">
+            <a:avLst/>
+          </a:prstGeom>
+          <a:solidFill>
+            <a:schemeClr val="accent2"/>
+          </a:solidFill>
+          <a:ln>
+            <a:noFill/>
+          </a:ln>
+        </p:spPr>
+        <p:style>
+          <a:lnRef idx="2">
+            <a:schemeClr val="accent1">
+              <a:shade val="50000"/>
+            </a:schemeClr>
+          </a:lnRef>
+          <a:fillRef idx="1">
+            <a:schemeClr val="accent1"/>
+          </a:fillRef>
+          <a:effectRef idx="0">
+            <a:schemeClr val="accent1"/>
+          </a:effectRef>
+          <a:fontRef idx="minor">
+            <a:schemeClr val="lt1"/>
+          </a:fontRef>
+        </p:style>
+      </p:sp>
+      <p:sp>
+        <p:nvSpPr>
+          <p:cNvPr id="9" name="Rectangle 8"/>
+          <p:cNvSpPr/>
+          <p:nvPr/>
+        </p:nvSpPr>
+        <p:spPr>
+          <a:xfrm>
+            <a:off x="4040071" y="0"/>
+            <a:ext cx="64008" cy="6858000"/>
+          </a:xfrm>
+          <a:prstGeom prst="rect">
+            <a:avLst/>
+          </a:prstGeom>
+          <a:solidFill>
+            <a:schemeClr val="accent1"/>
+          </a:solidFill>
+          <a:ln>
+            <a:noFill/>
+          </a:ln>
+        </p:spPr>
+        <p:style>
+          <a:lnRef idx="2">
+            <a:schemeClr val="accent1">
+              <a:shade val="50000"/>
+            </a:schemeClr>
+          </a:lnRef>
+          <a:fillRef idx="1">
+            <a:schemeClr val="accent1"/>
+          </a:fillRef>
+          <a:effectRef idx="0">
+            <a:schemeClr val="accent1"/>
+          </a:effectRef>
+          <a:fontRef idx="minor">
+            <a:schemeClr val="lt1"/>
+          </a:fontRef>
+        </p:style>
+      </p:sp>
+      <p:sp>
+        <p:nvSpPr>
           <p:cNvPr id="2" name="Title 1"/>
           <p:cNvSpPr>
             <a:spLocks noGrp="1"/>
@@ -1906,15 +2437,21 @@
         </p:nvSpPr>
         <p:spPr>
           <a:xfrm>
-            <a:off x="839788" y="457200"/>
-            <a:ext cx="3932237" cy="1600200"/>
-          </a:xfrm>
-        </p:spPr>
-        <p:txBody>
-          <a:bodyPr anchor="b"/>
+            <a:off x="457200" y="594359"/>
+            <a:ext cx="3200400" cy="2286000"/>
+          </a:xfrm>
+        </p:spPr>
+        <p:txBody>
+          <a:bodyPr anchor="b">
+            <a:normAutofit/>
+          </a:bodyPr>
           <a:lstStyle>
             <a:lvl1pPr>
-              <a:defRPr sz="3200"/>
+              <a:defRPr sz="3600" b="0">
+                <a:solidFill>
+                  <a:srgbClr val="FFFFFF"/>
+                </a:solidFill>
+              </a:defRPr>
             </a:lvl1pPr>
           </a:lstStyle>
           <a:p>
@@ -1922,7 +2459,7 @@
               <a:rPr lang="en-US"/>
               <a:t>Click to edit Master title style</a:t>
             </a:r>
-            <a:endParaRPr lang="en-US"/>
+            <a:endParaRPr lang="en-US" dirty="0"/>
           </a:p>
         </p:txBody>
       </p:sp>
@@ -1938,158 +2475,145 @@
         </p:nvSpPr>
         <p:spPr>
           <a:xfrm>
-            <a:off x="5183188" y="987425"/>
-            <a:ext cx="6172200" cy="4873625"/>
+            <a:off x="4800600" y="731520"/>
+            <a:ext cx="6492240" cy="5257800"/>
+          </a:xfrm>
+        </p:spPr>
+        <p:txBody>
+          <a:bodyPr/>
+          <a:lstStyle/>
+          <a:p>
+            <a:pPr lvl="0"/>
+            <a:r>
+              <a:rPr lang="en-US"/>
+              <a:t>Edit Master text styles</a:t>
+            </a:r>
+          </a:p>
+          <a:p>
+            <a:pPr lvl="1"/>
+            <a:r>
+              <a:rPr lang="en-US"/>
+              <a:t>Second level</a:t>
+            </a:r>
+          </a:p>
+          <a:p>
+            <a:pPr lvl="2"/>
+            <a:r>
+              <a:rPr lang="en-US"/>
+              <a:t>Third level</a:t>
+            </a:r>
+          </a:p>
+          <a:p>
+            <a:pPr lvl="3"/>
+            <a:r>
+              <a:rPr lang="en-US"/>
+              <a:t>Fourth level</a:t>
+            </a:r>
+          </a:p>
+          <a:p>
+            <a:pPr lvl="4"/>
+            <a:r>
+              <a:rPr lang="en-US"/>
+              <a:t>Fifth level</a:t>
+            </a:r>
+            <a:endParaRPr lang="en-US" dirty="0"/>
+          </a:p>
+        </p:txBody>
+      </p:sp>
+      <p:sp>
+        <p:nvSpPr>
+          <p:cNvPr id="4" name="Text Placeholder 3"/>
+          <p:cNvSpPr>
+            <a:spLocks noGrp="1"/>
+          </p:cNvSpPr>
+          <p:nvPr>
+            <p:ph type="body" sz="half" idx="2"/>
+          </p:nvPr>
+        </p:nvSpPr>
+        <p:spPr>
+          <a:xfrm>
+            <a:off x="457200" y="2926080"/>
+            <a:ext cx="3200400" cy="3379124"/>
+          </a:xfrm>
+        </p:spPr>
+        <p:txBody>
+          <a:bodyPr lIns="91440" rIns="91440">
+            <a:normAutofit/>
+          </a:bodyPr>
+          <a:lstStyle>
+            <a:lvl1pPr marL="0" indent="0">
+              <a:buNone/>
+              <a:defRPr sz="1500">
+                <a:solidFill>
+                  <a:srgbClr val="FFFFFF"/>
+                </a:solidFill>
+              </a:defRPr>
+            </a:lvl1pPr>
+            <a:lvl2pPr marL="457200" indent="0">
+              <a:buNone/>
+              <a:defRPr sz="1200"/>
+            </a:lvl2pPr>
+            <a:lvl3pPr marL="914400" indent="0">
+              <a:buNone/>
+              <a:defRPr sz="1000"/>
+            </a:lvl3pPr>
+            <a:lvl4pPr marL="1371600" indent="0">
+              <a:buNone/>
+              <a:defRPr sz="900"/>
+            </a:lvl4pPr>
+            <a:lvl5pPr marL="1828800" indent="0">
+              <a:buNone/>
+              <a:defRPr sz="900"/>
+            </a:lvl5pPr>
+            <a:lvl6pPr marL="2286000" indent="0">
+              <a:buNone/>
+              <a:defRPr sz="900"/>
+            </a:lvl6pPr>
+            <a:lvl7pPr marL="2743200" indent="0">
+              <a:buNone/>
+              <a:defRPr sz="900"/>
+            </a:lvl7pPr>
+            <a:lvl8pPr marL="3200400" indent="0">
+              <a:buNone/>
+              <a:defRPr sz="900"/>
+            </a:lvl8pPr>
+            <a:lvl9pPr marL="3657600" indent="0">
+              <a:buNone/>
+              <a:defRPr sz="900"/>
+            </a:lvl9pPr>
+          </a:lstStyle>
+          <a:p>
+            <a:pPr lvl="0"/>
+            <a:r>
+              <a:rPr lang="en-US"/>
+              <a:t>Edit Master text styles</a:t>
+            </a:r>
+          </a:p>
+        </p:txBody>
+      </p:sp>
+      <p:sp>
+        <p:nvSpPr>
+          <p:cNvPr id="5" name="Date Placeholder 4"/>
+          <p:cNvSpPr>
+            <a:spLocks noGrp="1"/>
+          </p:cNvSpPr>
+          <p:nvPr>
+            <p:ph type="dt" sz="half" idx="10"/>
+          </p:nvPr>
+        </p:nvSpPr>
+        <p:spPr>
+          <a:xfrm>
+            <a:off x="465512" y="6459785"/>
+            <a:ext cx="2618510" cy="365125"/>
           </a:xfrm>
         </p:spPr>
         <p:txBody>
           <a:bodyPr/>
           <a:lstStyle>
-            <a:lvl1pPr>
-              <a:defRPr sz="3200"/>
+            <a:lvl1pPr algn="l">
+              <a:defRPr/>
             </a:lvl1pPr>
-            <a:lvl2pPr>
-              <a:defRPr sz="2800"/>
-            </a:lvl2pPr>
-            <a:lvl3pPr>
-              <a:defRPr sz="2400"/>
-            </a:lvl3pPr>
-            <a:lvl4pPr>
-              <a:defRPr sz="2000"/>
-            </a:lvl4pPr>
-            <a:lvl5pPr>
-              <a:defRPr sz="2000"/>
-            </a:lvl5pPr>
-            <a:lvl6pPr>
-              <a:defRPr sz="2000"/>
-            </a:lvl6pPr>
-            <a:lvl7pPr>
-              <a:defRPr sz="2000"/>
-            </a:lvl7pPr>
-            <a:lvl8pPr>
-              <a:defRPr sz="2000"/>
-            </a:lvl8pPr>
-            <a:lvl9pPr>
-              <a:defRPr sz="2000"/>
-            </a:lvl9pPr>
           </a:lstStyle>
-          <a:p>
-            <a:pPr lvl="0"/>
-            <a:r>
-              <a:rPr lang="en-US"/>
-              <a:t>Edit Master text styles</a:t>
-            </a:r>
-          </a:p>
-          <a:p>
-            <a:pPr lvl="1"/>
-            <a:r>
-              <a:rPr lang="en-US"/>
-              <a:t>Second level</a:t>
-            </a:r>
-          </a:p>
-          <a:p>
-            <a:pPr lvl="2"/>
-            <a:r>
-              <a:rPr lang="en-US"/>
-              <a:t>Third level</a:t>
-            </a:r>
-          </a:p>
-          <a:p>
-            <a:pPr lvl="3"/>
-            <a:r>
-              <a:rPr lang="en-US"/>
-              <a:t>Fourth level</a:t>
-            </a:r>
-          </a:p>
-          <a:p>
-            <a:pPr lvl="4"/>
-            <a:r>
-              <a:rPr lang="en-US"/>
-              <a:t>Fifth level</a:t>
-            </a:r>
-            <a:endParaRPr lang="en-US"/>
-          </a:p>
-        </p:txBody>
-      </p:sp>
-      <p:sp>
-        <p:nvSpPr>
-          <p:cNvPr id="4" name="Text Placeholder 3"/>
-          <p:cNvSpPr>
-            <a:spLocks noGrp="1"/>
-          </p:cNvSpPr>
-          <p:nvPr>
-            <p:ph type="body" sz="half" idx="2"/>
-          </p:nvPr>
-        </p:nvSpPr>
-        <p:spPr>
-          <a:xfrm>
-            <a:off x="839788" y="2057400"/>
-            <a:ext cx="3932237" cy="3811588"/>
-          </a:xfrm>
-        </p:spPr>
-        <p:txBody>
-          <a:bodyPr/>
-          <a:lstStyle>
-            <a:lvl1pPr marL="0" indent="0">
-              <a:buNone/>
-              <a:defRPr sz="1600"/>
-            </a:lvl1pPr>
-            <a:lvl2pPr marL="457200" indent="0">
-              <a:buNone/>
-              <a:defRPr sz="1400"/>
-            </a:lvl2pPr>
-            <a:lvl3pPr marL="914400" indent="0">
-              <a:buNone/>
-              <a:defRPr sz="1200"/>
-            </a:lvl3pPr>
-            <a:lvl4pPr marL="1371600" indent="0">
-              <a:buNone/>
-              <a:defRPr sz="1000"/>
-            </a:lvl4pPr>
-            <a:lvl5pPr marL="1828800" indent="0">
-              <a:buNone/>
-              <a:defRPr sz="1000"/>
-            </a:lvl5pPr>
-            <a:lvl6pPr marL="2286000" indent="0">
-              <a:buNone/>
-              <a:defRPr sz="1000"/>
-            </a:lvl6pPr>
-            <a:lvl7pPr marL="2743200" indent="0">
-              <a:buNone/>
-              <a:defRPr sz="1000"/>
-            </a:lvl7pPr>
-            <a:lvl8pPr marL="3200400" indent="0">
-              <a:buNone/>
-              <a:defRPr sz="1000"/>
-            </a:lvl8pPr>
-            <a:lvl9pPr marL="3657600" indent="0">
-              <a:buNone/>
-              <a:defRPr sz="1000"/>
-            </a:lvl9pPr>
-          </a:lstStyle>
-          <a:p>
-            <a:pPr lvl="0"/>
-            <a:r>
-              <a:rPr lang="en-US"/>
-              <a:t>Edit Master text styles</a:t>
-            </a:r>
-          </a:p>
-        </p:txBody>
-      </p:sp>
-      <p:sp>
-        <p:nvSpPr>
-          <p:cNvPr id="5" name="Date Placeholder 4"/>
-          <p:cNvSpPr>
-            <a:spLocks noGrp="1"/>
-          </p:cNvSpPr>
-          <p:nvPr>
-            <p:ph type="dt" sz="half" idx="10"/>
-          </p:nvPr>
-        </p:nvSpPr>
-        <p:spPr/>
-        <p:txBody>
-          <a:bodyPr/>
-          <a:lstStyle/>
           <a:p>
             <a:fld id="{CA586F88-EEB5-4979-9532-C99075E35C56}" type="datetimeFigureOut">
               <a:rPr lang="en-US" smtClean="0"/>
@@ -2109,29 +2633,50 @@
             <p:ph type="ftr" sz="quarter" idx="11"/>
           </p:nvPr>
         </p:nvSpPr>
+        <p:spPr>
+          <a:xfrm>
+            <a:off x="4800600" y="6459785"/>
+            <a:ext cx="4648200" cy="365125"/>
+          </a:xfrm>
+        </p:spPr>
+        <p:txBody>
+          <a:bodyPr/>
+          <a:lstStyle>
+            <a:lvl1pPr algn="l">
+              <a:defRPr>
+                <a:solidFill>
+                  <a:schemeClr val="tx2"/>
+                </a:solidFill>
+              </a:defRPr>
+            </a:lvl1pPr>
+          </a:lstStyle>
+          <a:p>
+            <a:endParaRPr lang="en-US"/>
+          </a:p>
+        </p:txBody>
+      </p:sp>
+      <p:sp>
+        <p:nvSpPr>
+          <p:cNvPr id="7" name="Slide Number Placeholder 6"/>
+          <p:cNvSpPr>
+            <a:spLocks noGrp="1"/>
+          </p:cNvSpPr>
+          <p:nvPr>
+            <p:ph type="sldNum" sz="quarter" idx="12"/>
+          </p:nvPr>
+        </p:nvSpPr>
         <p:spPr/>
         <p:txBody>
           <a:bodyPr/>
-          <a:lstStyle/>
-          <a:p>
-            <a:endParaRPr lang="en-US"/>
-          </a:p>
-        </p:txBody>
-      </p:sp>
-      <p:sp>
-        <p:nvSpPr>
-          <p:cNvPr id="7" name="Slide Number Placeholder 6"/>
-          <p:cNvSpPr>
-            <a:spLocks noGrp="1"/>
-          </p:cNvSpPr>
-          <p:nvPr>
-            <p:ph type="sldNum" sz="quarter" idx="12"/>
-          </p:nvPr>
-        </p:nvSpPr>
-        <p:spPr/>
-        <p:txBody>
-          <a:bodyPr/>
-          <a:lstStyle/>
+          <a:lstStyle>
+            <a:lvl1pPr>
+              <a:defRPr>
+                <a:solidFill>
+                  <a:schemeClr val="tx2"/>
+                </a:solidFill>
+              </a:defRPr>
+            </a:lvl1pPr>
+          </a:lstStyle>
           <a:p>
             <a:fld id="{597C4F9D-C1BC-482F-ACE4-604A1ED49A8D}" type="slidenum">
               <a:rPr lang="en-US" smtClean="0"/>
@@ -2144,7 +2689,7 @@
     </p:spTree>
     <p:extLst>
       <p:ext uri="{BB962C8B-B14F-4D97-AF65-F5344CB8AC3E}">
-        <p14:creationId xmlns:p14="http://schemas.microsoft.com/office/powerpoint/2010/main" val="1003768597"/>
+        <p14:creationId xmlns:p14="http://schemas.microsoft.com/office/powerpoint/2010/main" val="3970616502"/>
       </p:ext>
     </p:extLst>
   </p:cSld>
@@ -2155,7 +2700,7 @@
 </file>
 
 <file path=ppt/slideLayouts/slideLayout9.xml><?xml version="1.0" encoding="utf-8"?>
-<p:sldLayout xmlns:a="http://schemas.openxmlformats.org/drawingml/2006/main" xmlns:r="http://schemas.openxmlformats.org/officeDocument/2006/relationships" xmlns:p="http://schemas.openxmlformats.org/presentationml/2006/main" type="picTx" preserve="1">
+<p:sldLayout xmlns:a="http://schemas.openxmlformats.org/drawingml/2006/main" xmlns:r="http://schemas.openxmlformats.org/officeDocument/2006/relationships" xmlns:p="http://schemas.openxmlformats.org/presentationml/2006/main" showMasterSp="0" type="picTx" preserve="1">
   <p:cSld name="Picture with Caption">
     <p:spTree>
       <p:nvGrpSpPr>
@@ -2173,6 +2718,82 @@
       </p:grpSpPr>
       <p:sp>
         <p:nvSpPr>
+          <p:cNvPr id="8" name="Rectangle 7"/>
+          <p:cNvSpPr/>
+          <p:nvPr/>
+        </p:nvSpPr>
+        <p:spPr>
+          <a:xfrm>
+            <a:off x="0" y="4953000"/>
+            <a:ext cx="12188825" cy="1905000"/>
+          </a:xfrm>
+          <a:prstGeom prst="rect">
+            <a:avLst/>
+          </a:prstGeom>
+          <a:solidFill>
+            <a:schemeClr val="accent2"/>
+          </a:solidFill>
+          <a:ln>
+            <a:noFill/>
+          </a:ln>
+        </p:spPr>
+        <p:style>
+          <a:lnRef idx="2">
+            <a:schemeClr val="accent1">
+              <a:shade val="50000"/>
+            </a:schemeClr>
+          </a:lnRef>
+          <a:fillRef idx="1">
+            <a:schemeClr val="accent1"/>
+          </a:fillRef>
+          <a:effectRef idx="0">
+            <a:schemeClr val="accent1"/>
+          </a:effectRef>
+          <a:fontRef idx="minor">
+            <a:schemeClr val="lt1"/>
+          </a:fontRef>
+        </p:style>
+      </p:sp>
+      <p:sp>
+        <p:nvSpPr>
+          <p:cNvPr id="9" name="Rectangle 8"/>
+          <p:cNvSpPr/>
+          <p:nvPr/>
+        </p:nvSpPr>
+        <p:spPr>
+          <a:xfrm>
+            <a:off x="15" y="4915076"/>
+            <a:ext cx="12188825" cy="64008"/>
+          </a:xfrm>
+          <a:prstGeom prst="rect">
+            <a:avLst/>
+          </a:prstGeom>
+          <a:solidFill>
+            <a:schemeClr val="accent1"/>
+          </a:solidFill>
+          <a:ln>
+            <a:noFill/>
+          </a:ln>
+        </p:spPr>
+        <p:style>
+          <a:lnRef idx="2">
+            <a:schemeClr val="accent1">
+              <a:shade val="50000"/>
+            </a:schemeClr>
+          </a:lnRef>
+          <a:fillRef idx="1">
+            <a:schemeClr val="accent1"/>
+          </a:fillRef>
+          <a:effectRef idx="0">
+            <a:schemeClr val="accent1"/>
+          </a:effectRef>
+          <a:fontRef idx="minor">
+            <a:schemeClr val="lt1"/>
+          </a:fontRef>
+        </p:style>
+      </p:sp>
+      <p:sp>
+        <p:nvSpPr>
           <p:cNvPr id="2" name="Title 1"/>
           <p:cNvSpPr>
             <a:spLocks noGrp="1"/>
@@ -2183,15 +2804,21 @@
         </p:nvSpPr>
         <p:spPr>
           <a:xfrm>
-            <a:off x="839788" y="457200"/>
-            <a:ext cx="3932237" cy="1600200"/>
-          </a:xfrm>
-        </p:spPr>
-        <p:txBody>
-          <a:bodyPr anchor="b"/>
+            <a:off x="1097280" y="5074920"/>
+            <a:ext cx="10113264" cy="822960"/>
+          </a:xfrm>
+        </p:spPr>
+        <p:txBody>
+          <a:bodyPr lIns="91440" tIns="0" rIns="91440" bIns="0" anchor="b">
+            <a:noAutofit/>
+          </a:bodyPr>
           <a:lstStyle>
             <a:lvl1pPr>
-              <a:defRPr sz="3200"/>
+              <a:defRPr sz="3600" b="0">
+                <a:solidFill>
+                  <a:srgbClr val="FFFFFF"/>
+                </a:solidFill>
+              </a:defRPr>
             </a:lvl1pPr>
           </a:lstStyle>
           <a:p>
@@ -2199,7 +2826,7 @@
               <a:rPr lang="en-US"/>
               <a:t>Click to edit Master title style</a:t>
             </a:r>
-            <a:endParaRPr lang="en-US"/>
+            <a:endParaRPr lang="en-US" dirty="0"/>
           </a:p>
         </p:txBody>
       </p:sp>
@@ -2207,7 +2834,7 @@
         <p:nvSpPr>
           <p:cNvPr id="3" name="Picture Placeholder 2"/>
           <p:cNvSpPr>
-            <a:spLocks noGrp="1"/>
+            <a:spLocks noGrp="1" noChangeAspect="1"/>
           </p:cNvSpPr>
           <p:nvPr>
             <p:ph type="pic" idx="1"/>
@@ -2215,16 +2842,26 @@
         </p:nvSpPr>
         <p:spPr>
           <a:xfrm>
-            <a:off x="5183188" y="987425"/>
-            <a:ext cx="6172200" cy="4873625"/>
-          </a:xfrm>
-        </p:spPr>
-        <p:txBody>
-          <a:bodyPr/>
+            <a:off x="15" y="0"/>
+            <a:ext cx="12191985" cy="4915076"/>
+          </a:xfrm>
+          <a:blipFill>
+            <a:blip r:embed="rId2"/>
+            <a:stretch>
+              <a:fillRect/>
+            </a:stretch>
+          </a:blipFill>
+        </p:spPr>
+        <p:txBody>
+          <a:bodyPr lIns="457200" tIns="457200" anchor="t"/>
           <a:lstStyle>
             <a:lvl1pPr marL="0" indent="0">
               <a:buNone/>
-              <a:defRPr sz="3200"/>
+              <a:defRPr sz="3200">
+                <a:solidFill>
+                  <a:schemeClr val="bg1"/>
+                </a:solidFill>
+              </a:defRPr>
             </a:lvl1pPr>
             <a:lvl2pPr marL="457200" indent="0">
               <a:buNone/>
@@ -2260,7 +2897,11 @@
             </a:lvl9pPr>
           </a:lstStyle>
           <a:p>
-            <a:endParaRPr lang="en-US"/>
+            <a:r>
+              <a:rPr lang="en-US"/>
+              <a:t>Click icon to add picture</a:t>
+            </a:r>
+            <a:endParaRPr lang="en-US" dirty="0"/>
           </a:p>
         </p:txBody>
       </p:sp>
@@ -2276,48 +2917,60 @@
         </p:nvSpPr>
         <p:spPr>
           <a:xfrm>
-            <a:off x="839788" y="2057400"/>
-            <a:ext cx="3932237" cy="3811588"/>
-          </a:xfrm>
-        </p:spPr>
-        <p:txBody>
-          <a:bodyPr/>
+            <a:off x="1097280" y="5907023"/>
+            <a:ext cx="10113264" cy="594360"/>
+          </a:xfrm>
+        </p:spPr>
+        <p:txBody>
+          <a:bodyPr lIns="91440" tIns="0" rIns="91440" bIns="0">
+            <a:normAutofit/>
+          </a:bodyPr>
           <a:lstStyle>
             <a:lvl1pPr marL="0" indent="0">
-              <a:buNone/>
-              <a:defRPr sz="1600"/>
+              <a:spcBef>
+                <a:spcPts val="0"/>
+              </a:spcBef>
+              <a:spcAft>
+                <a:spcPts val="600"/>
+              </a:spcAft>
+              <a:buNone/>
+              <a:defRPr sz="1500">
+                <a:solidFill>
+                  <a:srgbClr val="FFFFFF"/>
+                </a:solidFill>
+              </a:defRPr>
             </a:lvl1pPr>
             <a:lvl2pPr marL="457200" indent="0">
               <a:buNone/>
-              <a:defRPr sz="1400"/>
+              <a:defRPr sz="1200"/>
             </a:lvl2pPr>
             <a:lvl3pPr marL="914400" indent="0">
               <a:buNone/>
-              <a:defRPr sz="1200"/>
+              <a:defRPr sz="1000"/>
             </a:lvl3pPr>
             <a:lvl4pPr marL="1371600" indent="0">
               <a:buNone/>
-              <a:defRPr sz="1000"/>
+              <a:defRPr sz="900"/>
             </a:lvl4pPr>
             <a:lvl5pPr marL="1828800" indent="0">
               <a:buNone/>
-              <a:defRPr sz="1000"/>
+              <a:defRPr sz="900"/>
             </a:lvl5pPr>
             <a:lvl6pPr marL="2286000" indent="0">
               <a:buNone/>
-              <a:defRPr sz="1000"/>
+              <a:defRPr sz="900"/>
             </a:lvl6pPr>
             <a:lvl7pPr marL="2743200" indent="0">
               <a:buNone/>
-              <a:defRPr sz="1000"/>
+              <a:defRPr sz="900"/>
             </a:lvl7pPr>
             <a:lvl8pPr marL="3200400" indent="0">
               <a:buNone/>
-              <a:defRPr sz="1000"/>
+              <a:defRPr sz="900"/>
             </a:lvl8pPr>
             <a:lvl9pPr marL="3657600" indent="0">
               <a:buNone/>
-              <a:defRPr sz="1000"/>
+              <a:defRPr sz="900"/>
             </a:lvl9pPr>
           </a:lstStyle>
           <a:p>
@@ -2397,7 +3050,7 @@
     </p:spTree>
     <p:extLst>
       <p:ext uri="{BB962C8B-B14F-4D97-AF65-F5344CB8AC3E}">
-        <p14:creationId xmlns:p14="http://schemas.microsoft.com/office/powerpoint/2010/main" val="1707341459"/>
+        <p14:creationId xmlns:p14="http://schemas.microsoft.com/office/powerpoint/2010/main" val="3924264055"/>
       </p:ext>
     </p:extLst>
   </p:cSld>
@@ -2431,127 +3084,200 @@
       </p:grpSpPr>
       <p:sp>
         <p:nvSpPr>
-          <p:cNvPr id="2" name="Title Placeholder 1"/>
-          <p:cNvSpPr>
-            <a:spLocks noGrp="1"/>
-          </p:cNvSpPr>
-          <p:nvPr>
-            <p:ph type="title"/>
-          </p:nvPr>
+          <p:cNvPr id="7" name="Rectangle 6"/>
+          <p:cNvSpPr/>
+          <p:nvPr/>
         </p:nvSpPr>
         <p:spPr>
           <a:xfrm>
-            <a:off x="838200" y="365125"/>
-            <a:ext cx="10515600" cy="1325563"/>
+            <a:off x="1" y="6400800"/>
+            <a:ext cx="12192000" cy="457200"/>
           </a:xfrm>
           <a:prstGeom prst="rect">
             <a:avLst/>
           </a:prstGeom>
-        </p:spPr>
-        <p:txBody>
-          <a:bodyPr vert="horz" lIns="91440" tIns="45720" rIns="91440" bIns="45720" rtlCol="0" anchor="ctr">
-            <a:normAutofit/>
-          </a:bodyPr>
-          <a:lstStyle/>
-          <a:p>
-            <a:r>
-              <a:rPr lang="en-US"/>
-              <a:t>Click to edit Master title style</a:t>
-            </a:r>
-            <a:endParaRPr lang="en-US"/>
-          </a:p>
-        </p:txBody>
-      </p:sp>
-      <p:sp>
-        <p:nvSpPr>
-          <p:cNvPr id="3" name="Text Placeholder 2"/>
-          <p:cNvSpPr>
-            <a:spLocks noGrp="1"/>
-          </p:cNvSpPr>
-          <p:nvPr>
-            <p:ph type="body" idx="1"/>
-          </p:nvPr>
+          <a:solidFill>
+            <a:schemeClr val="accent2"/>
+          </a:solidFill>
+          <a:ln>
+            <a:noFill/>
+          </a:ln>
+        </p:spPr>
+        <p:style>
+          <a:lnRef idx="2">
+            <a:schemeClr val="accent1">
+              <a:shade val="50000"/>
+            </a:schemeClr>
+          </a:lnRef>
+          <a:fillRef idx="1">
+            <a:schemeClr val="accent1"/>
+          </a:fillRef>
+          <a:effectRef idx="0">
+            <a:schemeClr val="accent1"/>
+          </a:effectRef>
+          <a:fontRef idx="minor">
+            <a:schemeClr val="lt1"/>
+          </a:fontRef>
+        </p:style>
+      </p:sp>
+      <p:sp>
+        <p:nvSpPr>
+          <p:cNvPr id="9" name="Rectangle 8"/>
+          <p:cNvSpPr/>
+          <p:nvPr/>
         </p:nvSpPr>
         <p:spPr>
           <a:xfrm>
-            <a:off x="838200" y="1825625"/>
-            <a:ext cx="10515600" cy="4351338"/>
+            <a:off x="0" y="6334316"/>
+            <a:ext cx="12192001" cy="65998"/>
           </a:xfrm>
           <a:prstGeom prst="rect">
             <a:avLst/>
           </a:prstGeom>
-        </p:spPr>
-        <p:txBody>
-          <a:bodyPr vert="horz" lIns="91440" tIns="45720" rIns="91440" bIns="45720" rtlCol="0">
-            <a:normAutofit/>
-          </a:bodyPr>
-          <a:lstStyle/>
-          <a:p>
-            <a:pPr lvl="0"/>
-            <a:r>
-              <a:rPr lang="en-US"/>
-              <a:t>Edit Master text styles</a:t>
-            </a:r>
-          </a:p>
-          <a:p>
-            <a:pPr lvl="1"/>
-            <a:r>
-              <a:rPr lang="en-US"/>
-              <a:t>Second level</a:t>
-            </a:r>
-          </a:p>
-          <a:p>
-            <a:pPr lvl="2"/>
-            <a:r>
-              <a:rPr lang="en-US"/>
-              <a:t>Third level</a:t>
-            </a:r>
-          </a:p>
-          <a:p>
-            <a:pPr lvl="3"/>
-            <a:r>
-              <a:rPr lang="en-US"/>
-              <a:t>Fourth level</a:t>
-            </a:r>
-          </a:p>
-          <a:p>
-            <a:pPr lvl="4"/>
-            <a:r>
-              <a:rPr lang="en-US"/>
-              <a:t>Fifth level</a:t>
-            </a:r>
-            <a:endParaRPr lang="en-US"/>
-          </a:p>
-        </p:txBody>
-      </p:sp>
-      <p:sp>
-        <p:nvSpPr>
-          <p:cNvPr id="4" name="Date Placeholder 3"/>
-          <p:cNvSpPr>
-            <a:spLocks noGrp="1"/>
-          </p:cNvSpPr>
-          <p:nvPr>
-            <p:ph type="dt" sz="half" idx="2"/>
+          <a:solidFill>
+            <a:schemeClr val="accent1"/>
+          </a:solidFill>
+          <a:ln>
+            <a:noFill/>
+          </a:ln>
+        </p:spPr>
+        <p:style>
+          <a:lnRef idx="2">
+            <a:schemeClr val="accent1">
+              <a:shade val="50000"/>
+            </a:schemeClr>
+          </a:lnRef>
+          <a:fillRef idx="1">
+            <a:schemeClr val="accent1"/>
+          </a:fillRef>
+          <a:effectRef idx="0">
+            <a:schemeClr val="accent1"/>
+          </a:effectRef>
+          <a:fontRef idx="minor">
+            <a:schemeClr val="lt1"/>
+          </a:fontRef>
+        </p:style>
+      </p:sp>
+      <p:sp>
+        <p:nvSpPr>
+          <p:cNvPr id="2" name="Title Placeholder 1"/>
+          <p:cNvSpPr>
+            <a:spLocks noGrp="1"/>
+          </p:cNvSpPr>
+          <p:nvPr>
+            <p:ph type="title"/>
           </p:nvPr>
         </p:nvSpPr>
         <p:spPr>
           <a:xfrm>
-            <a:off x="838200" y="6356350"/>
-            <a:ext cx="2743200" cy="365125"/>
+            <a:off x="1097280" y="286603"/>
+            <a:ext cx="10058400" cy="1450757"/>
           </a:xfrm>
           <a:prstGeom prst="rect">
             <a:avLst/>
           </a:prstGeom>
         </p:spPr>
         <p:txBody>
+          <a:bodyPr vert="horz" lIns="91440" tIns="45720" rIns="91440" bIns="45720" rtlCol="0" anchor="b">
+            <a:normAutofit/>
+          </a:bodyPr>
+          <a:lstStyle/>
+          <a:p>
+            <a:r>
+              <a:rPr lang="en-US"/>
+              <a:t>Click to edit Master title style</a:t>
+            </a:r>
+            <a:endParaRPr lang="en-US" dirty="0"/>
+          </a:p>
+        </p:txBody>
+      </p:sp>
+      <p:sp>
+        <p:nvSpPr>
+          <p:cNvPr id="3" name="Text Placeholder 2"/>
+          <p:cNvSpPr>
+            <a:spLocks noGrp="1"/>
+          </p:cNvSpPr>
+          <p:nvPr>
+            <p:ph type="body" idx="1"/>
+          </p:nvPr>
+        </p:nvSpPr>
+        <p:spPr>
+          <a:xfrm>
+            <a:off x="1097280" y="1845734"/>
+            <a:ext cx="10058400" cy="4023360"/>
+          </a:xfrm>
+          <a:prstGeom prst="rect">
+            <a:avLst/>
+          </a:prstGeom>
+        </p:spPr>
+        <p:txBody>
+          <a:bodyPr vert="horz" lIns="0" tIns="45720" rIns="0" bIns="45720" rtlCol="0">
+            <a:normAutofit/>
+          </a:bodyPr>
+          <a:lstStyle/>
+          <a:p>
+            <a:pPr lvl="0"/>
+            <a:r>
+              <a:rPr lang="en-US" dirty="0"/>
+              <a:t>Edit Master text styles</a:t>
+            </a:r>
+          </a:p>
+          <a:p>
+            <a:pPr lvl="1"/>
+            <a:r>
+              <a:rPr lang="en-US" dirty="0"/>
+              <a:t>Second level</a:t>
+            </a:r>
+          </a:p>
+          <a:p>
+            <a:pPr lvl="2"/>
+            <a:r>
+              <a:rPr lang="en-US" dirty="0"/>
+              <a:t>Third level</a:t>
+            </a:r>
+          </a:p>
+          <a:p>
+            <a:pPr lvl="3"/>
+            <a:r>
+              <a:rPr lang="en-US" dirty="0"/>
+              <a:t>Fourth level</a:t>
+            </a:r>
+          </a:p>
+          <a:p>
+            <a:pPr lvl="4"/>
+            <a:r>
+              <a:rPr lang="en-US" dirty="0"/>
+              <a:t>Fifth level</a:t>
+            </a:r>
+          </a:p>
+        </p:txBody>
+      </p:sp>
+      <p:sp>
+        <p:nvSpPr>
+          <p:cNvPr id="4" name="Date Placeholder 3"/>
+          <p:cNvSpPr>
+            <a:spLocks noGrp="1"/>
+          </p:cNvSpPr>
+          <p:nvPr>
+            <p:ph type="dt" sz="half" idx="2"/>
+          </p:nvPr>
+        </p:nvSpPr>
+        <p:spPr>
+          <a:xfrm>
+            <a:off x="1097280" y="6459785"/>
+            <a:ext cx="2472271" cy="365125"/>
+          </a:xfrm>
+          <a:prstGeom prst="rect">
+            <a:avLst/>
+          </a:prstGeom>
+        </p:spPr>
+        <p:txBody>
           <a:bodyPr vert="horz" lIns="91440" tIns="45720" rIns="91440" bIns="45720" rtlCol="0" anchor="ctr"/>
           <a:lstStyle>
             <a:lvl1pPr algn="l">
-              <a:defRPr sz="1200">
+              <a:defRPr sz="900">
                 <a:solidFill>
-                  <a:schemeClr val="tx1">
-                    <a:tint val="75000"/>
-                  </a:schemeClr>
+                  <a:srgbClr val="FFFFFF"/>
                 </a:solidFill>
               </a:defRPr>
             </a:lvl1pPr>
@@ -2577,8 +3303,8 @@
         </p:nvSpPr>
         <p:spPr>
           <a:xfrm>
-            <a:off x="4038600" y="6356350"/>
-            <a:ext cx="4114800" cy="365125"/>
+            <a:off x="3686185" y="6459785"/>
+            <a:ext cx="4822804" cy="365125"/>
           </a:xfrm>
           <a:prstGeom prst="rect">
             <a:avLst/>
@@ -2588,17 +3314,15 @@
           <a:bodyPr vert="horz" lIns="91440" tIns="45720" rIns="91440" bIns="45720" rtlCol="0" anchor="ctr"/>
           <a:lstStyle>
             <a:lvl1pPr algn="ctr">
-              <a:defRPr sz="1200">
+              <a:defRPr sz="900" cap="none" baseline="0">
                 <a:solidFill>
-                  <a:schemeClr val="tx1">
-                    <a:tint val="75000"/>
-                  </a:schemeClr>
+                  <a:srgbClr val="FFFFFF"/>
                 </a:solidFill>
               </a:defRPr>
             </a:lvl1pPr>
           </a:lstStyle>
           <a:p>
-            <a:endParaRPr lang="en-US"/>
+            <a:endParaRPr lang="en-US" dirty="0"/>
           </a:p>
         </p:txBody>
       </p:sp>
@@ -2614,8 +3338,8 @@
         </p:nvSpPr>
         <p:spPr>
           <a:xfrm>
-            <a:off x="8610600" y="6356350"/>
-            <a:ext cx="2743200" cy="365125"/>
+            <a:off x="9900458" y="6459785"/>
+            <a:ext cx="1312025" cy="365125"/>
           </a:xfrm>
           <a:prstGeom prst="rect">
             <a:avLst/>
@@ -2625,11 +3349,9 @@
           <a:bodyPr vert="horz" lIns="91440" tIns="45720" rIns="91440" bIns="45720" rtlCol="0" anchor="ctr"/>
           <a:lstStyle>
             <a:lvl1pPr algn="r">
-              <a:defRPr sz="1200">
+              <a:defRPr sz="1050">
                 <a:solidFill>
-                  <a:schemeClr val="tx1">
-                    <a:tint val="75000"/>
-                  </a:schemeClr>
+                  <a:srgbClr val="FFFFFF"/>
                 </a:solidFill>
               </a:defRPr>
             </a:lvl1pPr>
@@ -2643,40 +3365,81 @@
           </a:p>
         </p:txBody>
       </p:sp>
+      <p:cxnSp>
+        <p:nvCxnSpPr>
+          <p:cNvPr id="10" name="Straight Connector 9"/>
+          <p:cNvCxnSpPr/>
+          <p:nvPr/>
+        </p:nvCxnSpPr>
+        <p:spPr>
+          <a:xfrm>
+            <a:off x="1193532" y="1737845"/>
+            <a:ext cx="9966960" cy="0"/>
+          </a:xfrm>
+          <a:prstGeom prst="line">
+            <a:avLst/>
+          </a:prstGeom>
+          <a:ln w="6350">
+            <a:solidFill>
+              <a:schemeClr val="tx1">
+                <a:lumMod val="50000"/>
+                <a:lumOff val="50000"/>
+              </a:schemeClr>
+            </a:solidFill>
+          </a:ln>
+        </p:spPr>
+        <p:style>
+          <a:lnRef idx="1">
+            <a:schemeClr val="accent1"/>
+          </a:lnRef>
+          <a:fillRef idx="0">
+            <a:schemeClr val="accent1"/>
+          </a:fillRef>
+          <a:effectRef idx="0">
+            <a:schemeClr val="accent1"/>
+          </a:effectRef>
+          <a:fontRef idx="minor">
+            <a:schemeClr val="tx1"/>
+          </a:fontRef>
+        </p:style>
+      </p:cxnSp>
     </p:spTree>
     <p:extLst>
       <p:ext uri="{BB962C8B-B14F-4D97-AF65-F5344CB8AC3E}">
-        <p14:creationId xmlns:p14="http://schemas.microsoft.com/office/powerpoint/2010/main" val="494737745"/>
+        <p14:creationId xmlns:p14="http://schemas.microsoft.com/office/powerpoint/2010/main" val="2154772577"/>
       </p:ext>
     </p:extLst>
   </p:cSld>
   <p:clrMap bg1="lt1" tx1="dk1" bg2="lt2" tx2="dk2" accent1="accent1" accent2="accent2" accent3="accent3" accent4="accent4" accent5="accent5" accent6="accent6" hlink="hlink" folHlink="folHlink"/>
   <p:sldLayoutIdLst>
-    <p:sldLayoutId id="2147483649" r:id="rId1"/>
-    <p:sldLayoutId id="2147483650" r:id="rId2"/>
-    <p:sldLayoutId id="2147483651" r:id="rId3"/>
-    <p:sldLayoutId id="2147483652" r:id="rId4"/>
-    <p:sldLayoutId id="2147483653" r:id="rId5"/>
-    <p:sldLayoutId id="2147483654" r:id="rId6"/>
-    <p:sldLayoutId id="2147483655" r:id="rId7"/>
-    <p:sldLayoutId id="2147483656" r:id="rId8"/>
-    <p:sldLayoutId id="2147483657" r:id="rId9"/>
-    <p:sldLayoutId id="2147483658" r:id="rId10"/>
-    <p:sldLayoutId id="2147483659" r:id="rId11"/>
+    <p:sldLayoutId id="2147483697" r:id="rId1"/>
+    <p:sldLayoutId id="2147483698" r:id="rId2"/>
+    <p:sldLayoutId id="2147483699" r:id="rId3"/>
+    <p:sldLayoutId id="2147483700" r:id="rId4"/>
+    <p:sldLayoutId id="2147483701" r:id="rId5"/>
+    <p:sldLayoutId id="2147483702" r:id="rId6"/>
+    <p:sldLayoutId id="2147483703" r:id="rId7"/>
+    <p:sldLayoutId id="2147483704" r:id="rId8"/>
+    <p:sldLayoutId id="2147483705" r:id="rId9"/>
+    <p:sldLayoutId id="2147483706" r:id="rId10"/>
+    <p:sldLayoutId id="2147483707" r:id="rId11"/>
   </p:sldLayoutIdLst>
   <p:txStyles>
     <p:titleStyle>
       <a:lvl1pPr algn="l" defTabSz="914400" rtl="0" eaLnBrk="1" latinLnBrk="0" hangingPunct="1">
         <a:lnSpc>
-          <a:spcPct val="90000"/>
+          <a:spcPct val="85000"/>
         </a:lnSpc>
         <a:spcBef>
           <a:spcPct val="0"/>
         </a:spcBef>
         <a:buNone/>
-        <a:defRPr sz="4400" kern="1200">
+        <a:defRPr sz="4800" kern="1200" spc="-50" baseline="0">
           <a:solidFill>
-            <a:schemeClr val="tx1"/>
+            <a:schemeClr val="tx1">
+              <a:lumMod val="75000"/>
+              <a:lumOff val="25000"/>
+            </a:schemeClr>
           </a:solidFill>
           <a:latin typeface="+mj-lt"/>
           <a:ea typeface="+mj-ea"/>
@@ -2685,162 +3448,244 @@
       </a:lvl1pPr>
     </p:titleStyle>
     <p:bodyStyle>
-      <a:lvl1pPr marL="228600" indent="-228600" algn="l" defTabSz="914400" rtl="0" eaLnBrk="1" latinLnBrk="0" hangingPunct="1">
+      <a:lvl1pPr marL="225425" indent="-166688" algn="l" defTabSz="914400" rtl="0" eaLnBrk="1" latinLnBrk="0" hangingPunct="1">
         <a:lnSpc>
           <a:spcPct val="90000"/>
         </a:lnSpc>
         <a:spcBef>
-          <a:spcPts val="1000"/>
+          <a:spcPts val="1200"/>
         </a:spcBef>
+        <a:spcAft>
+          <a:spcPts val="200"/>
+        </a:spcAft>
+        <a:buClr>
+          <a:schemeClr val="accent1"/>
+        </a:buClr>
+        <a:buSzPct val="100000"/>
         <a:buFont typeface="Arial" panose="020B0604020202020204" pitchFamily="34" charset="0"/>
         <a:buChar char="•"/>
-        <a:defRPr sz="2800" kern="1200">
+        <a:defRPr sz="3200" kern="1200">
           <a:solidFill>
-            <a:schemeClr val="tx1"/>
+            <a:schemeClr val="tx1">
+              <a:lumMod val="75000"/>
+              <a:lumOff val="25000"/>
+            </a:schemeClr>
           </a:solidFill>
           <a:latin typeface="+mn-lt"/>
           <a:ea typeface="+mn-ea"/>
           <a:cs typeface="+mn-cs"/>
         </a:defRPr>
       </a:lvl1pPr>
-      <a:lvl2pPr marL="685800" indent="-228600" algn="l" defTabSz="914400" rtl="0" eaLnBrk="1" latinLnBrk="0" hangingPunct="1">
+      <a:lvl2pPr marL="384048" indent="-182880" algn="l" defTabSz="914400" rtl="0" eaLnBrk="1" latinLnBrk="0" hangingPunct="1">
         <a:lnSpc>
           <a:spcPct val="90000"/>
         </a:lnSpc>
         <a:spcBef>
-          <a:spcPts val="500"/>
+          <a:spcPts val="200"/>
         </a:spcBef>
-        <a:buFont typeface="Arial" panose="020B0604020202020204" pitchFamily="34" charset="0"/>
-        <a:buChar char="•"/>
-        <a:defRPr sz="2400" kern="1200">
+        <a:spcAft>
+          <a:spcPts val="400"/>
+        </a:spcAft>
+        <a:buClr>
+          <a:schemeClr val="accent1"/>
+        </a:buClr>
+        <a:buFont typeface="Calibri" pitchFamily="34" charset="0"/>
+        <a:buChar char="◦"/>
+        <a:defRPr sz="2800" kern="1200">
           <a:solidFill>
-            <a:schemeClr val="tx1"/>
+            <a:schemeClr val="tx1">
+              <a:lumMod val="75000"/>
+              <a:lumOff val="25000"/>
+            </a:schemeClr>
           </a:solidFill>
           <a:latin typeface="+mn-lt"/>
           <a:ea typeface="+mn-ea"/>
           <a:cs typeface="+mn-cs"/>
         </a:defRPr>
       </a:lvl2pPr>
-      <a:lvl3pPr marL="1143000" indent="-228600" algn="l" defTabSz="914400" rtl="0" eaLnBrk="1" latinLnBrk="0" hangingPunct="1">
+      <a:lvl3pPr marL="566928" indent="-182880" algn="l" defTabSz="914400" rtl="0" eaLnBrk="1" latinLnBrk="0" hangingPunct="1">
         <a:lnSpc>
           <a:spcPct val="90000"/>
         </a:lnSpc>
         <a:spcBef>
-          <a:spcPts val="500"/>
+          <a:spcPts val="200"/>
         </a:spcBef>
-        <a:buFont typeface="Arial" panose="020B0604020202020204" pitchFamily="34" charset="0"/>
-        <a:buChar char="•"/>
+        <a:spcAft>
+          <a:spcPts val="400"/>
+        </a:spcAft>
+        <a:buClr>
+          <a:schemeClr val="accent1"/>
+        </a:buClr>
+        <a:buFont typeface="Calibri" pitchFamily="34" charset="0"/>
+        <a:buChar char="◦"/>
         <a:defRPr sz="2000" kern="1200">
           <a:solidFill>
-            <a:schemeClr val="tx1"/>
+            <a:schemeClr val="tx1">
+              <a:lumMod val="75000"/>
+              <a:lumOff val="25000"/>
+            </a:schemeClr>
           </a:solidFill>
           <a:latin typeface="+mn-lt"/>
           <a:ea typeface="+mn-ea"/>
           <a:cs typeface="+mn-cs"/>
         </a:defRPr>
       </a:lvl3pPr>
-      <a:lvl4pPr marL="1600200" indent="-228600" algn="l" defTabSz="914400" rtl="0" eaLnBrk="1" latinLnBrk="0" hangingPunct="1">
+      <a:lvl4pPr marL="749808" indent="-182880" algn="l" defTabSz="914400" rtl="0" eaLnBrk="1" latinLnBrk="0" hangingPunct="1">
         <a:lnSpc>
           <a:spcPct val="90000"/>
         </a:lnSpc>
         <a:spcBef>
-          <a:spcPts val="500"/>
+          <a:spcPts val="200"/>
         </a:spcBef>
-        <a:buFont typeface="Arial" panose="020B0604020202020204" pitchFamily="34" charset="0"/>
-        <a:buChar char="•"/>
-        <a:defRPr sz="1800" kern="1200">
+        <a:spcAft>
+          <a:spcPts val="400"/>
+        </a:spcAft>
+        <a:buClr>
+          <a:schemeClr val="accent1"/>
+        </a:buClr>
+        <a:buFont typeface="Calibri" pitchFamily="34" charset="0"/>
+        <a:buChar char="◦"/>
+        <a:defRPr sz="2000" kern="1200">
           <a:solidFill>
-            <a:schemeClr val="tx1"/>
+            <a:schemeClr val="tx1">
+              <a:lumMod val="75000"/>
+              <a:lumOff val="25000"/>
+            </a:schemeClr>
           </a:solidFill>
           <a:latin typeface="+mn-lt"/>
           <a:ea typeface="+mn-ea"/>
           <a:cs typeface="+mn-cs"/>
         </a:defRPr>
       </a:lvl4pPr>
-      <a:lvl5pPr marL="2057400" indent="-228600" algn="l" defTabSz="914400" rtl="0" eaLnBrk="1" latinLnBrk="0" hangingPunct="1">
+      <a:lvl5pPr marL="932688" indent="-182880" algn="l" defTabSz="914400" rtl="0" eaLnBrk="1" latinLnBrk="0" hangingPunct="1">
         <a:lnSpc>
           <a:spcPct val="90000"/>
         </a:lnSpc>
         <a:spcBef>
-          <a:spcPts val="500"/>
+          <a:spcPts val="200"/>
         </a:spcBef>
-        <a:buFont typeface="Arial" panose="020B0604020202020204" pitchFamily="34" charset="0"/>
-        <a:buChar char="•"/>
-        <a:defRPr sz="1800" kern="1200">
+        <a:spcAft>
+          <a:spcPts val="400"/>
+        </a:spcAft>
+        <a:buClr>
+          <a:schemeClr val="accent1"/>
+        </a:buClr>
+        <a:buFont typeface="Calibri" pitchFamily="34" charset="0"/>
+        <a:buChar char="◦"/>
+        <a:defRPr sz="2000" kern="1200">
           <a:solidFill>
-            <a:schemeClr val="tx1"/>
+            <a:schemeClr val="tx1">
+              <a:lumMod val="75000"/>
+              <a:lumOff val="25000"/>
+            </a:schemeClr>
           </a:solidFill>
           <a:latin typeface="+mn-lt"/>
           <a:ea typeface="+mn-ea"/>
           <a:cs typeface="+mn-cs"/>
         </a:defRPr>
       </a:lvl5pPr>
-      <a:lvl6pPr marL="2514600" indent="-228600" algn="l" defTabSz="914400" rtl="0" eaLnBrk="1" latinLnBrk="0" hangingPunct="1">
+      <a:lvl6pPr marL="1100000" indent="-228600" algn="l" defTabSz="914400" rtl="0" eaLnBrk="1" latinLnBrk="0" hangingPunct="1">
         <a:lnSpc>
           <a:spcPct val="90000"/>
         </a:lnSpc>
         <a:spcBef>
-          <a:spcPts val="500"/>
+          <a:spcPts val="200"/>
         </a:spcBef>
-        <a:buFont typeface="Arial" panose="020B0604020202020204" pitchFamily="34" charset="0"/>
-        <a:buChar char="•"/>
-        <a:defRPr sz="1800" kern="1200">
+        <a:spcAft>
+          <a:spcPts val="400"/>
+        </a:spcAft>
+        <a:buClr>
+          <a:schemeClr val="accent1"/>
+        </a:buClr>
+        <a:buFont typeface="Calibri" pitchFamily="34" charset="0"/>
+        <a:buChar char="◦"/>
+        <a:defRPr sz="1400" kern="1200">
           <a:solidFill>
-            <a:schemeClr val="tx1"/>
+            <a:schemeClr val="tx1">
+              <a:lumMod val="75000"/>
+              <a:lumOff val="25000"/>
+            </a:schemeClr>
           </a:solidFill>
           <a:latin typeface="+mn-lt"/>
           <a:ea typeface="+mn-ea"/>
           <a:cs typeface="+mn-cs"/>
         </a:defRPr>
       </a:lvl6pPr>
-      <a:lvl7pPr marL="2971800" indent="-228600" algn="l" defTabSz="914400" rtl="0" eaLnBrk="1" latinLnBrk="0" hangingPunct="1">
+      <a:lvl7pPr marL="1300000" indent="-228600" algn="l" defTabSz="914400" rtl="0" eaLnBrk="1" latinLnBrk="0" hangingPunct="1">
         <a:lnSpc>
           <a:spcPct val="90000"/>
         </a:lnSpc>
         <a:spcBef>
-          <a:spcPts val="500"/>
+          <a:spcPts val="200"/>
         </a:spcBef>
-        <a:buFont typeface="Arial" panose="020B0604020202020204" pitchFamily="34" charset="0"/>
-        <a:buChar char="•"/>
-        <a:defRPr sz="1800" kern="1200">
+        <a:spcAft>
+          <a:spcPts val="400"/>
+        </a:spcAft>
+        <a:buClr>
+          <a:schemeClr val="accent1"/>
+        </a:buClr>
+        <a:buFont typeface="Calibri" pitchFamily="34" charset="0"/>
+        <a:buChar char="◦"/>
+        <a:defRPr sz="1400" kern="1200">
           <a:solidFill>
-            <a:schemeClr val="tx1"/>
+            <a:schemeClr val="tx1">
+              <a:lumMod val="75000"/>
+              <a:lumOff val="25000"/>
+            </a:schemeClr>
           </a:solidFill>
           <a:latin typeface="+mn-lt"/>
           <a:ea typeface="+mn-ea"/>
           <a:cs typeface="+mn-cs"/>
         </a:defRPr>
       </a:lvl7pPr>
-      <a:lvl8pPr marL="3429000" indent="-228600" algn="l" defTabSz="914400" rtl="0" eaLnBrk="1" latinLnBrk="0" hangingPunct="1">
+      <a:lvl8pPr marL="1500000" indent="-228600" algn="l" defTabSz="914400" rtl="0" eaLnBrk="1" latinLnBrk="0" hangingPunct="1">
         <a:lnSpc>
           <a:spcPct val="90000"/>
         </a:lnSpc>
         <a:spcBef>
-          <a:spcPts val="500"/>
+          <a:spcPts val="200"/>
         </a:spcBef>
-        <a:buFont typeface="Arial" panose="020B0604020202020204" pitchFamily="34" charset="0"/>
-        <a:buChar char="•"/>
-        <a:defRPr sz="1800" kern="1200">
+        <a:spcAft>
+          <a:spcPts val="400"/>
+        </a:spcAft>
+        <a:buClr>
+          <a:schemeClr val="accent1"/>
+        </a:buClr>
+        <a:buFont typeface="Calibri" pitchFamily="34" charset="0"/>
+        <a:buChar char="◦"/>
+        <a:defRPr sz="1400" kern="1200">
           <a:solidFill>
-            <a:schemeClr val="tx1"/>
+            <a:schemeClr val="tx1">
+              <a:lumMod val="75000"/>
+              <a:lumOff val="25000"/>
+            </a:schemeClr>
           </a:solidFill>
           <a:latin typeface="+mn-lt"/>
           <a:ea typeface="+mn-ea"/>
           <a:cs typeface="+mn-cs"/>
         </a:defRPr>
       </a:lvl8pPr>
-      <a:lvl9pPr marL="3886200" indent="-228600" algn="l" defTabSz="914400" rtl="0" eaLnBrk="1" latinLnBrk="0" hangingPunct="1">
+      <a:lvl9pPr marL="1700000" indent="-228600" algn="l" defTabSz="914400" rtl="0" eaLnBrk="1" latinLnBrk="0" hangingPunct="1">
         <a:lnSpc>
           <a:spcPct val="90000"/>
         </a:lnSpc>
         <a:spcBef>
-          <a:spcPts val="500"/>
+          <a:spcPts val="200"/>
         </a:spcBef>
-        <a:buFont typeface="Arial" panose="020B0604020202020204" pitchFamily="34" charset="0"/>
-        <a:buChar char="•"/>
-        <a:defRPr sz="1800" kern="1200">
+        <a:spcAft>
+          <a:spcPts val="400"/>
+        </a:spcAft>
+        <a:buClr>
+          <a:schemeClr val="accent1"/>
+        </a:buClr>
+        <a:buFont typeface="Calibri" pitchFamily="34" charset="0"/>
+        <a:buChar char="◦"/>
+        <a:defRPr sz="1400" kern="1200">
           <a:solidFill>
-            <a:schemeClr val="tx1"/>
+            <a:schemeClr val="tx1">
+              <a:lumMod val="75000"/>
+              <a:lumOff val="25000"/>
+            </a:schemeClr>
           </a:solidFill>
           <a:latin typeface="+mn-lt"/>
           <a:ea typeface="+mn-ea"/>
@@ -2964,6 +3809,48 @@
           <a:chExt cx="0" cy="0"/>
         </a:xfrm>
       </p:grpSpPr>
+      <p:pic>
+        <p:nvPicPr>
+          <p:cNvPr id="1030" name="Picture 6" descr="movies matrix code system failure Wallpaper HD"/>
+          <p:cNvPicPr>
+            <a:picLocks noChangeAspect="1" noChangeArrowheads="1"/>
+          </p:cNvPicPr>
+          <p:nvPr/>
+        </p:nvPicPr>
+        <p:blipFill>
+          <a:blip r:embed="rId2">
+            <a:lum bright="70000" contrast="-70000"/>
+            <a:extLst>
+              <a:ext uri="{28A0092B-C50C-407E-A947-70E740481C1C}">
+                <a14:useLocalDpi xmlns:a14="http://schemas.microsoft.com/office/drawing/2010/main" val="0"/>
+              </a:ext>
+            </a:extLst>
+          </a:blip>
+          <a:srcRect/>
+          <a:stretch>
+            <a:fillRect/>
+          </a:stretch>
+        </p:blipFill>
+        <p:spPr bwMode="auto">
+          <a:xfrm>
+            <a:off x="-1" y="0"/>
+            <a:ext cx="12192001" cy="6337300"/>
+          </a:xfrm>
+          <a:prstGeom prst="rect">
+            <a:avLst/>
+          </a:prstGeom>
+          <a:noFill/>
+          <a:extLst>
+            <a:ext uri="{909E8E84-426E-40DD-AFC4-6F175D3DCCD1}">
+              <a14:hiddenFill xmlns:a14="http://schemas.microsoft.com/office/drawing/2010/main">
+                <a:solidFill>
+                  <a:srgbClr val="FFFFFF"/>
+                </a:solidFill>
+              </a14:hiddenFill>
+            </a:ext>
+          </a:extLst>
+        </p:spPr>
+      </p:pic>
       <p:sp>
         <p:nvSpPr>
           <p:cNvPr id="2" name="Title 1"/>
@@ -2976,10 +3863,15 @@
         </p:nvSpPr>
         <p:spPr/>
         <p:txBody>
-          <a:bodyPr/>
-          <a:lstStyle/>
-          <a:p>
-            <a:endParaRPr lang="en-US"/>
+          <a:bodyPr>
+            <a:normAutofit/>
+          </a:bodyPr>
+          <a:lstStyle/>
+          <a:p>
+            <a:r>
+              <a:rPr lang="en-US" dirty="0"/>
+              <a:t>Developer-Module Networks &amp; Failure Prediction</a:t>
+            </a:r>
           </a:p>
         </p:txBody>
       </p:sp>
@@ -2993,15 +3885,144 @@
             <p:ph type="subTitle" idx="1"/>
           </p:nvPr>
         </p:nvSpPr>
-        <p:spPr/>
-        <p:txBody>
-          <a:bodyPr/>
-          <a:lstStyle/>
-          <a:p>
-            <a:endParaRPr lang="en-US"/>
-          </a:p>
-        </p:txBody>
-      </p:sp>
+        <p:spPr>
+          <a:xfrm>
+            <a:off x="868582" y="3983673"/>
+            <a:ext cx="10058400" cy="902959"/>
+          </a:xfrm>
+        </p:spPr>
+        <p:txBody>
+          <a:bodyPr>
+            <a:normAutofit lnSpcReduction="10000"/>
+          </a:bodyPr>
+          <a:lstStyle/>
+          <a:p>
+            <a:r>
+              <a:rPr lang="en-US" dirty="0">
+                <a:solidFill>
+                  <a:schemeClr val="tx1"/>
+                </a:solidFill>
+              </a:rPr>
+              <a:t>Bryan J Muscedere</a:t>
+            </a:r>
+          </a:p>
+          <a:p>
+            <a:r>
+              <a:rPr lang="en-US" dirty="0">
+                <a:solidFill>
+                  <a:schemeClr val="tx1"/>
+                </a:solidFill>
+              </a:rPr>
+              <a:t>Rafi </a:t>
+            </a:r>
+            <a:r>
+              <a:rPr lang="en-US" dirty="0" err="1">
+                <a:solidFill>
+                  <a:schemeClr val="tx1"/>
+                </a:solidFill>
+              </a:rPr>
+              <a:t>Turas</a:t>
+            </a:r>
+            <a:endParaRPr lang="en-US" dirty="0">
+              <a:solidFill>
+                <a:schemeClr val="tx1"/>
+              </a:solidFill>
+            </a:endParaRPr>
+          </a:p>
+        </p:txBody>
+      </p:sp>
+      <p:sp>
+        <p:nvSpPr>
+          <p:cNvPr id="5" name="Title 1"/>
+          <p:cNvSpPr txBox="1">
+            <a:spLocks/>
+          </p:cNvSpPr>
+          <p:nvPr/>
+        </p:nvSpPr>
+        <p:spPr>
+          <a:xfrm>
+            <a:off x="1065227" y="3106994"/>
+            <a:ext cx="10058400" cy="590738"/>
+          </a:xfrm>
+          <a:prstGeom prst="rect">
+            <a:avLst/>
+          </a:prstGeom>
+        </p:spPr>
+        <p:txBody>
+          <a:bodyPr vert="horz" lIns="91440" tIns="45720" rIns="91440" bIns="45720" rtlCol="0" anchor="b">
+            <a:normAutofit fontScale="97500" lnSpcReduction="10000"/>
+          </a:bodyPr>
+          <a:lstStyle>
+            <a:lvl1pPr algn="ctr" defTabSz="914400" rtl="0" eaLnBrk="1" latinLnBrk="0" hangingPunct="1">
+              <a:lnSpc>
+                <a:spcPct val="85000"/>
+              </a:lnSpc>
+              <a:spcBef>
+                <a:spcPct val="0"/>
+              </a:spcBef>
+              <a:buNone/>
+              <a:defRPr sz="6000" kern="1200" spc="-50" baseline="0">
+                <a:solidFill>
+                  <a:schemeClr val="tx1">
+                    <a:lumMod val="85000"/>
+                    <a:lumOff val="15000"/>
+                  </a:schemeClr>
+                </a:solidFill>
+                <a:latin typeface="+mj-lt"/>
+                <a:ea typeface="+mj-ea"/>
+                <a:cs typeface="+mj-cs"/>
+              </a:defRPr>
+            </a:lvl1pPr>
+          </a:lstStyle>
+          <a:p>
+            <a:r>
+              <a:rPr lang="en-US" sz="4000" dirty="0"/>
+              <a:t>Can They Really Be Valid Defect Predictors?</a:t>
+            </a:r>
+          </a:p>
+        </p:txBody>
+      </p:sp>
+      <p:pic>
+        <p:nvPicPr>
+          <p:cNvPr id="1028" name="Picture 4" descr="https://uwaterloo.ca/brand-guidelines/sites/ca.brand-guidelines/files/resize/uploads/images/universityofwaterloo_logo_horiz_rgb_0-300x120.png"/>
+          <p:cNvPicPr>
+            <a:picLocks noChangeAspect="1" noChangeArrowheads="1"/>
+          </p:cNvPicPr>
+          <p:nvPr/>
+        </p:nvPicPr>
+        <p:blipFill>
+          <a:blip r:embed="rId3">
+            <a:extLst>
+              <a:ext uri="{28A0092B-C50C-407E-A947-70E740481C1C}">
+                <a14:useLocalDpi xmlns:a14="http://schemas.microsoft.com/office/drawing/2010/main" val="0"/>
+              </a:ext>
+            </a:extLst>
+          </a:blip>
+          <a:srcRect/>
+          <a:stretch>
+            <a:fillRect/>
+          </a:stretch>
+        </p:blipFill>
+        <p:spPr bwMode="auto">
+          <a:xfrm>
+            <a:off x="-304800" y="4799750"/>
+            <a:ext cx="4594568" cy="1837829"/>
+          </a:xfrm>
+          <a:prstGeom prst="rect">
+            <a:avLst/>
+          </a:prstGeom>
+          <a:noFill/>
+          <a:extLst>
+            <a:ext uri="{909E8E84-426E-40DD-AFC4-6F175D3DCCD1}">
+              <a14:hiddenFill xmlns:a14="http://schemas.microsoft.com/office/drawing/2010/main">
+                <a:solidFill>
+                  <a:srgbClr val="FFFFFF"/>
+                </a:solidFill>
+              </a14:hiddenFill>
+            </a:ext>
+          </a:extLst>
+        </p:spPr>
+      </p:pic>
     </p:spTree>
     <p:extLst>
       <p:ext uri="{BB962C8B-B14F-4D97-AF65-F5344CB8AC3E}">
@@ -3015,55 +4036,1392 @@
 </p:sld>
 </file>
 
+<file path=ppt/slides/slide10.xml><?xml version="1.0" encoding="utf-8"?>
+<p:sld xmlns:a="http://schemas.openxmlformats.org/drawingml/2006/main" xmlns:r="http://schemas.openxmlformats.org/officeDocument/2006/relationships" xmlns:p="http://schemas.openxmlformats.org/presentationml/2006/main">
+  <p:cSld>
+    <p:spTree>
+      <p:nvGrpSpPr>
+        <p:cNvPr id="1" name=""/>
+        <p:cNvGrpSpPr/>
+        <p:nvPr/>
+      </p:nvGrpSpPr>
+      <p:grpSpPr>
+        <a:xfrm>
+          <a:off x="0" y="0"/>
+          <a:ext cx="0" cy="0"/>
+          <a:chOff x="0" y="0"/>
+          <a:chExt cx="0" cy="0"/>
+        </a:xfrm>
+      </p:grpSpPr>
+      <p:sp>
+        <p:nvSpPr>
+          <p:cNvPr id="2" name="Title 1"/>
+          <p:cNvSpPr>
+            <a:spLocks noGrp="1"/>
+          </p:cNvSpPr>
+          <p:nvPr>
+            <p:ph type="title"/>
+          </p:nvPr>
+        </p:nvSpPr>
+        <p:spPr/>
+        <p:txBody>
+          <a:bodyPr/>
+          <a:lstStyle/>
+          <a:p>
+            <a:r>
+              <a:rPr lang="en-US" dirty="0"/>
+              <a:t>Software Tool</a:t>
+            </a:r>
+          </a:p>
+        </p:txBody>
+      </p:sp>
+      <p:sp>
+        <p:nvSpPr>
+          <p:cNvPr id="3" name="Content Placeholder 2"/>
+          <p:cNvSpPr>
+            <a:spLocks noGrp="1"/>
+          </p:cNvSpPr>
+          <p:nvPr>
+            <p:ph idx="1"/>
+          </p:nvPr>
+        </p:nvSpPr>
+        <p:spPr/>
+        <p:txBody>
+          <a:bodyPr/>
+          <a:lstStyle/>
+          <a:p>
+            <a:r>
+              <a:rPr lang="en-US" dirty="0"/>
+              <a:t>An extra component that we started working on is a software tool.</a:t>
+            </a:r>
+          </a:p>
+          <a:p>
+            <a:pPr marL="58737" indent="0">
+              <a:buNone/>
+            </a:pPr>
+            <a:endParaRPr lang="en-US" dirty="0"/>
+          </a:p>
+        </p:txBody>
+      </p:sp>
+      <p:pic>
+        <p:nvPicPr>
+          <p:cNvPr id="5" name="Picture 4"/>
+          <p:cNvPicPr>
+            <a:picLocks noChangeAspect="1"/>
+          </p:cNvPicPr>
+          <p:nvPr/>
+        </p:nvPicPr>
+        <p:blipFill>
+          <a:blip r:embed="rId2">
+            <a:extLst>
+              <a:ext uri="{28A0092B-C50C-407E-A947-70E740481C1C}">
+                <a14:useLocalDpi xmlns:a14="http://schemas.microsoft.com/office/drawing/2010/main" val="0"/>
+              </a:ext>
+            </a:extLst>
+          </a:blip>
+          <a:stretch>
+            <a:fillRect/>
+          </a:stretch>
+        </p:blipFill>
+        <p:spPr>
+          <a:xfrm>
+            <a:off x="1148715" y="1845734"/>
+            <a:ext cx="9955530" cy="4349311"/>
+          </a:xfrm>
+          <a:prstGeom prst="rect">
+            <a:avLst/>
+          </a:prstGeom>
+        </p:spPr>
+      </p:pic>
+      <p:sp>
+        <p:nvSpPr>
+          <p:cNvPr id="6" name="Rectangle 5"/>
+          <p:cNvSpPr/>
+          <p:nvPr/>
+        </p:nvSpPr>
+        <p:spPr>
+          <a:xfrm>
+            <a:off x="1179871" y="1845734"/>
+            <a:ext cx="3087329" cy="2028176"/>
+          </a:xfrm>
+          <a:prstGeom prst="rect">
+            <a:avLst/>
+          </a:prstGeom>
+          <a:noFill/>
+          <a:ln w="63500"/>
+        </p:spPr>
+        <p:style>
+          <a:lnRef idx="2">
+            <a:schemeClr val="accent1">
+              <a:shade val="50000"/>
+            </a:schemeClr>
+          </a:lnRef>
+          <a:fillRef idx="1">
+            <a:schemeClr val="accent1"/>
+          </a:fillRef>
+          <a:effectRef idx="0">
+            <a:schemeClr val="accent1"/>
+          </a:effectRef>
+          <a:fontRef idx="minor">
+            <a:schemeClr val="lt1"/>
+          </a:fontRef>
+        </p:style>
+        <p:txBody>
+          <a:bodyPr rtlCol="0" anchor="ctr"/>
+          <a:lstStyle/>
+          <a:p>
+            <a:pPr algn="ctr"/>
+            <a:endParaRPr lang="en-US"/>
+          </a:p>
+        </p:txBody>
+      </p:sp>
+      <p:sp>
+        <p:nvSpPr>
+          <p:cNvPr id="7" name="TextBox 6"/>
+          <p:cNvSpPr txBox="1"/>
+          <p:nvPr/>
+        </p:nvSpPr>
+        <p:spPr>
+          <a:xfrm>
+            <a:off x="1334814" y="3993931"/>
+            <a:ext cx="2785241" cy="646331"/>
+          </a:xfrm>
+          <a:prstGeom prst="rect">
+            <a:avLst/>
+          </a:prstGeom>
+          <a:noFill/>
+        </p:spPr>
+        <p:txBody>
+          <a:bodyPr wrap="square" rtlCol="0">
+            <a:spAutoFit/>
+          </a:bodyPr>
+          <a:lstStyle/>
+          <a:p>
+            <a:pPr algn="ctr"/>
+            <a:r>
+              <a:rPr lang="en-US" dirty="0"/>
+              <a:t>In the future, we will look at additional data sources.</a:t>
+            </a:r>
+          </a:p>
+        </p:txBody>
+      </p:sp>
+    </p:spTree>
+    <p:extLst>
+      <p:ext uri="{BB962C8B-B14F-4D97-AF65-F5344CB8AC3E}">
+        <p14:creationId xmlns:p14="http://schemas.microsoft.com/office/powerpoint/2010/main" val="2383857231"/>
+      </p:ext>
+    </p:extLst>
+  </p:cSld>
+  <p:clrMapOvr>
+    <a:masterClrMapping/>
+  </p:clrMapOvr>
+  <p:timing>
+    <p:tnLst>
+      <p:par>
+        <p:cTn id="1" dur="indefinite" restart="never" nodeType="tmRoot">
+          <p:childTnLst>
+            <p:seq concurrent="1" nextAc="seek">
+              <p:cTn id="2" dur="indefinite" nodeType="mainSeq">
+                <p:childTnLst>
+                  <p:par>
+                    <p:cTn id="3" fill="hold">
+                      <p:stCondLst>
+                        <p:cond delay="indefinite"/>
+                      </p:stCondLst>
+                      <p:childTnLst>
+                        <p:par>
+                          <p:cTn id="4" fill="hold">
+                            <p:stCondLst>
+                              <p:cond delay="0"/>
+                            </p:stCondLst>
+                            <p:childTnLst>
+                              <p:par>
+                                <p:cTn id="5" presetID="1" presetClass="entr" presetSubtype="0" fill="hold" nodeType="clickEffect">
+                                  <p:stCondLst>
+                                    <p:cond delay="0"/>
+                                  </p:stCondLst>
+                                  <p:childTnLst>
+                                    <p:set>
+                                      <p:cBhvr>
+                                        <p:cTn id="6" dur="1" fill="hold">
+                                          <p:stCondLst>
+                                            <p:cond delay="0"/>
+                                          </p:stCondLst>
+                                        </p:cTn>
+                                        <p:tgtEl>
+                                          <p:spTgt spid="5"/>
+                                        </p:tgtEl>
+                                        <p:attrNameLst>
+                                          <p:attrName>style.visibility</p:attrName>
+                                        </p:attrNameLst>
+                                      </p:cBhvr>
+                                      <p:to>
+                                        <p:strVal val="visible"/>
+                                      </p:to>
+                                    </p:set>
+                                  </p:childTnLst>
+                                </p:cTn>
+                              </p:par>
+                            </p:childTnLst>
+                          </p:cTn>
+                        </p:par>
+                      </p:childTnLst>
+                    </p:cTn>
+                  </p:par>
+                  <p:par>
+                    <p:cTn id="7" fill="hold">
+                      <p:stCondLst>
+                        <p:cond delay="indefinite"/>
+                      </p:stCondLst>
+                      <p:childTnLst>
+                        <p:par>
+                          <p:cTn id="8" fill="hold">
+                            <p:stCondLst>
+                              <p:cond delay="0"/>
+                            </p:stCondLst>
+                            <p:childTnLst>
+                              <p:par>
+                                <p:cTn id="9" presetID="10" presetClass="entr" presetSubtype="0" fill="hold" grpId="0" nodeType="clickEffect">
+                                  <p:stCondLst>
+                                    <p:cond delay="0"/>
+                                  </p:stCondLst>
+                                  <p:childTnLst>
+                                    <p:set>
+                                      <p:cBhvr>
+                                        <p:cTn id="10" dur="1" fill="hold">
+                                          <p:stCondLst>
+                                            <p:cond delay="0"/>
+                                          </p:stCondLst>
+                                        </p:cTn>
+                                        <p:tgtEl>
+                                          <p:spTgt spid="7"/>
+                                        </p:tgtEl>
+                                        <p:attrNameLst>
+                                          <p:attrName>style.visibility</p:attrName>
+                                        </p:attrNameLst>
+                                      </p:cBhvr>
+                                      <p:to>
+                                        <p:strVal val="visible"/>
+                                      </p:to>
+                                    </p:set>
+                                    <p:animEffect transition="in" filter="fade">
+                                      <p:cBhvr>
+                                        <p:cTn id="11" dur="500"/>
+                                        <p:tgtEl>
+                                          <p:spTgt spid="7"/>
+                                        </p:tgtEl>
+                                      </p:cBhvr>
+                                    </p:animEffect>
+                                  </p:childTnLst>
+                                </p:cTn>
+                              </p:par>
+                              <p:par>
+                                <p:cTn id="12" presetID="10" presetClass="entr" presetSubtype="0" fill="hold" grpId="0" nodeType="withEffect">
+                                  <p:stCondLst>
+                                    <p:cond delay="0"/>
+                                  </p:stCondLst>
+                                  <p:childTnLst>
+                                    <p:set>
+                                      <p:cBhvr>
+                                        <p:cTn id="13" dur="1" fill="hold">
+                                          <p:stCondLst>
+                                            <p:cond delay="0"/>
+                                          </p:stCondLst>
+                                        </p:cTn>
+                                        <p:tgtEl>
+                                          <p:spTgt spid="6"/>
+                                        </p:tgtEl>
+                                        <p:attrNameLst>
+                                          <p:attrName>style.visibility</p:attrName>
+                                        </p:attrNameLst>
+                                      </p:cBhvr>
+                                      <p:to>
+                                        <p:strVal val="visible"/>
+                                      </p:to>
+                                    </p:set>
+                                    <p:animEffect transition="in" filter="fade">
+                                      <p:cBhvr>
+                                        <p:cTn id="14" dur="500"/>
+                                        <p:tgtEl>
+                                          <p:spTgt spid="6"/>
+                                        </p:tgtEl>
+                                      </p:cBhvr>
+                                    </p:animEffect>
+                                  </p:childTnLst>
+                                </p:cTn>
+                              </p:par>
+                            </p:childTnLst>
+                          </p:cTn>
+                        </p:par>
+                      </p:childTnLst>
+                    </p:cTn>
+                  </p:par>
+                </p:childTnLst>
+              </p:cTn>
+              <p:prevCondLst>
+                <p:cond evt="onPrev" delay="0">
+                  <p:tgtEl>
+                    <p:sldTgt/>
+                  </p:tgtEl>
+                </p:cond>
+              </p:prevCondLst>
+              <p:nextCondLst>
+                <p:cond evt="onNext" delay="0">
+                  <p:tgtEl>
+                    <p:sldTgt/>
+                  </p:tgtEl>
+                </p:cond>
+              </p:nextCondLst>
+            </p:seq>
+          </p:childTnLst>
+        </p:cTn>
+      </p:par>
+    </p:tnLst>
+    <p:bldLst>
+      <p:bldP spid="6" grpId="0" animBg="1"/>
+      <p:bldP spid="7" grpId="0"/>
+    </p:bldLst>
+  </p:timing>
+</p:sld>
+</file>
+
+<file path=ppt/slides/slide11.xml><?xml version="1.0" encoding="utf-8"?>
+<p:sld xmlns:a="http://schemas.openxmlformats.org/drawingml/2006/main" xmlns:r="http://schemas.openxmlformats.org/officeDocument/2006/relationships" xmlns:p="http://schemas.openxmlformats.org/presentationml/2006/main">
+  <p:cSld>
+    <p:spTree>
+      <p:nvGrpSpPr>
+        <p:cNvPr id="1" name=""/>
+        <p:cNvGrpSpPr/>
+        <p:nvPr/>
+      </p:nvGrpSpPr>
+      <p:grpSpPr>
+        <a:xfrm>
+          <a:off x="0" y="0"/>
+          <a:ext cx="0" cy="0"/>
+          <a:chOff x="0" y="0"/>
+          <a:chExt cx="0" cy="0"/>
+        </a:xfrm>
+      </p:grpSpPr>
+      <p:pic>
+        <p:nvPicPr>
+          <p:cNvPr id="6" name="Picture 6" descr="movies matrix code system failure Wallpaper HD"/>
+          <p:cNvPicPr>
+            <a:picLocks noChangeAspect="1" noChangeArrowheads="1"/>
+          </p:cNvPicPr>
+          <p:nvPr/>
+        </p:nvPicPr>
+        <p:blipFill>
+          <a:blip r:embed="rId2">
+            <a:lum bright="70000" contrast="-70000"/>
+            <a:extLst>
+              <a:ext uri="{28A0092B-C50C-407E-A947-70E740481C1C}">
+                <a14:useLocalDpi xmlns:a14="http://schemas.microsoft.com/office/drawing/2010/main" val="0"/>
+              </a:ext>
+            </a:extLst>
+          </a:blip>
+          <a:srcRect/>
+          <a:stretch>
+            <a:fillRect/>
+          </a:stretch>
+        </p:blipFill>
+        <p:spPr bwMode="auto">
+          <a:xfrm>
+            <a:off x="-1" y="0"/>
+            <a:ext cx="12192001" cy="6337300"/>
+          </a:xfrm>
+          <a:prstGeom prst="rect">
+            <a:avLst/>
+          </a:prstGeom>
+          <a:noFill/>
+          <a:extLst>
+            <a:ext uri="{909E8E84-426E-40DD-AFC4-6F175D3DCCD1}">
+              <a14:hiddenFill xmlns:a14="http://schemas.microsoft.com/office/drawing/2010/main">
+                <a:solidFill>
+                  <a:srgbClr val="FFFFFF"/>
+                </a:solidFill>
+              </a14:hiddenFill>
+            </a:ext>
+          </a:extLst>
+        </p:spPr>
+      </p:pic>
+      <p:sp>
+        <p:nvSpPr>
+          <p:cNvPr id="4" name="Title 3"/>
+          <p:cNvSpPr>
+            <a:spLocks noGrp="1"/>
+          </p:cNvSpPr>
+          <p:nvPr>
+            <p:ph type="ctrTitle"/>
+          </p:nvPr>
+        </p:nvSpPr>
+        <p:spPr>
+          <a:xfrm>
+            <a:off x="0" y="1982018"/>
+            <a:ext cx="12192000" cy="1651819"/>
+          </a:xfrm>
+        </p:spPr>
+        <p:txBody>
+          <a:bodyPr/>
+          <a:lstStyle/>
+          <a:p>
+            <a:r>
+              <a:rPr lang="en-US" dirty="0"/>
+              <a:t>Thanks For Listening</a:t>
+            </a:r>
+          </a:p>
+        </p:txBody>
+      </p:sp>
+      <p:sp>
+        <p:nvSpPr>
+          <p:cNvPr id="5" name="Subtitle 4"/>
+          <p:cNvSpPr>
+            <a:spLocks noGrp="1"/>
+          </p:cNvSpPr>
+          <p:nvPr>
+            <p:ph type="subTitle" idx="1"/>
+          </p:nvPr>
+        </p:nvSpPr>
+        <p:spPr>
+          <a:xfrm>
+            <a:off x="0" y="3633837"/>
+            <a:ext cx="12192000" cy="1143000"/>
+          </a:xfrm>
+        </p:spPr>
+        <p:txBody>
+          <a:bodyPr>
+            <a:normAutofit/>
+          </a:bodyPr>
+          <a:lstStyle/>
+          <a:p>
+            <a:r>
+              <a:rPr lang="en-US" sz="3200" dirty="0">
+                <a:solidFill>
+                  <a:schemeClr val="tx1"/>
+                </a:solidFill>
+              </a:rPr>
+              <a:t>Any Questions?</a:t>
+            </a:r>
+          </a:p>
+        </p:txBody>
+      </p:sp>
+    </p:spTree>
+    <p:extLst>
+      <p:ext uri="{BB962C8B-B14F-4D97-AF65-F5344CB8AC3E}">
+        <p14:creationId xmlns:p14="http://schemas.microsoft.com/office/powerpoint/2010/main" val="1248569566"/>
+      </p:ext>
+    </p:extLst>
+  </p:cSld>
+  <p:clrMapOvr>
+    <a:masterClrMapping/>
+  </p:clrMapOvr>
+</p:sld>
+</file>
+
+<file path=ppt/slides/slide2.xml><?xml version="1.0" encoding="utf-8"?>
+<p:sld xmlns:a="http://schemas.openxmlformats.org/drawingml/2006/main" xmlns:r="http://schemas.openxmlformats.org/officeDocument/2006/relationships" xmlns:p="http://schemas.openxmlformats.org/presentationml/2006/main">
+  <p:cSld>
+    <p:spTree>
+      <p:nvGrpSpPr>
+        <p:cNvPr id="1" name=""/>
+        <p:cNvGrpSpPr/>
+        <p:nvPr/>
+      </p:nvGrpSpPr>
+      <p:grpSpPr>
+        <a:xfrm>
+          <a:off x="0" y="0"/>
+          <a:ext cx="0" cy="0"/>
+          <a:chOff x="0" y="0"/>
+          <a:chExt cx="0" cy="0"/>
+        </a:xfrm>
+      </p:grpSpPr>
+      <p:sp>
+        <p:nvSpPr>
+          <p:cNvPr id="2" name="Title 1"/>
+          <p:cNvSpPr>
+            <a:spLocks noGrp="1"/>
+          </p:cNvSpPr>
+          <p:nvPr>
+            <p:ph type="title"/>
+          </p:nvPr>
+        </p:nvSpPr>
+        <p:spPr/>
+        <p:txBody>
+          <a:bodyPr/>
+          <a:lstStyle/>
+          <a:p>
+            <a:r>
+              <a:rPr lang="en-US" dirty="0"/>
+              <a:t>Introduction</a:t>
+            </a:r>
+          </a:p>
+        </p:txBody>
+      </p:sp>
+      <p:sp>
+        <p:nvSpPr>
+          <p:cNvPr id="3" name="Content Placeholder 2"/>
+          <p:cNvSpPr>
+            <a:spLocks noGrp="1"/>
+          </p:cNvSpPr>
+          <p:nvPr>
+            <p:ph idx="1"/>
+          </p:nvPr>
+        </p:nvSpPr>
+        <p:spPr/>
+        <p:txBody>
+          <a:bodyPr>
+            <a:normAutofit fontScale="92500" lnSpcReduction="10000"/>
+          </a:bodyPr>
+          <a:lstStyle/>
+          <a:p>
+            <a:r>
+              <a:rPr lang="en-US" dirty="0"/>
+              <a:t>As we’ve seen in the course, they are many advantages to </a:t>
+            </a:r>
+            <a:r>
+              <a:rPr lang="en-US" b="1" dirty="0"/>
+              <a:t>early </a:t>
+            </a:r>
+            <a:r>
+              <a:rPr lang="en-US" dirty="0"/>
+              <a:t>defect prediction.</a:t>
+            </a:r>
+          </a:p>
+          <a:p>
+            <a:r>
+              <a:rPr lang="en-US" dirty="0"/>
+              <a:t>Many studies have been published looking at whether </a:t>
+            </a:r>
+            <a:r>
+              <a:rPr lang="en-US" b="1" dirty="0"/>
+              <a:t>internal metrics</a:t>
+            </a:r>
+            <a:r>
+              <a:rPr lang="en-US" dirty="0"/>
+              <a:t> can be used as failure predictors.</a:t>
+            </a:r>
+          </a:p>
+          <a:p>
+            <a:endParaRPr lang="en-US" dirty="0"/>
+          </a:p>
+          <a:p>
+            <a:r>
+              <a:rPr lang="en-US" dirty="0"/>
+              <a:t>Studies have looked at: </a:t>
+            </a:r>
+          </a:p>
+          <a:p>
+            <a:pPr lvl="1"/>
+            <a:r>
+              <a:rPr lang="en-US" i="1" dirty="0"/>
+              <a:t>Code measures</a:t>
+            </a:r>
+            <a:endParaRPr lang="en-US" dirty="0"/>
+          </a:p>
+          <a:p>
+            <a:pPr lvl="1"/>
+            <a:r>
+              <a:rPr lang="en-US" i="1" dirty="0"/>
+              <a:t>People and organizational metrics</a:t>
+            </a:r>
+          </a:p>
+          <a:p>
+            <a:pPr lvl="1"/>
+            <a:r>
+              <a:rPr lang="en-US" sz="2600" b="1" i="1" dirty="0"/>
+              <a:t>Social networks</a:t>
+            </a:r>
+          </a:p>
+          <a:p>
+            <a:endParaRPr lang="en-US" dirty="0"/>
+          </a:p>
+          <a:p>
+            <a:endParaRPr lang="en-US" dirty="0"/>
+          </a:p>
+          <a:p>
+            <a:endParaRPr lang="en-US" dirty="0"/>
+          </a:p>
+        </p:txBody>
+      </p:sp>
+    </p:spTree>
+    <p:extLst>
+      <p:ext uri="{BB962C8B-B14F-4D97-AF65-F5344CB8AC3E}">
+        <p14:creationId xmlns:p14="http://schemas.microsoft.com/office/powerpoint/2010/main" val="2457151651"/>
+      </p:ext>
+    </p:extLst>
+  </p:cSld>
+  <p:clrMapOvr>
+    <a:masterClrMapping/>
+  </p:clrMapOvr>
+</p:sld>
+</file>
+
+<file path=ppt/slides/slide3.xml><?xml version="1.0" encoding="utf-8"?>
+<p:sld xmlns:a="http://schemas.openxmlformats.org/drawingml/2006/main" xmlns:r="http://schemas.openxmlformats.org/officeDocument/2006/relationships" xmlns:p="http://schemas.openxmlformats.org/presentationml/2006/main">
+  <p:cSld>
+    <p:spTree>
+      <p:nvGrpSpPr>
+        <p:cNvPr id="1" name=""/>
+        <p:cNvGrpSpPr/>
+        <p:nvPr/>
+      </p:nvGrpSpPr>
+      <p:grpSpPr>
+        <a:xfrm>
+          <a:off x="0" y="0"/>
+          <a:ext cx="0" cy="0"/>
+          <a:chOff x="0" y="0"/>
+          <a:chExt cx="0" cy="0"/>
+        </a:xfrm>
+      </p:grpSpPr>
+      <p:sp>
+        <p:nvSpPr>
+          <p:cNvPr id="2" name="Title 1"/>
+          <p:cNvSpPr>
+            <a:spLocks noGrp="1"/>
+          </p:cNvSpPr>
+          <p:nvPr>
+            <p:ph type="title"/>
+          </p:nvPr>
+        </p:nvSpPr>
+        <p:spPr/>
+        <p:txBody>
+          <a:bodyPr/>
+          <a:lstStyle/>
+          <a:p>
+            <a:r>
+              <a:rPr lang="en-US" dirty="0"/>
+              <a:t>Developer-Module Networks</a:t>
+            </a:r>
+          </a:p>
+        </p:txBody>
+      </p:sp>
+      <p:sp>
+        <p:nvSpPr>
+          <p:cNvPr id="3" name="Content Placeholder 2"/>
+          <p:cNvSpPr>
+            <a:spLocks noGrp="1"/>
+          </p:cNvSpPr>
+          <p:nvPr>
+            <p:ph idx="1"/>
+          </p:nvPr>
+        </p:nvSpPr>
+        <p:spPr>
+          <a:xfrm>
+            <a:off x="5892800" y="2032000"/>
+            <a:ext cx="6113780" cy="4040294"/>
+          </a:xfrm>
+        </p:spPr>
+        <p:txBody>
+          <a:bodyPr>
+            <a:normAutofit lnSpcReduction="10000"/>
+          </a:bodyPr>
+          <a:lstStyle/>
+          <a:p>
+            <a:r>
+              <a:rPr lang="en-US" dirty="0"/>
+              <a:t>Social network.</a:t>
+            </a:r>
+          </a:p>
+          <a:p>
+            <a:r>
+              <a:rPr lang="en-US" dirty="0"/>
+              <a:t>Contains </a:t>
+            </a:r>
+            <a:r>
+              <a:rPr lang="en-US" b="1" dirty="0"/>
+              <a:t>actors.</a:t>
+            </a:r>
+          </a:p>
+          <a:p>
+            <a:pPr lvl="1"/>
+            <a:r>
+              <a:rPr lang="en-US" dirty="0"/>
+              <a:t>Files and developers.</a:t>
+            </a:r>
+          </a:p>
+          <a:p>
+            <a:r>
+              <a:rPr lang="en-US" dirty="0"/>
+              <a:t>Contains </a:t>
+            </a:r>
+            <a:r>
+              <a:rPr lang="en-US" b="1" dirty="0"/>
+              <a:t>ties.</a:t>
+            </a:r>
+          </a:p>
+          <a:p>
+            <a:pPr lvl="1"/>
+            <a:r>
+              <a:rPr lang="en-US" dirty="0"/>
+              <a:t>Commits between files and developers.</a:t>
+            </a:r>
+          </a:p>
+          <a:p>
+            <a:r>
+              <a:rPr lang="en-US" dirty="0"/>
+              <a:t>Can compute social network metrics like </a:t>
+            </a:r>
+            <a:r>
+              <a:rPr lang="en-US" dirty="0" err="1"/>
+              <a:t>betweenness</a:t>
+            </a:r>
+            <a:r>
+              <a:rPr lang="en-US" dirty="0"/>
+              <a:t> centrality.</a:t>
+            </a:r>
+          </a:p>
+        </p:txBody>
+      </p:sp>
+      <p:pic>
+        <p:nvPicPr>
+          <p:cNvPr id="4" name="Picture 3"/>
+          <p:cNvPicPr>
+            <a:picLocks noChangeAspect="1"/>
+          </p:cNvPicPr>
+          <p:nvPr/>
+        </p:nvPicPr>
+        <p:blipFill>
+          <a:blip r:embed="rId2"/>
+          <a:stretch>
+            <a:fillRect/>
+          </a:stretch>
+        </p:blipFill>
+        <p:spPr>
+          <a:xfrm>
+            <a:off x="0" y="2372572"/>
+            <a:ext cx="5591175" cy="2952750"/>
+          </a:xfrm>
+          <a:prstGeom prst="rect">
+            <a:avLst/>
+          </a:prstGeom>
+        </p:spPr>
+      </p:pic>
+    </p:spTree>
+    <p:extLst>
+      <p:ext uri="{BB962C8B-B14F-4D97-AF65-F5344CB8AC3E}">
+        <p14:creationId xmlns:p14="http://schemas.microsoft.com/office/powerpoint/2010/main" val="4131573959"/>
+      </p:ext>
+    </p:extLst>
+  </p:cSld>
+  <p:clrMapOvr>
+    <a:masterClrMapping/>
+  </p:clrMapOvr>
+</p:sld>
+</file>
+
+<file path=ppt/slides/slide4.xml><?xml version="1.0" encoding="utf-8"?>
+<p:sld xmlns:a="http://schemas.openxmlformats.org/drawingml/2006/main" xmlns:r="http://schemas.openxmlformats.org/officeDocument/2006/relationships" xmlns:p="http://schemas.openxmlformats.org/presentationml/2006/main">
+  <p:cSld>
+    <p:spTree>
+      <p:nvGrpSpPr>
+        <p:cNvPr id="1" name=""/>
+        <p:cNvGrpSpPr/>
+        <p:nvPr/>
+      </p:nvGrpSpPr>
+      <p:grpSpPr>
+        <a:xfrm>
+          <a:off x="0" y="0"/>
+          <a:ext cx="0" cy="0"/>
+          <a:chOff x="0" y="0"/>
+          <a:chExt cx="0" cy="0"/>
+        </a:xfrm>
+      </p:grpSpPr>
+      <p:sp>
+        <p:nvSpPr>
+          <p:cNvPr id="5" name="Rectangle 4"/>
+          <p:cNvSpPr/>
+          <p:nvPr/>
+        </p:nvSpPr>
+        <p:spPr>
+          <a:xfrm>
+            <a:off x="749300" y="1075481"/>
+            <a:ext cx="10934700" cy="1388319"/>
+          </a:xfrm>
+          <a:prstGeom prst="rect">
+            <a:avLst/>
+          </a:prstGeom>
+          <a:solidFill>
+            <a:schemeClr val="bg1"/>
+          </a:solidFill>
+          <a:ln>
+            <a:noFill/>
+          </a:ln>
+        </p:spPr>
+        <p:style>
+          <a:lnRef idx="2">
+            <a:schemeClr val="accent1">
+              <a:shade val="50000"/>
+            </a:schemeClr>
+          </a:lnRef>
+          <a:fillRef idx="1">
+            <a:schemeClr val="accent1"/>
+          </a:fillRef>
+          <a:effectRef idx="0">
+            <a:schemeClr val="accent1"/>
+          </a:effectRef>
+          <a:fontRef idx="minor">
+            <a:schemeClr val="lt1"/>
+          </a:fontRef>
+        </p:style>
+        <p:txBody>
+          <a:bodyPr rtlCol="0" anchor="ctr"/>
+          <a:lstStyle/>
+          <a:p>
+            <a:pPr algn="ctr"/>
+            <a:endParaRPr lang="en-US"/>
+          </a:p>
+        </p:txBody>
+      </p:sp>
+      <p:pic>
+        <p:nvPicPr>
+          <p:cNvPr id="4" name="Picture 3"/>
+          <p:cNvPicPr>
+            <a:picLocks noChangeAspect="1"/>
+          </p:cNvPicPr>
+          <p:nvPr/>
+        </p:nvPicPr>
+        <p:blipFill>
+          <a:blip r:embed="rId2"/>
+          <a:stretch>
+            <a:fillRect/>
+          </a:stretch>
+        </p:blipFill>
+        <p:spPr>
+          <a:xfrm>
+            <a:off x="2261870" y="1075481"/>
+            <a:ext cx="7729220" cy="5250759"/>
+          </a:xfrm>
+          <a:prstGeom prst="rect">
+            <a:avLst/>
+          </a:prstGeom>
+          <a:effectLst>
+            <a:outerShdw blurRad="50800" dist="38100" dir="13500000" algn="br" rotWithShape="0">
+              <a:prstClr val="black">
+                <a:alpha val="40000"/>
+              </a:prstClr>
+            </a:outerShdw>
+          </a:effectLst>
+        </p:spPr>
+      </p:pic>
+    </p:spTree>
+    <p:extLst>
+      <p:ext uri="{BB962C8B-B14F-4D97-AF65-F5344CB8AC3E}">
+        <p14:creationId xmlns:p14="http://schemas.microsoft.com/office/powerpoint/2010/main" val="616963674"/>
+      </p:ext>
+    </p:extLst>
+  </p:cSld>
+  <p:clrMapOvr>
+    <a:masterClrMapping/>
+  </p:clrMapOvr>
+</p:sld>
+</file>
+
+<file path=ppt/slides/slide5.xml><?xml version="1.0" encoding="utf-8"?>
+<p:sld xmlns:a="http://schemas.openxmlformats.org/drawingml/2006/main" xmlns:r="http://schemas.openxmlformats.org/officeDocument/2006/relationships" xmlns:p="http://schemas.openxmlformats.org/presentationml/2006/main">
+  <p:cSld>
+    <p:spTree>
+      <p:nvGrpSpPr>
+        <p:cNvPr id="1" name=""/>
+        <p:cNvGrpSpPr/>
+        <p:nvPr/>
+      </p:nvGrpSpPr>
+      <p:grpSpPr>
+        <a:xfrm>
+          <a:off x="0" y="0"/>
+          <a:ext cx="0" cy="0"/>
+          <a:chOff x="0" y="0"/>
+          <a:chExt cx="0" cy="0"/>
+        </a:xfrm>
+      </p:grpSpPr>
+      <p:sp>
+        <p:nvSpPr>
+          <p:cNvPr id="2" name="Title 1"/>
+          <p:cNvSpPr>
+            <a:spLocks noGrp="1"/>
+          </p:cNvSpPr>
+          <p:nvPr>
+            <p:ph type="title"/>
+          </p:nvPr>
+        </p:nvSpPr>
+        <p:spPr/>
+        <p:txBody>
+          <a:bodyPr>
+            <a:normAutofit/>
+          </a:bodyPr>
+          <a:lstStyle/>
+          <a:p>
+            <a:r>
+              <a:rPr lang="en-US" dirty="0"/>
+              <a:t>Can Developers-Module Networks Predict Failures?</a:t>
+            </a:r>
+          </a:p>
+        </p:txBody>
+      </p:sp>
+      <p:sp>
+        <p:nvSpPr>
+          <p:cNvPr id="3" name="Content Placeholder 2"/>
+          <p:cNvSpPr>
+            <a:spLocks noGrp="1"/>
+          </p:cNvSpPr>
+          <p:nvPr>
+            <p:ph idx="1"/>
+          </p:nvPr>
+        </p:nvSpPr>
+        <p:spPr/>
+        <p:txBody>
+          <a:bodyPr/>
+          <a:lstStyle/>
+          <a:p>
+            <a:r>
+              <a:rPr lang="en-US" dirty="0"/>
+              <a:t>Study of Windows Vista.</a:t>
+            </a:r>
+          </a:p>
+          <a:p>
+            <a:r>
+              <a:rPr lang="en-US" dirty="0"/>
+              <a:t>Looked at whether the developer-module network for Windows Vista could predict </a:t>
+            </a:r>
+            <a:r>
+              <a:rPr lang="en-US" b="1" dirty="0"/>
+              <a:t>failure-prone binaries.</a:t>
+            </a:r>
+          </a:p>
+          <a:p>
+            <a:r>
+              <a:rPr lang="en-US" dirty="0"/>
+              <a:t>Hypothesized that </a:t>
+            </a:r>
+          </a:p>
+          <a:p>
+            <a:endParaRPr lang="en-US" dirty="0"/>
+          </a:p>
+          <a:p>
+            <a:r>
+              <a:rPr lang="en-US" dirty="0"/>
+              <a:t>Found that, with </a:t>
+            </a:r>
+          </a:p>
+        </p:txBody>
+      </p:sp>
+    </p:spTree>
+    <p:extLst>
+      <p:ext uri="{BB962C8B-B14F-4D97-AF65-F5344CB8AC3E}">
+        <p14:creationId xmlns:p14="http://schemas.microsoft.com/office/powerpoint/2010/main" val="1130064596"/>
+      </p:ext>
+    </p:extLst>
+  </p:cSld>
+  <p:clrMapOvr>
+    <a:masterClrMapping/>
+  </p:clrMapOvr>
+</p:sld>
+</file>
+
+<file path=ppt/slides/slide6.xml><?xml version="1.0" encoding="utf-8"?>
+<p:sld xmlns:a="http://schemas.openxmlformats.org/drawingml/2006/main" xmlns:r="http://schemas.openxmlformats.org/officeDocument/2006/relationships" xmlns:p="http://schemas.openxmlformats.org/presentationml/2006/main">
+  <p:cSld>
+    <p:spTree>
+      <p:nvGrpSpPr>
+        <p:cNvPr id="1" name=""/>
+        <p:cNvGrpSpPr/>
+        <p:nvPr/>
+      </p:nvGrpSpPr>
+      <p:grpSpPr>
+        <a:xfrm>
+          <a:off x="0" y="0"/>
+          <a:ext cx="0" cy="0"/>
+          <a:chOff x="0" y="0"/>
+          <a:chExt cx="0" cy="0"/>
+        </a:xfrm>
+      </p:grpSpPr>
+      <p:sp>
+        <p:nvSpPr>
+          <p:cNvPr id="2" name="Title 1"/>
+          <p:cNvSpPr>
+            <a:spLocks noGrp="1"/>
+          </p:cNvSpPr>
+          <p:nvPr>
+            <p:ph type="title"/>
+          </p:nvPr>
+        </p:nvSpPr>
+        <p:spPr/>
+        <p:txBody>
+          <a:bodyPr/>
+          <a:lstStyle/>
+          <a:p>
+            <a:r>
+              <a:rPr lang="en-US" dirty="0"/>
+              <a:t>Our Project</a:t>
+            </a:r>
+          </a:p>
+        </p:txBody>
+      </p:sp>
+      <p:sp>
+        <p:nvSpPr>
+          <p:cNvPr id="3" name="Content Placeholder 2"/>
+          <p:cNvSpPr>
+            <a:spLocks noGrp="1"/>
+          </p:cNvSpPr>
+          <p:nvPr>
+            <p:ph idx="1"/>
+          </p:nvPr>
+        </p:nvSpPr>
+        <p:spPr/>
+        <p:txBody>
+          <a:bodyPr/>
+          <a:lstStyle/>
+          <a:p>
+            <a:r>
+              <a:rPr lang="en-US" dirty="0"/>
+              <a:t>Windows Vista is a massive software project with thousands of developers and binaries.</a:t>
+            </a:r>
+          </a:p>
+          <a:p>
+            <a:endParaRPr lang="en-US" dirty="0"/>
+          </a:p>
+          <a:p>
+            <a:pPr lvl="1"/>
+            <a:endParaRPr lang="en-US" dirty="0"/>
+          </a:p>
+        </p:txBody>
+      </p:sp>
+    </p:spTree>
+    <p:extLst>
+      <p:ext uri="{BB962C8B-B14F-4D97-AF65-F5344CB8AC3E}">
+        <p14:creationId xmlns:p14="http://schemas.microsoft.com/office/powerpoint/2010/main" val="3500865242"/>
+      </p:ext>
+    </p:extLst>
+  </p:cSld>
+  <p:clrMapOvr>
+    <a:masterClrMapping/>
+  </p:clrMapOvr>
+</p:sld>
+</file>
+
+<file path=ppt/slides/slide7.xml><?xml version="1.0" encoding="utf-8"?>
+<p:sld xmlns:a="http://schemas.openxmlformats.org/drawingml/2006/main" xmlns:r="http://schemas.openxmlformats.org/officeDocument/2006/relationships" xmlns:p="http://schemas.openxmlformats.org/presentationml/2006/main">
+  <p:cSld>
+    <p:spTree>
+      <p:nvGrpSpPr>
+        <p:cNvPr id="1" name=""/>
+        <p:cNvGrpSpPr/>
+        <p:nvPr/>
+      </p:nvGrpSpPr>
+      <p:grpSpPr>
+        <a:xfrm>
+          <a:off x="0" y="0"/>
+          <a:ext cx="0" cy="0"/>
+          <a:chOff x="0" y="0"/>
+          <a:chExt cx="0" cy="0"/>
+        </a:xfrm>
+      </p:grpSpPr>
+      <p:sp>
+        <p:nvSpPr>
+          <p:cNvPr id="2" name="Title 1"/>
+          <p:cNvSpPr>
+            <a:spLocks noGrp="1"/>
+          </p:cNvSpPr>
+          <p:nvPr>
+            <p:ph type="title"/>
+          </p:nvPr>
+        </p:nvSpPr>
+        <p:spPr/>
+        <p:txBody>
+          <a:bodyPr/>
+          <a:lstStyle/>
+          <a:p>
+            <a:r>
+              <a:rPr lang="en-US" dirty="0"/>
+              <a:t>Our Project	</a:t>
+            </a:r>
+          </a:p>
+        </p:txBody>
+      </p:sp>
+      <p:sp>
+        <p:nvSpPr>
+          <p:cNvPr id="3" name="Content Placeholder 2"/>
+          <p:cNvSpPr>
+            <a:spLocks noGrp="1"/>
+          </p:cNvSpPr>
+          <p:nvPr>
+            <p:ph idx="1"/>
+          </p:nvPr>
+        </p:nvSpPr>
+        <p:spPr/>
+        <p:txBody>
+          <a:bodyPr/>
+          <a:lstStyle/>
+          <a:p>
+            <a:endParaRPr lang="en-US" dirty="0"/>
+          </a:p>
+        </p:txBody>
+      </p:sp>
+    </p:spTree>
+    <p:extLst>
+      <p:ext uri="{BB962C8B-B14F-4D97-AF65-F5344CB8AC3E}">
+        <p14:creationId xmlns:p14="http://schemas.microsoft.com/office/powerpoint/2010/main" val="3039880892"/>
+      </p:ext>
+    </p:extLst>
+  </p:cSld>
+  <p:clrMapOvr>
+    <a:masterClrMapping/>
+  </p:clrMapOvr>
+</p:sld>
+</file>
+
+<file path=ppt/slides/slide8.xml><?xml version="1.0" encoding="utf-8"?>
+<p:sld xmlns:a="http://schemas.openxmlformats.org/drawingml/2006/main" xmlns:r="http://schemas.openxmlformats.org/officeDocument/2006/relationships" xmlns:p="http://schemas.openxmlformats.org/presentationml/2006/main">
+  <p:cSld>
+    <p:spTree>
+      <p:nvGrpSpPr>
+        <p:cNvPr id="1" name=""/>
+        <p:cNvGrpSpPr/>
+        <p:nvPr/>
+      </p:nvGrpSpPr>
+      <p:grpSpPr>
+        <a:xfrm>
+          <a:off x="0" y="0"/>
+          <a:ext cx="0" cy="0"/>
+          <a:chOff x="0" y="0"/>
+          <a:chExt cx="0" cy="0"/>
+        </a:xfrm>
+      </p:grpSpPr>
+      <p:sp>
+        <p:nvSpPr>
+          <p:cNvPr id="2" name="Title 1"/>
+          <p:cNvSpPr>
+            <a:spLocks noGrp="1"/>
+          </p:cNvSpPr>
+          <p:nvPr>
+            <p:ph type="title"/>
+          </p:nvPr>
+        </p:nvSpPr>
+        <p:spPr/>
+        <p:txBody>
+          <a:bodyPr/>
+          <a:lstStyle/>
+          <a:p>
+            <a:r>
+              <a:rPr lang="en-US" dirty="0"/>
+              <a:t>The Boa Project</a:t>
+            </a:r>
+          </a:p>
+        </p:txBody>
+      </p:sp>
+      <p:sp>
+        <p:nvSpPr>
+          <p:cNvPr id="3" name="Content Placeholder 2"/>
+          <p:cNvSpPr>
+            <a:spLocks noGrp="1"/>
+          </p:cNvSpPr>
+          <p:nvPr>
+            <p:ph idx="1"/>
+          </p:nvPr>
+        </p:nvSpPr>
+        <p:spPr/>
+        <p:txBody>
+          <a:bodyPr/>
+          <a:lstStyle/>
+          <a:p>
+            <a:r>
+              <a:rPr lang="en-US" dirty="0"/>
+              <a:t>Project that aims to develop a </a:t>
+            </a:r>
+            <a:r>
+              <a:rPr lang="en-US" b="1" dirty="0"/>
+              <a:t>high-level </a:t>
+            </a:r>
+            <a:r>
+              <a:rPr lang="en-US" dirty="0"/>
+              <a:t>language for mining code version repositories.</a:t>
+            </a:r>
+          </a:p>
+          <a:p>
+            <a:r>
+              <a:rPr lang="en-US" dirty="0"/>
+              <a:t>Comprised of two elements:</a:t>
+            </a:r>
+          </a:p>
+          <a:p>
+            <a:pPr lvl="1"/>
+            <a:r>
+              <a:rPr lang="en-US" dirty="0"/>
+              <a:t>Domain specific language for mining code repositories.</a:t>
+            </a:r>
+          </a:p>
+          <a:p>
+            <a:pPr lvl="1"/>
+            <a:r>
+              <a:rPr lang="en-US" dirty="0"/>
+              <a:t>Large online dataset from GitHub and </a:t>
+            </a:r>
+            <a:r>
+              <a:rPr lang="en-US" dirty="0" err="1"/>
+              <a:t>Surgeforge</a:t>
+            </a:r>
+            <a:r>
+              <a:rPr lang="en-US" dirty="0"/>
+              <a:t> (</a:t>
+            </a:r>
+            <a:r>
+              <a:rPr lang="en-US" i="1" dirty="0"/>
+              <a:t>September 2013</a:t>
+            </a:r>
+            <a:r>
+              <a:rPr lang="en-US" dirty="0"/>
+              <a:t>)</a:t>
+            </a:r>
+          </a:p>
+          <a:p>
+            <a:r>
+              <a:rPr lang="en-US" dirty="0"/>
+              <a:t>Has an Eclipse plugin and Java API.</a:t>
+            </a:r>
+          </a:p>
+        </p:txBody>
+      </p:sp>
+    </p:spTree>
+    <p:extLst>
+      <p:ext uri="{BB962C8B-B14F-4D97-AF65-F5344CB8AC3E}">
+        <p14:creationId xmlns:p14="http://schemas.microsoft.com/office/powerpoint/2010/main" val="1762729446"/>
+      </p:ext>
+    </p:extLst>
+  </p:cSld>
+  <p:clrMapOvr>
+    <a:masterClrMapping/>
+  </p:clrMapOvr>
+</p:sld>
+</file>
+
+<file path=ppt/slides/slide9.xml><?xml version="1.0" encoding="utf-8"?>
+<p:sld xmlns:a="http://schemas.openxmlformats.org/drawingml/2006/main" xmlns:r="http://schemas.openxmlformats.org/officeDocument/2006/relationships" xmlns:p="http://schemas.openxmlformats.org/presentationml/2006/main">
+  <p:cSld>
+    <p:spTree>
+      <p:nvGrpSpPr>
+        <p:cNvPr id="1" name=""/>
+        <p:cNvGrpSpPr/>
+        <p:nvPr/>
+      </p:nvGrpSpPr>
+      <p:grpSpPr>
+        <a:xfrm>
+          <a:off x="0" y="0"/>
+          <a:ext cx="0" cy="0"/>
+          <a:chOff x="0" y="0"/>
+          <a:chExt cx="0" cy="0"/>
+        </a:xfrm>
+      </p:grpSpPr>
+      <p:sp>
+        <p:nvSpPr>
+          <p:cNvPr id="2" name="Title 1"/>
+          <p:cNvSpPr>
+            <a:spLocks noGrp="1"/>
+          </p:cNvSpPr>
+          <p:nvPr>
+            <p:ph type="title"/>
+          </p:nvPr>
+        </p:nvSpPr>
+        <p:spPr/>
+        <p:txBody>
+          <a:bodyPr/>
+          <a:lstStyle/>
+          <a:p>
+            <a:r>
+              <a:rPr lang="en-US" dirty="0"/>
+              <a:t>Example of Boa: </a:t>
+            </a:r>
+            <a:r>
+              <a:rPr lang="en-US" i="1" dirty="0"/>
+              <a:t>Number of Committers</a:t>
+            </a:r>
+            <a:endParaRPr lang="en-US" dirty="0"/>
+          </a:p>
+        </p:txBody>
+      </p:sp>
+      <p:pic>
+        <p:nvPicPr>
+          <p:cNvPr id="4" name="Picture 3"/>
+          <p:cNvPicPr>
+            <a:picLocks noChangeAspect="1"/>
+          </p:cNvPicPr>
+          <p:nvPr/>
+        </p:nvPicPr>
+        <p:blipFill>
+          <a:blip r:embed="rId2"/>
+          <a:stretch>
+            <a:fillRect/>
+          </a:stretch>
+        </p:blipFill>
+        <p:spPr>
+          <a:xfrm>
+            <a:off x="1965975" y="2158949"/>
+            <a:ext cx="8321009" cy="3529739"/>
+          </a:xfrm>
+          <a:prstGeom prst="rect">
+            <a:avLst/>
+          </a:prstGeom>
+        </p:spPr>
+      </p:pic>
+    </p:spTree>
+    <p:extLst>
+      <p:ext uri="{BB962C8B-B14F-4D97-AF65-F5344CB8AC3E}">
+        <p14:creationId xmlns:p14="http://schemas.microsoft.com/office/powerpoint/2010/main" val="875459587"/>
+      </p:ext>
+    </p:extLst>
+  </p:cSld>
+  <p:clrMapOvr>
+    <a:masterClrMapping/>
+  </p:clrMapOvr>
+</p:sld>
+</file>
+
 <file path=ppt/theme/theme1.xml><?xml version="1.0" encoding="utf-8"?>
-<a:theme xmlns:a="http://schemas.openxmlformats.org/drawingml/2006/main" name="Office Theme">
+<a:theme xmlns:a="http://schemas.openxmlformats.org/drawingml/2006/main" name="Retrospect">
   <a:themeElements>
-    <a:clrScheme name="Office">
+    <a:clrScheme name="Retrospect">
       <a:dk1>
-        <a:sysClr val="windowText" lastClr="000000"/>
+        <a:srgbClr val="000000"/>
       </a:dk1>
       <a:lt1>
         <a:sysClr val="window" lastClr="FFFFFF"/>
       </a:lt1>
       <a:dk2>
-        <a:srgbClr val="44546A"/>
+        <a:srgbClr val="637052"/>
       </a:dk2>
       <a:lt2>
-        <a:srgbClr val="E7E6E6"/>
+        <a:srgbClr val="CCDDEA"/>
       </a:lt2>
       <a:accent1>
-        <a:srgbClr val="5B9BD5"/>
+        <a:srgbClr val="E48312"/>
       </a:accent1>
       <a:accent2>
-        <a:srgbClr val="ED7D31"/>
+        <a:srgbClr val="BD582C"/>
       </a:accent2>
       <a:accent3>
-        <a:srgbClr val="A5A5A5"/>
+        <a:srgbClr val="865640"/>
       </a:accent3>
       <a:accent4>
-        <a:srgbClr val="FFC000"/>
+        <a:srgbClr val="9B8357"/>
       </a:accent4>
       <a:accent5>
-        <a:srgbClr val="4472C4"/>
+        <a:srgbClr val="C2BC80"/>
       </a:accent5>
       <a:accent6>
-        <a:srgbClr val="70AD47"/>
+        <a:srgbClr val="94A088"/>
       </a:accent6>
       <a:hlink>
-        <a:srgbClr val="0563C1"/>
+        <a:srgbClr val="2998E3"/>
       </a:hlink>
       <a:folHlink>
-        <a:srgbClr val="954F72"/>
+        <a:srgbClr val="8C8C8C"/>
       </a:folHlink>
     </a:clrScheme>
-    <a:fontScheme name="Office">
+    <a:fontScheme name="Retrospect">
       <a:majorFont>
         <a:latin typeface="Calibri Light" panose="020F0302020204030204"/>
         <a:ea typeface=""/>
         <a:cs typeface=""/>
-        <a:font script="Jpan" typeface="游ゴシック Light"/>
+        <a:font script="Jpan" typeface="ＭＳ Ｐゴシック"/>
         <a:font script="Hang" typeface="맑은 고딕"/>
-        <a:font script="Hans" typeface="等线 Light"/>
+        <a:font script="Hans" typeface="宋体"/>
         <a:font script="Hant" typeface="新細明體"/>
         <a:font script="Arab" typeface="Times New Roman"/>
         <a:font script="Hebr" typeface="Times New Roman"/>
@@ -3091,31 +5449,14 @@
         <a:font script="Viet" typeface="Times New Roman"/>
         <a:font script="Uigh" typeface="Microsoft Uighur"/>
         <a:font script="Geor" typeface="Sylfaen"/>
-        <a:font script="Armn" typeface="Arial"/>
-        <a:font script="Bugi" typeface="Leelawadee UI"/>
-        <a:font script="Bopo" typeface="Microsoft JhengHei"/>
-        <a:font script="Java" typeface="Javanese Text"/>
-        <a:font script="Lisu" typeface="Segoe UI"/>
-        <a:font script="Mymr" typeface="Myanmar Text"/>
-        <a:font script="Nkoo" typeface="Ebrima"/>
-        <a:font script="Olck" typeface="Nirmala UI"/>
-        <a:font script="Osma" typeface="Ebrima"/>
-        <a:font script="Phag" typeface="Phagspa"/>
-        <a:font script="Syrn" typeface="Estrangelo Edessa"/>
-        <a:font script="Syrj" typeface="Estrangelo Edessa"/>
-        <a:font script="Syre" typeface="Estrangelo Edessa"/>
-        <a:font script="Sora" typeface="Nirmala UI"/>
-        <a:font script="Tale" typeface="Microsoft Tai Le"/>
-        <a:font script="Talu" typeface="Microsoft New Tai Lue"/>
-        <a:font script="Tfng" typeface="Ebrima"/>
       </a:majorFont>
       <a:minorFont>
         <a:latin typeface="Calibri" panose="020F0502020204030204"/>
         <a:ea typeface=""/>
         <a:cs typeface=""/>
-        <a:font script="Jpan" typeface="游ゴシック"/>
+        <a:font script="Jpan" typeface="ＭＳ Ｐゴシック"/>
         <a:font script="Hang" typeface="맑은 고딕"/>
-        <a:font script="Hans" typeface="等线"/>
+        <a:font script="Hans" typeface="宋体"/>
         <a:font script="Hant" typeface="新細明體"/>
         <a:font script="Arab" typeface="Arial"/>
         <a:font script="Hebr" typeface="Arial"/>
@@ -3143,26 +5484,9 @@
         <a:font script="Viet" typeface="Arial"/>
         <a:font script="Uigh" typeface="Microsoft Uighur"/>
         <a:font script="Geor" typeface="Sylfaen"/>
-        <a:font script="Armn" typeface="Arial"/>
-        <a:font script="Bugi" typeface="Leelawadee UI"/>
-        <a:font script="Bopo" typeface="Microsoft JhengHei"/>
-        <a:font script="Java" typeface="Javanese Text"/>
-        <a:font script="Lisu" typeface="Segoe UI"/>
-        <a:font script="Mymr" typeface="Myanmar Text"/>
-        <a:font script="Nkoo" typeface="Ebrima"/>
-        <a:font script="Olck" typeface="Nirmala UI"/>
-        <a:font script="Osma" typeface="Ebrima"/>
-        <a:font script="Phag" typeface="Phagspa"/>
-        <a:font script="Syrn" typeface="Estrangelo Edessa"/>
-        <a:font script="Syrj" typeface="Estrangelo Edessa"/>
-        <a:font script="Syre" typeface="Estrangelo Edessa"/>
-        <a:font script="Sora" typeface="Nirmala UI"/>
-        <a:font script="Tale" typeface="Microsoft Tai Le"/>
-        <a:font script="Talu" typeface="Microsoft New Tai Lue"/>
-        <a:font script="Tfng" typeface="Ebrima"/>
       </a:minorFont>
     </a:fontScheme>
-    <a:fmtScheme name="Office">
+    <a:fmtScheme name="Retrospect">
       <a:fillStyleLst>
         <a:solidFill>
           <a:schemeClr val="phClr"/>
@@ -3171,76 +5495,81 @@
           <a:gsLst>
             <a:gs pos="0">
               <a:schemeClr val="phClr">
-                <a:lumMod val="110000"/>
-                <a:satMod val="105000"/>
-                <a:tint val="67000"/>
+                <a:tint val="65000"/>
+                <a:shade val="92000"/>
+                <a:satMod val="130000"/>
               </a:schemeClr>
             </a:gs>
-            <a:gs pos="50000">
+            <a:gs pos="45000">
               <a:schemeClr val="phClr">
-                <a:lumMod val="105000"/>
-                <a:satMod val="103000"/>
-                <a:tint val="73000"/>
+                <a:tint val="60000"/>
+                <a:shade val="99000"/>
+                <a:satMod val="120000"/>
               </a:schemeClr>
             </a:gs>
             <a:gs pos="100000">
               <a:schemeClr val="phClr">
-                <a:lumMod val="105000"/>
-                <a:satMod val="109000"/>
-                <a:tint val="81000"/>
+                <a:tint val="55000"/>
+                <a:satMod val="140000"/>
               </a:schemeClr>
             </a:gs>
           </a:gsLst>
-          <a:lin ang="5400000" scaled="0"/>
+          <a:path path="circle">
+            <a:fillToRect l="100000" t="100000" r="100000" b="100000"/>
+          </a:path>
         </a:gradFill>
         <a:gradFill rotWithShape="1">
           <a:gsLst>
             <a:gs pos="0">
               <a:schemeClr val="phClr">
-                <a:satMod val="103000"/>
-                <a:lumMod val="102000"/>
-                <a:tint val="94000"/>
+                <a:shade val="85000"/>
+                <a:satMod val="130000"/>
               </a:schemeClr>
             </a:gs>
-            <a:gs pos="50000">
+            <a:gs pos="34000">
               <a:schemeClr val="phClr">
-                <a:satMod val="110000"/>
-                <a:lumMod val="100000"/>
-                <a:shade val="100000"/>
+                <a:shade val="87000"/>
+                <a:satMod val="125000"/>
+              </a:schemeClr>
+            </a:gs>
+            <a:gs pos="70000">
+              <a:schemeClr val="phClr">
+                <a:tint val="100000"/>
+                <a:shade val="90000"/>
+                <a:satMod val="130000"/>
               </a:schemeClr>
             </a:gs>
             <a:gs pos="100000">
               <a:schemeClr val="phClr">
-                <a:lumMod val="99000"/>
-                <a:satMod val="120000"/>
-                <a:shade val="78000"/>
+                <a:tint val="100000"/>
+                <a:shade val="100000"/>
+                <a:satMod val="110000"/>
               </a:schemeClr>
             </a:gs>
           </a:gsLst>
-          <a:lin ang="5400000" scaled="0"/>
+          <a:path path="circle">
+            <a:fillToRect l="100000" t="100000" r="100000" b="100000"/>
+          </a:path>
         </a:gradFill>
       </a:fillStyleLst>
       <a:lnStyleLst>
-        <a:ln w="6350" cap="flat" cmpd="sng" algn="ctr">
-          <a:solidFill>
-            <a:schemeClr val="phClr"/>
-          </a:solidFill>
-          <a:prstDash val="solid"/>
-          <a:miter lim="800000"/>
-        </a:ln>
         <a:ln w="12700" cap="flat" cmpd="sng" algn="ctr">
           <a:solidFill>
             <a:schemeClr val="phClr"/>
           </a:solidFill>
           <a:prstDash val="solid"/>
-          <a:miter lim="800000"/>
         </a:ln>
-        <a:ln w="19050" cap="flat" cmpd="sng" algn="ctr">
+        <a:ln w="15875" cap="flat" cmpd="sng" algn="ctr">
           <a:solidFill>
             <a:schemeClr val="phClr"/>
           </a:solidFill>
           <a:prstDash val="solid"/>
-          <a:miter lim="800000"/>
+        </a:ln>
+        <a:ln w="25400" cap="flat" cmpd="sng" algn="ctr">
+          <a:solidFill>
+            <a:schemeClr val="phClr"/>
+          </a:solidFill>
+          <a:prstDash val="solid"/>
         </a:ln>
       </a:lnStyleLst>
       <a:effectStyleLst>
@@ -3248,16 +5577,33 @@
           <a:effectLst/>
         </a:effectStyle>
         <a:effectStyle>
-          <a:effectLst/>
+          <a:effectLst>
+            <a:outerShdw blurRad="38100" dist="25400" dir="2700000" algn="br" rotWithShape="0">
+              <a:srgbClr val="000000">
+                <a:alpha val="60000"/>
+              </a:srgbClr>
+            </a:outerShdw>
+          </a:effectLst>
         </a:effectStyle>
         <a:effectStyle>
           <a:effectLst>
-            <a:outerShdw blurRad="57150" dist="19050" dir="5400000" algn="ctr" rotWithShape="0">
+            <a:outerShdw blurRad="44450" dist="25400" dir="2700000" algn="br" rotWithShape="0">
               <a:srgbClr val="000000">
-                <a:alpha val="63000"/>
+                <a:alpha val="60000"/>
               </a:srgbClr>
             </a:outerShdw>
           </a:effectLst>
+          <a:scene3d>
+            <a:camera prst="orthographicFront">
+              <a:rot lat="0" lon="0" rev="0"/>
+            </a:camera>
+            <a:lightRig rig="threePt" dir="t">
+              <a:rot lat="0" lon="0" rev="19800000"/>
+            </a:lightRig>
+          </a:scene3d>
+          <a:sp3d prstMaterial="flat">
+            <a:bevelT w="25400" h="31750"/>
+          </a:sp3d>
         </a:effectStyle>
       </a:effectStyleLst>
       <a:bgFillStyleLst>
@@ -3266,36 +5612,36 @@
         </a:solidFill>
         <a:solidFill>
           <a:schemeClr val="phClr">
-            <a:tint val="95000"/>
-            <a:satMod val="170000"/>
+            <a:tint val="90000"/>
+            <a:shade val="97000"/>
+            <a:satMod val="130000"/>
           </a:schemeClr>
         </a:solidFill>
         <a:gradFill rotWithShape="1">
           <a:gsLst>
             <a:gs pos="0">
               <a:schemeClr val="phClr">
-                <a:tint val="93000"/>
-                <a:satMod val="150000"/>
-                <a:shade val="98000"/>
-                <a:lumMod val="102000"/>
+                <a:tint val="96000"/>
+                <a:shade val="99000"/>
+                <a:satMod val="140000"/>
               </a:schemeClr>
             </a:gs>
-            <a:gs pos="50000">
+            <a:gs pos="65000">
               <a:schemeClr val="phClr">
-                <a:tint val="98000"/>
+                <a:tint val="100000"/>
+                <a:shade val="80000"/>
                 <a:satMod val="130000"/>
-                <a:shade val="90000"/>
-                <a:lumMod val="103000"/>
               </a:schemeClr>
             </a:gs>
             <a:gs pos="100000">
               <a:schemeClr val="phClr">
-                <a:shade val="63000"/>
+                <a:tint val="100000"/>
+                <a:shade val="48000"/>
                 <a:satMod val="120000"/>
               </a:schemeClr>
             </a:gs>
           </a:gsLst>
-          <a:lin ang="5400000" scaled="0"/>
+          <a:lin ang="16200000" scaled="0"/>
         </a:gradFill>
       </a:bgFillStyleLst>
     </a:fmtScheme>
@@ -3304,7 +5650,7 @@
   <a:extraClrSchemeLst/>
   <a:extLst>
     <a:ext uri="{05A4C25C-085E-4340-85A3-A5531E510DB2}">
-      <thm15:themeFamily xmlns:thm15="http://schemas.microsoft.com/office/thememl/2012/main" name="Office Theme" id="{62F939B6-93AF-4DB8-9C6B-D6C7DFDC589F}" vid="{4A3C46E8-61CC-4603-A589-7422A47A8E4A}"/>
+      <thm15:themeFamily xmlns:thm15="http://schemas.microsoft.com/office/thememl/2012/main" name="Retrospect" id="{5F128B03-DCCA-4EEB-AB3B-CF2899314A46}" vid="{3F1AAB62-24C6-49D2-8E01-B56FAC9A3DCD}"/>
     </a:ext>
   </a:extLst>
 </a:theme>

</xml_diff>

<commit_message>
Added paper text and started updating our program to final version
</commit_message>
<xml_diff>
--- a/Final-Presentation/Presentation.pptx
+++ b/Final-Presentation/Presentation.pptx
@@ -17,8 +17,11 @@
     <p:sldId id="269" r:id="rId11"/>
     <p:sldId id="271" r:id="rId12"/>
     <p:sldId id="270" r:id="rId13"/>
-    <p:sldId id="272" r:id="rId14"/>
-    <p:sldId id="265" r:id="rId15"/>
+    <p:sldId id="273" r:id="rId14"/>
+    <p:sldId id="274" r:id="rId15"/>
+    <p:sldId id="275" r:id="rId16"/>
+    <p:sldId id="272" r:id="rId17"/>
+    <p:sldId id="265" r:id="rId18"/>
   </p:sldIdLst>
   <p:sldSz cx="12192000" cy="6858000"/>
   <p:notesSz cx="6858000" cy="9144000"/>
@@ -145,7 +148,11 @@
           </p14:sldIdLst>
         </p14:section>
         <p14:section name="Results" id="{F06C6ECF-4606-4C14-8117-DA2D8675ACF3}">
-          <p14:sldIdLst/>
+          <p14:sldIdLst>
+            <p14:sldId id="273"/>
+            <p14:sldId id="274"/>
+            <p14:sldId id="275"/>
+          </p14:sldIdLst>
         </p14:section>
         <p14:section name="Conclusion" id="{8D9BA467-BE11-41EB-8F5E-434DA548520F}">
           <p14:sldIdLst>
@@ -386,7 +393,7 @@
           <a:p>
             <a:fld id="{CA586F88-EEB5-4979-9532-C99075E35C56}" type="datetimeFigureOut">
               <a:rPr lang="en-US" smtClean="0"/>
-              <a:t>3/22/2016</a:t>
+              <a:t>3/24/2016</a:t>
             </a:fld>
             <a:endParaRPr lang="en-US"/>
           </a:p>
@@ -560,7 +567,7 @@
           <a:p>
             <a:fld id="{CA586F88-EEB5-4979-9532-C99075E35C56}" type="datetimeFigureOut">
               <a:rPr lang="en-US" smtClean="0"/>
-              <a:t>3/22/2016</a:t>
+              <a:t>3/24/2016</a:t>
             </a:fld>
             <a:endParaRPr lang="en-US"/>
           </a:p>
@@ -816,7 +823,7 @@
           <a:p>
             <a:fld id="{CA586F88-EEB5-4979-9532-C99075E35C56}" type="datetimeFigureOut">
               <a:rPr lang="en-US" smtClean="0"/>
-              <a:t>3/22/2016</a:t>
+              <a:t>3/24/2016</a:t>
             </a:fld>
             <a:endParaRPr lang="en-US"/>
           </a:p>
@@ -993,7 +1000,7 @@
           <a:p>
             <a:fld id="{CA586F88-EEB5-4979-9532-C99075E35C56}" type="datetimeFigureOut">
               <a:rPr lang="en-US" smtClean="0"/>
-              <a:t>3/22/2016</a:t>
+              <a:t>3/24/2016</a:t>
             </a:fld>
             <a:endParaRPr lang="en-US"/>
           </a:p>
@@ -1336,7 +1343,7 @@
           <a:p>
             <a:fld id="{CA586F88-EEB5-4979-9532-C99075E35C56}" type="datetimeFigureOut">
               <a:rPr lang="en-US" smtClean="0"/>
-              <a:t>3/22/2016</a:t>
+              <a:t>3/24/2016</a:t>
             </a:fld>
             <a:endParaRPr lang="en-US"/>
           </a:p>
@@ -1611,7 +1618,7 @@
           <a:p>
             <a:fld id="{CA586F88-EEB5-4979-9532-C99075E35C56}" type="datetimeFigureOut">
               <a:rPr lang="en-US" smtClean="0"/>
-              <a:t>3/22/2016</a:t>
+              <a:t>3/24/2016</a:t>
             </a:fld>
             <a:endParaRPr lang="en-US"/>
           </a:p>
@@ -1990,7 +1997,7 @@
           <a:p>
             <a:fld id="{CA586F88-EEB5-4979-9532-C99075E35C56}" type="datetimeFigureOut">
               <a:rPr lang="en-US" smtClean="0"/>
-              <a:t>3/22/2016</a:t>
+              <a:t>3/24/2016</a:t>
             </a:fld>
             <a:endParaRPr lang="en-US"/>
           </a:p>
@@ -2108,7 +2115,7 @@
           <a:p>
             <a:fld id="{CA586F88-EEB5-4979-9532-C99075E35C56}" type="datetimeFigureOut">
               <a:rPr lang="en-US" smtClean="0"/>
-              <a:t>3/22/2016</a:t>
+              <a:t>3/24/2016</a:t>
             </a:fld>
             <a:endParaRPr lang="en-US"/>
           </a:p>
@@ -2279,7 +2286,7 @@
           <a:p>
             <a:fld id="{CA586F88-EEB5-4979-9532-C99075E35C56}" type="datetimeFigureOut">
               <a:rPr lang="en-US" smtClean="0"/>
-              <a:t>3/22/2016</a:t>
+              <a:t>3/24/2016</a:t>
             </a:fld>
             <a:endParaRPr lang="en-US"/>
           </a:p>
@@ -2633,7 +2640,7 @@
           <a:p>
             <a:fld id="{CA586F88-EEB5-4979-9532-C99075E35C56}" type="datetimeFigureOut">
               <a:rPr lang="en-US" smtClean="0"/>
-              <a:t>3/22/2016</a:t>
+              <a:t>3/24/2016</a:t>
             </a:fld>
             <a:endParaRPr lang="en-US"/>
           </a:p>
@@ -3015,7 +3022,7 @@
           <a:p>
             <a:fld id="{CA586F88-EEB5-4979-9532-C99075E35C56}" type="datetimeFigureOut">
               <a:rPr lang="en-US" smtClean="0"/>
-              <a:t>3/22/2016</a:t>
+              <a:t>3/24/2016</a:t>
             </a:fld>
             <a:endParaRPr lang="en-US"/>
           </a:p>
@@ -3301,7 +3308,7 @@
           <a:p>
             <a:fld id="{CA586F88-EEB5-4979-9532-C99075E35C56}" type="datetimeFigureOut">
               <a:rPr lang="en-US" smtClean="0"/>
-              <a:t>3/22/2016</a:t>
+              <a:t>3/24/2016</a:t>
             </a:fld>
             <a:endParaRPr lang="en-US"/>
           </a:p>
@@ -4086,8 +4093,13 @@
           <a:p>
             <a:r>
               <a:rPr lang="en-US" dirty="0"/>
-              <a:t>We Didn’t Do It By Hand!</a:t>
-            </a:r>
+              <a:t>Software Tool: </a:t>
+            </a:r>
+            <a:r>
+              <a:rPr lang="en-US" i="1" dirty="0" err="1"/>
+              <a:t>NetworkMine</a:t>
+            </a:r>
+            <a:endParaRPr lang="en-US" dirty="0"/>
           </a:p>
         </p:txBody>
       </p:sp>
@@ -4419,7 +4431,7 @@
             </a:pPr>
             <a:r>
               <a:rPr lang="en-US" dirty="0"/>
-              <a:t>Boa Software Miner</a:t>
+              <a:t>Social Network Builder</a:t>
             </a:r>
           </a:p>
         </p:txBody>
@@ -5217,6 +5229,626 @@
           <a:p>
             <a:r>
               <a:rPr lang="en-US" dirty="0"/>
+              <a:t>Projects Used in Study</a:t>
+            </a:r>
+          </a:p>
+        </p:txBody>
+      </p:sp>
+      <p:sp>
+        <p:nvSpPr>
+          <p:cNvPr id="3" name="Content Placeholder 2"/>
+          <p:cNvSpPr>
+            <a:spLocks noGrp="1"/>
+          </p:cNvSpPr>
+          <p:nvPr>
+            <p:ph idx="1"/>
+          </p:nvPr>
+        </p:nvSpPr>
+        <p:spPr/>
+        <p:txBody>
+          <a:bodyPr/>
+          <a:lstStyle/>
+          <a:p>
+            <a:r>
+              <a:rPr lang="en-US" dirty="0"/>
+              <a:t>We performed our methodology on 15 different GitHub projects.</a:t>
+            </a:r>
+          </a:p>
+          <a:p>
+            <a:pPr marL="58737" indent="0">
+              <a:buNone/>
+            </a:pPr>
+            <a:endParaRPr lang="en-US" sz="900" dirty="0"/>
+          </a:p>
+          <a:p>
+            <a:pPr marL="58737" indent="0">
+              <a:buNone/>
+            </a:pPr>
+            <a:r>
+              <a:rPr lang="en-US" b="1" dirty="0"/>
+              <a:t>Project Statistics:</a:t>
+            </a:r>
+          </a:p>
+          <a:p>
+            <a:pPr marL="58737" indent="0">
+              <a:buNone/>
+            </a:pPr>
+            <a:endParaRPr lang="en-US" b="1" dirty="0"/>
+          </a:p>
+        </p:txBody>
+      </p:sp>
+      <p:graphicFrame>
+        <p:nvGraphicFramePr>
+          <p:cNvPr id="5" name="Table 4"/>
+          <p:cNvGraphicFramePr>
+            <a:graphicFrameLocks noGrp="1"/>
+          </p:cNvGraphicFramePr>
+          <p:nvPr>
+            <p:extLst>
+              <p:ext uri="{D42A27DB-BD31-4B8C-83A1-F6EECF244321}">
+                <p14:modId xmlns:p14="http://schemas.microsoft.com/office/powerpoint/2010/main" val="1872906644"/>
+              </p:ext>
+            </p:extLst>
+          </p:nvPr>
+        </p:nvGraphicFramePr>
+        <p:xfrm>
+          <a:off x="2062480" y="3926238"/>
+          <a:ext cx="8127999" cy="741680"/>
+        </p:xfrm>
+        <a:graphic>
+          <a:graphicData uri="http://schemas.openxmlformats.org/drawingml/2006/table">
+            <a:tbl>
+              <a:tblPr firstRow="1" bandRow="1">
+                <a:tableStyleId>{5C22544A-7EE6-4342-B048-85BDC9FD1C3A}</a:tableStyleId>
+              </a:tblPr>
+              <a:tblGrid>
+                <a:gridCol w="2709333">
+                  <a:extLst>
+                    <a:ext uri="{9D8B030D-6E8A-4147-A177-3AD203B41FA5}">
+                      <a16:colId xmlns:a16="http://schemas.microsoft.com/office/drawing/2014/main" val="643314803"/>
+                    </a:ext>
+                  </a:extLst>
+                </a:gridCol>
+                <a:gridCol w="2709333">
+                  <a:extLst>
+                    <a:ext uri="{9D8B030D-6E8A-4147-A177-3AD203B41FA5}">
+                      <a16:colId xmlns:a16="http://schemas.microsoft.com/office/drawing/2014/main" val="1177950111"/>
+                    </a:ext>
+                  </a:extLst>
+                </a:gridCol>
+                <a:gridCol w="2709333">
+                  <a:extLst>
+                    <a:ext uri="{9D8B030D-6E8A-4147-A177-3AD203B41FA5}">
+                      <a16:colId xmlns:a16="http://schemas.microsoft.com/office/drawing/2014/main" val="104661152"/>
+                    </a:ext>
+                  </a:extLst>
+                </a:gridCol>
+              </a:tblGrid>
+              <a:tr h="370840">
+                <a:tc>
+                  <a:txBody>
+                    <a:bodyPr/>
+                    <a:lstStyle/>
+                    <a:p>
+                      <a:pPr algn="ctr"/>
+                      <a:r>
+                        <a:rPr lang="en-US" dirty="0"/>
+                        <a:t>Max Contributors</a:t>
+                      </a:r>
+                    </a:p>
+                  </a:txBody>
+                  <a:tcPr/>
+                </a:tc>
+                <a:tc>
+                  <a:txBody>
+                    <a:bodyPr/>
+                    <a:lstStyle/>
+                    <a:p>
+                      <a:pPr algn="ctr"/>
+                      <a:r>
+                        <a:rPr lang="en-US" dirty="0"/>
+                        <a:t>Min Contributors</a:t>
+                      </a:r>
+                    </a:p>
+                  </a:txBody>
+                  <a:tcPr/>
+                </a:tc>
+                <a:tc>
+                  <a:txBody>
+                    <a:bodyPr/>
+                    <a:lstStyle/>
+                    <a:p>
+                      <a:pPr algn="ctr"/>
+                      <a:r>
+                        <a:rPr lang="en-US" dirty="0"/>
+                        <a:t>Average</a:t>
+                      </a:r>
+                      <a:r>
+                        <a:rPr lang="en-US" baseline="0" dirty="0"/>
+                        <a:t> Contributors</a:t>
+                      </a:r>
+                      <a:endParaRPr lang="en-US" dirty="0"/>
+                    </a:p>
+                  </a:txBody>
+                  <a:tcPr/>
+                </a:tc>
+                <a:extLst>
+                  <a:ext uri="{0D108BD9-81ED-4DB2-BD59-A6C34878D82A}">
+                    <a16:rowId xmlns:a16="http://schemas.microsoft.com/office/drawing/2014/main" val="78963249"/>
+                  </a:ext>
+                </a:extLst>
+              </a:tr>
+              <a:tr h="370840">
+                <a:tc>
+                  <a:txBody>
+                    <a:bodyPr/>
+                    <a:lstStyle/>
+                    <a:p>
+                      <a:pPr algn="ctr"/>
+                      <a:r>
+                        <a:rPr lang="en-US" dirty="0"/>
+                        <a:t>614</a:t>
+                      </a:r>
+                    </a:p>
+                  </a:txBody>
+                  <a:tcPr/>
+                </a:tc>
+                <a:tc>
+                  <a:txBody>
+                    <a:bodyPr/>
+                    <a:lstStyle/>
+                    <a:p>
+                      <a:pPr algn="ctr"/>
+                      <a:r>
+                        <a:rPr lang="en-US" dirty="0"/>
+                        <a:t>255</a:t>
+                      </a:r>
+                    </a:p>
+                  </a:txBody>
+                  <a:tcPr/>
+                </a:tc>
+                <a:tc>
+                  <a:txBody>
+                    <a:bodyPr/>
+                    <a:lstStyle/>
+                    <a:p>
+                      <a:pPr algn="ctr"/>
+                      <a:r>
+                        <a:rPr lang="en-US" dirty="0"/>
+                        <a:t>314.20</a:t>
+                      </a:r>
+                    </a:p>
+                  </a:txBody>
+                  <a:tcPr/>
+                </a:tc>
+                <a:extLst>
+                  <a:ext uri="{0D108BD9-81ED-4DB2-BD59-A6C34878D82A}">
+                    <a16:rowId xmlns:a16="http://schemas.microsoft.com/office/drawing/2014/main" val="1204660429"/>
+                  </a:ext>
+                </a:extLst>
+              </a:tr>
+            </a:tbl>
+          </a:graphicData>
+        </a:graphic>
+      </p:graphicFrame>
+      <p:graphicFrame>
+        <p:nvGraphicFramePr>
+          <p:cNvPr id="7" name="Table 6"/>
+          <p:cNvGraphicFramePr>
+            <a:graphicFrameLocks noGrp="1"/>
+          </p:cNvGraphicFramePr>
+          <p:nvPr>
+            <p:extLst>
+              <p:ext uri="{D42A27DB-BD31-4B8C-83A1-F6EECF244321}">
+                <p14:modId xmlns:p14="http://schemas.microsoft.com/office/powerpoint/2010/main" val="2837550199"/>
+              </p:ext>
+            </p:extLst>
+          </p:nvPr>
+        </p:nvGraphicFramePr>
+        <p:xfrm>
+          <a:off x="1097280" y="5117498"/>
+          <a:ext cx="10058400" cy="741680"/>
+        </p:xfrm>
+        <a:graphic>
+          <a:graphicData uri="http://schemas.openxmlformats.org/drawingml/2006/table">
+            <a:tbl>
+              <a:tblPr firstRow="1" bandRow="1">
+                <a:tableStyleId>{5C22544A-7EE6-4342-B048-85BDC9FD1C3A}</a:tableStyleId>
+              </a:tblPr>
+              <a:tblGrid>
+                <a:gridCol w="1331288">
+                  <a:extLst>
+                    <a:ext uri="{9D8B030D-6E8A-4147-A177-3AD203B41FA5}">
+                      <a16:colId xmlns:a16="http://schemas.microsoft.com/office/drawing/2014/main" val="2296600065"/>
+                    </a:ext>
+                  </a:extLst>
+                </a:gridCol>
+                <a:gridCol w="1543664">
+                  <a:extLst>
+                    <a:ext uri="{9D8B030D-6E8A-4147-A177-3AD203B41FA5}">
+                      <a16:colId xmlns:a16="http://schemas.microsoft.com/office/drawing/2014/main" val="2275269473"/>
+                    </a:ext>
+                  </a:extLst>
+                </a:gridCol>
+                <a:gridCol w="1828800">
+                  <a:extLst>
+                    <a:ext uri="{9D8B030D-6E8A-4147-A177-3AD203B41FA5}">
+                      <a16:colId xmlns:a16="http://schemas.microsoft.com/office/drawing/2014/main" val="1429109194"/>
+                    </a:ext>
+                  </a:extLst>
+                </a:gridCol>
+                <a:gridCol w="2635045">
+                  <a:extLst>
+                    <a:ext uri="{9D8B030D-6E8A-4147-A177-3AD203B41FA5}">
+                      <a16:colId xmlns:a16="http://schemas.microsoft.com/office/drawing/2014/main" val="206426635"/>
+                    </a:ext>
+                  </a:extLst>
+                </a:gridCol>
+                <a:gridCol w="2719603">
+                  <a:extLst>
+                    <a:ext uri="{9D8B030D-6E8A-4147-A177-3AD203B41FA5}">
+                      <a16:colId xmlns:a16="http://schemas.microsoft.com/office/drawing/2014/main" val="3148064752"/>
+                    </a:ext>
+                  </a:extLst>
+                </a:gridCol>
+              </a:tblGrid>
+              <a:tr h="370840">
+                <a:tc>
+                  <a:txBody>
+                    <a:bodyPr/>
+                    <a:lstStyle/>
+                    <a:p>
+                      <a:pPr algn="ctr"/>
+                      <a:r>
+                        <a:rPr lang="en-US" dirty="0"/>
+                        <a:t>Max Files</a:t>
+                      </a:r>
+                    </a:p>
+                  </a:txBody>
+                  <a:tcPr/>
+                </a:tc>
+                <a:tc>
+                  <a:txBody>
+                    <a:bodyPr/>
+                    <a:lstStyle/>
+                    <a:p>
+                      <a:pPr algn="ctr"/>
+                      <a:r>
+                        <a:rPr lang="en-US" dirty="0"/>
+                        <a:t>Min</a:t>
+                      </a:r>
+                      <a:r>
+                        <a:rPr lang="en-US" baseline="0" dirty="0"/>
+                        <a:t> Files</a:t>
+                      </a:r>
+                      <a:endParaRPr lang="en-US" dirty="0"/>
+                    </a:p>
+                  </a:txBody>
+                  <a:tcPr/>
+                </a:tc>
+                <a:tc>
+                  <a:txBody>
+                    <a:bodyPr/>
+                    <a:lstStyle/>
+                    <a:p>
+                      <a:pPr algn="ctr"/>
+                      <a:r>
+                        <a:rPr lang="en-US" dirty="0"/>
+                        <a:t>Average Files</a:t>
+                      </a:r>
+                    </a:p>
+                  </a:txBody>
+                  <a:tcPr/>
+                </a:tc>
+                <a:tc>
+                  <a:txBody>
+                    <a:bodyPr/>
+                    <a:lstStyle/>
+                    <a:p>
+                      <a:pPr algn="ctr"/>
+                      <a:r>
+                        <a:rPr lang="en-US" dirty="0"/>
+                        <a:t>Average Commits Per</a:t>
+                      </a:r>
+                      <a:r>
+                        <a:rPr lang="en-US" baseline="0" dirty="0"/>
+                        <a:t> File</a:t>
+                      </a:r>
+                      <a:endParaRPr lang="en-US" dirty="0"/>
+                    </a:p>
+                  </a:txBody>
+                  <a:tcPr/>
+                </a:tc>
+                <a:tc>
+                  <a:txBody>
+                    <a:bodyPr/>
+                    <a:lstStyle/>
+                    <a:p>
+                      <a:pPr algn="ctr"/>
+                      <a:r>
+                        <a:rPr lang="en-US" dirty="0"/>
+                        <a:t>Average Bug Fixes Per File</a:t>
+                      </a:r>
+                    </a:p>
+                  </a:txBody>
+                  <a:tcPr/>
+                </a:tc>
+                <a:extLst>
+                  <a:ext uri="{0D108BD9-81ED-4DB2-BD59-A6C34878D82A}">
+                    <a16:rowId xmlns:a16="http://schemas.microsoft.com/office/drawing/2014/main" val="1737069292"/>
+                  </a:ext>
+                </a:extLst>
+              </a:tr>
+              <a:tr h="370840">
+                <a:tc>
+                  <a:txBody>
+                    <a:bodyPr/>
+                    <a:lstStyle/>
+                    <a:p>
+                      <a:pPr algn="ctr"/>
+                      <a:r>
+                        <a:rPr lang="en-US" dirty="0"/>
+                        <a:t>11,935</a:t>
+                      </a:r>
+                    </a:p>
+                  </a:txBody>
+                  <a:tcPr/>
+                </a:tc>
+                <a:tc>
+                  <a:txBody>
+                    <a:bodyPr/>
+                    <a:lstStyle/>
+                    <a:p>
+                      <a:pPr algn="ctr"/>
+                      <a:r>
+                        <a:rPr lang="en-US" dirty="0"/>
+                        <a:t>1,451</a:t>
+                      </a:r>
+                    </a:p>
+                  </a:txBody>
+                  <a:tcPr/>
+                </a:tc>
+                <a:tc>
+                  <a:txBody>
+                    <a:bodyPr/>
+                    <a:lstStyle/>
+                    <a:p>
+                      <a:pPr algn="ctr"/>
+                      <a:r>
+                        <a:rPr lang="en-US" dirty="0"/>
+                        <a:t>3,281.73</a:t>
+                      </a:r>
+                    </a:p>
+                  </a:txBody>
+                  <a:tcPr/>
+                </a:tc>
+                <a:tc>
+                  <a:txBody>
+                    <a:bodyPr/>
+                    <a:lstStyle/>
+                    <a:p>
+                      <a:pPr algn="ctr"/>
+                      <a:r>
+                        <a:rPr lang="en-US" dirty="0"/>
+                        <a:t>42.80</a:t>
+                      </a:r>
+                    </a:p>
+                  </a:txBody>
+                  <a:tcPr/>
+                </a:tc>
+                <a:tc>
+                  <a:txBody>
+                    <a:bodyPr/>
+                    <a:lstStyle/>
+                    <a:p>
+                      <a:pPr algn="ctr"/>
+                      <a:r>
+                        <a:rPr lang="en-US" dirty="0"/>
+                        <a:t>7.12</a:t>
+                      </a:r>
+                    </a:p>
+                  </a:txBody>
+                  <a:tcPr/>
+                </a:tc>
+                <a:extLst>
+                  <a:ext uri="{0D108BD9-81ED-4DB2-BD59-A6C34878D82A}">
+                    <a16:rowId xmlns:a16="http://schemas.microsoft.com/office/drawing/2014/main" val="892322457"/>
+                  </a:ext>
+                </a:extLst>
+              </a:tr>
+            </a:tbl>
+          </a:graphicData>
+        </a:graphic>
+      </p:graphicFrame>
+    </p:spTree>
+    <p:extLst>
+      <p:ext uri="{BB962C8B-B14F-4D97-AF65-F5344CB8AC3E}">
+        <p14:creationId xmlns:p14="http://schemas.microsoft.com/office/powerpoint/2010/main" val="4211023800"/>
+      </p:ext>
+    </p:extLst>
+  </p:cSld>
+  <p:clrMapOvr>
+    <a:masterClrMapping/>
+  </p:clrMapOvr>
+</p:sld>
+</file>
+
+<file path=ppt/slides/slide14.xml><?xml version="1.0" encoding="utf-8"?>
+<p:sld xmlns:a="http://schemas.openxmlformats.org/drawingml/2006/main" xmlns:r="http://schemas.openxmlformats.org/officeDocument/2006/relationships" xmlns:p="http://schemas.openxmlformats.org/presentationml/2006/main">
+  <p:cSld>
+    <p:spTree>
+      <p:nvGrpSpPr>
+        <p:cNvPr id="1" name=""/>
+        <p:cNvGrpSpPr/>
+        <p:nvPr/>
+      </p:nvGrpSpPr>
+      <p:grpSpPr>
+        <a:xfrm>
+          <a:off x="0" y="0"/>
+          <a:ext cx="0" cy="0"/>
+          <a:chOff x="0" y="0"/>
+          <a:chExt cx="0" cy="0"/>
+        </a:xfrm>
+      </p:grpSpPr>
+      <p:sp>
+        <p:nvSpPr>
+          <p:cNvPr id="2" name="Title 1"/>
+          <p:cNvSpPr>
+            <a:spLocks noGrp="1"/>
+          </p:cNvSpPr>
+          <p:nvPr>
+            <p:ph type="title"/>
+          </p:nvPr>
+        </p:nvSpPr>
+        <p:spPr/>
+        <p:txBody>
+          <a:bodyPr/>
+          <a:lstStyle/>
+          <a:p>
+            <a:r>
+              <a:rPr lang="en-US" dirty="0"/>
+              <a:t>Spearman Correlation Results</a:t>
+            </a:r>
+          </a:p>
+        </p:txBody>
+      </p:sp>
+      <p:sp>
+        <p:nvSpPr>
+          <p:cNvPr id="3" name="Content Placeholder 2"/>
+          <p:cNvSpPr>
+            <a:spLocks noGrp="1"/>
+          </p:cNvSpPr>
+          <p:nvPr>
+            <p:ph idx="1"/>
+          </p:nvPr>
+        </p:nvSpPr>
+        <p:spPr/>
+        <p:txBody>
+          <a:bodyPr/>
+          <a:lstStyle/>
+          <a:p>
+            <a:endParaRPr lang="en-US"/>
+          </a:p>
+        </p:txBody>
+      </p:sp>
+    </p:spTree>
+    <p:extLst>
+      <p:ext uri="{BB962C8B-B14F-4D97-AF65-F5344CB8AC3E}">
+        <p14:creationId xmlns:p14="http://schemas.microsoft.com/office/powerpoint/2010/main" val="1866251307"/>
+      </p:ext>
+    </p:extLst>
+  </p:cSld>
+  <p:clrMapOvr>
+    <a:masterClrMapping/>
+  </p:clrMapOvr>
+</p:sld>
+</file>
+
+<file path=ppt/slides/slide15.xml><?xml version="1.0" encoding="utf-8"?>
+<p:sld xmlns:a="http://schemas.openxmlformats.org/drawingml/2006/main" xmlns:r="http://schemas.openxmlformats.org/officeDocument/2006/relationships" xmlns:p="http://schemas.openxmlformats.org/presentationml/2006/main">
+  <p:cSld>
+    <p:spTree>
+      <p:nvGrpSpPr>
+        <p:cNvPr id="1" name=""/>
+        <p:cNvGrpSpPr/>
+        <p:nvPr/>
+      </p:nvGrpSpPr>
+      <p:grpSpPr>
+        <a:xfrm>
+          <a:off x="0" y="0"/>
+          <a:ext cx="0" cy="0"/>
+          <a:chOff x="0" y="0"/>
+          <a:chExt cx="0" cy="0"/>
+        </a:xfrm>
+      </p:grpSpPr>
+      <p:sp>
+        <p:nvSpPr>
+          <p:cNvPr id="2" name="Title 1"/>
+          <p:cNvSpPr>
+            <a:spLocks noGrp="1"/>
+          </p:cNvSpPr>
+          <p:nvPr>
+            <p:ph type="title"/>
+          </p:nvPr>
+        </p:nvSpPr>
+        <p:spPr/>
+        <p:txBody>
+          <a:bodyPr/>
+          <a:lstStyle/>
+          <a:p>
+            <a:r>
+              <a:rPr lang="en-US" dirty="0"/>
+              <a:t>Logistical Regression</a:t>
+            </a:r>
+          </a:p>
+        </p:txBody>
+      </p:sp>
+      <p:sp>
+        <p:nvSpPr>
+          <p:cNvPr id="3" name="Content Placeholder 2"/>
+          <p:cNvSpPr>
+            <a:spLocks noGrp="1"/>
+          </p:cNvSpPr>
+          <p:nvPr>
+            <p:ph idx="1"/>
+          </p:nvPr>
+        </p:nvSpPr>
+        <p:spPr/>
+        <p:txBody>
+          <a:bodyPr/>
+          <a:lstStyle/>
+          <a:p>
+            <a:endParaRPr lang="en-US"/>
+          </a:p>
+        </p:txBody>
+      </p:sp>
+    </p:spTree>
+    <p:extLst>
+      <p:ext uri="{BB962C8B-B14F-4D97-AF65-F5344CB8AC3E}">
+        <p14:creationId xmlns:p14="http://schemas.microsoft.com/office/powerpoint/2010/main" val="3340033311"/>
+      </p:ext>
+    </p:extLst>
+  </p:cSld>
+  <p:clrMapOvr>
+    <a:masterClrMapping/>
+  </p:clrMapOvr>
+</p:sld>
+</file>
+
+<file path=ppt/slides/slide16.xml><?xml version="1.0" encoding="utf-8"?>
+<p:sld xmlns:a="http://schemas.openxmlformats.org/drawingml/2006/main" xmlns:r="http://schemas.openxmlformats.org/officeDocument/2006/relationships" xmlns:p="http://schemas.openxmlformats.org/presentationml/2006/main">
+  <p:cSld>
+    <p:spTree>
+      <p:nvGrpSpPr>
+        <p:cNvPr id="1" name=""/>
+        <p:cNvGrpSpPr/>
+        <p:nvPr/>
+      </p:nvGrpSpPr>
+      <p:grpSpPr>
+        <a:xfrm>
+          <a:off x="0" y="0"/>
+          <a:ext cx="0" cy="0"/>
+          <a:chOff x="0" y="0"/>
+          <a:chExt cx="0" cy="0"/>
+        </a:xfrm>
+      </p:grpSpPr>
+      <p:sp>
+        <p:nvSpPr>
+          <p:cNvPr id="2" name="Title 1"/>
+          <p:cNvSpPr>
+            <a:spLocks noGrp="1"/>
+          </p:cNvSpPr>
+          <p:nvPr>
+            <p:ph type="title"/>
+          </p:nvPr>
+        </p:nvSpPr>
+        <p:spPr/>
+        <p:txBody>
+          <a:bodyPr/>
+          <a:lstStyle/>
+          <a:p>
+            <a:r>
+              <a:rPr lang="en-US" dirty="0"/>
               <a:t>Conclusion</a:t>
             </a:r>
           </a:p>
@@ -5254,7 +5886,7 @@
 </p:sld>
 </file>
 
-<file path=ppt/slides/slide14.xml><?xml version="1.0" encoding="utf-8"?>
+<file path=ppt/slides/slide17.xml><?xml version="1.0" encoding="utf-8"?>
 <p:sld xmlns:a="http://schemas.openxmlformats.org/drawingml/2006/main" xmlns:r="http://schemas.openxmlformats.org/officeDocument/2006/relationships" xmlns:p="http://schemas.openxmlformats.org/presentationml/2006/main">
   <p:cSld>
     <p:spTree>
@@ -5875,14 +6507,8 @@
           <a:p>
             <a:r>
               <a:rPr lang="en-US" dirty="0"/>
-              <a:t>With large repositories of software data, can we test the results discovered by Pingzer, et al. in other domains?</a:t>
-            </a:r>
-          </a:p>
-          <a:p>
-            <a:endParaRPr lang="en-US" dirty="0"/>
-          </a:p>
-          <a:p>
-            <a:endParaRPr lang="en-US" dirty="0"/>
+              <a:t>Are developer-module networks valid predictors of failures in other domains?</a:t>
+            </a:r>
           </a:p>
         </p:txBody>
       </p:sp>
@@ -5950,12 +6576,50 @@
         </p:nvSpPr>
         <p:spPr/>
         <p:txBody>
-          <a:bodyPr/>
+          <a:bodyPr>
+            <a:normAutofit lnSpcReduction="10000"/>
+          </a:bodyPr>
           <a:lstStyle/>
           <a:p>
             <a:r>
               <a:rPr lang="en-US" dirty="0"/>
-              <a:t>Windows Vista is a massive software project with thousands of developers and binaries.</a:t>
+              <a:t>GitHub hosts tens of thousands of different projects:</a:t>
+            </a:r>
+          </a:p>
+          <a:p>
+            <a:pPr lvl="1"/>
+            <a:r>
+              <a:rPr lang="en-US" i="1" dirty="0"/>
+              <a:t>Open-source</a:t>
+            </a:r>
+          </a:p>
+          <a:p>
+            <a:pPr lvl="1"/>
+            <a:r>
+              <a:rPr lang="en-US" i="1" dirty="0"/>
+              <a:t>Hobbyist.</a:t>
+            </a:r>
+          </a:p>
+          <a:p>
+            <a:pPr lvl="1"/>
+            <a:endParaRPr lang="en-US" b="1" dirty="0"/>
+          </a:p>
+          <a:p>
+            <a:r>
+              <a:rPr lang="en-US" dirty="0"/>
+              <a:t>GitHub contains a wealth of data.</a:t>
+            </a:r>
+          </a:p>
+          <a:p>
+            <a:pPr marL="58737" indent="0">
+              <a:buNone/>
+            </a:pPr>
+            <a:endParaRPr lang="en-US" dirty="0"/>
+          </a:p>
+          <a:p>
+            <a:r>
+              <a:rPr lang="en-US" b="1" dirty="0"/>
+              <a:t>Why don’t we build developer-module networks for a slew of GitHub projects?</a:t>
             </a:r>
           </a:p>
           <a:p>

</xml_diff>

<commit_message>
Updated the Logistic Regression system
</commit_message>
<xml_diff>
--- a/Final-Presentation/Presentation.pptx
+++ b/Final-Presentation/Presentation.pptx
@@ -11,17 +11,19 @@
     <p:sldId id="264" r:id="rId5"/>
     <p:sldId id="267" r:id="rId6"/>
     <p:sldId id="262" r:id="rId7"/>
-    <p:sldId id="257" r:id="rId8"/>
-    <p:sldId id="259" r:id="rId9"/>
-    <p:sldId id="268" r:id="rId10"/>
-    <p:sldId id="269" r:id="rId11"/>
-    <p:sldId id="271" r:id="rId12"/>
-    <p:sldId id="270" r:id="rId13"/>
-    <p:sldId id="273" r:id="rId14"/>
-    <p:sldId id="274" r:id="rId15"/>
-    <p:sldId id="275" r:id="rId16"/>
-    <p:sldId id="272" r:id="rId17"/>
-    <p:sldId id="265" r:id="rId18"/>
+    <p:sldId id="276" r:id="rId8"/>
+    <p:sldId id="257" r:id="rId9"/>
+    <p:sldId id="259" r:id="rId10"/>
+    <p:sldId id="268" r:id="rId11"/>
+    <p:sldId id="269" r:id="rId12"/>
+    <p:sldId id="271" r:id="rId13"/>
+    <p:sldId id="270" r:id="rId14"/>
+    <p:sldId id="273" r:id="rId15"/>
+    <p:sldId id="274" r:id="rId16"/>
+    <p:sldId id="275" r:id="rId17"/>
+    <p:sldId id="277" r:id="rId18"/>
+    <p:sldId id="272" r:id="rId19"/>
+    <p:sldId id="265" r:id="rId20"/>
   </p:sldIdLst>
   <p:sldSz cx="12192000" cy="6858000"/>
   <p:notesSz cx="6858000" cy="9144000"/>
@@ -139,6 +141,7 @@
         <p14:section name="Methodology" id="{04ADD487-94DA-47EC-AF72-3116CF1CA6D9}">
           <p14:sldIdLst>
             <p14:sldId id="262"/>
+            <p14:sldId id="276"/>
             <p14:sldId id="257"/>
             <p14:sldId id="259"/>
             <p14:sldId id="268"/>
@@ -152,6 +155,7 @@
             <p14:sldId id="273"/>
             <p14:sldId id="274"/>
             <p14:sldId id="275"/>
+            <p14:sldId id="277"/>
           </p14:sldIdLst>
         </p14:section>
         <p14:section name="Conclusion" id="{8D9BA467-BE11-41EB-8F5E-434DA548520F}">
@@ -393,7 +397,7 @@
           <a:p>
             <a:fld id="{CA586F88-EEB5-4979-9532-C99075E35C56}" type="datetimeFigureOut">
               <a:rPr lang="en-US" smtClean="0"/>
-              <a:t>3/24/2016</a:t>
+              <a:t>3/25/2016</a:t>
             </a:fld>
             <a:endParaRPr lang="en-US"/>
           </a:p>
@@ -567,7 +571,7 @@
           <a:p>
             <a:fld id="{CA586F88-EEB5-4979-9532-C99075E35C56}" type="datetimeFigureOut">
               <a:rPr lang="en-US" smtClean="0"/>
-              <a:t>3/24/2016</a:t>
+              <a:t>3/25/2016</a:t>
             </a:fld>
             <a:endParaRPr lang="en-US"/>
           </a:p>
@@ -823,7 +827,7 @@
           <a:p>
             <a:fld id="{CA586F88-EEB5-4979-9532-C99075E35C56}" type="datetimeFigureOut">
               <a:rPr lang="en-US" smtClean="0"/>
-              <a:t>3/24/2016</a:t>
+              <a:t>3/25/2016</a:t>
             </a:fld>
             <a:endParaRPr lang="en-US"/>
           </a:p>
@@ -1000,7 +1004,7 @@
           <a:p>
             <a:fld id="{CA586F88-EEB5-4979-9532-C99075E35C56}" type="datetimeFigureOut">
               <a:rPr lang="en-US" smtClean="0"/>
-              <a:t>3/24/2016</a:t>
+              <a:t>3/25/2016</a:t>
             </a:fld>
             <a:endParaRPr lang="en-US"/>
           </a:p>
@@ -1343,7 +1347,7 @@
           <a:p>
             <a:fld id="{CA586F88-EEB5-4979-9532-C99075E35C56}" type="datetimeFigureOut">
               <a:rPr lang="en-US" smtClean="0"/>
-              <a:t>3/24/2016</a:t>
+              <a:t>3/25/2016</a:t>
             </a:fld>
             <a:endParaRPr lang="en-US"/>
           </a:p>
@@ -1618,7 +1622,7 @@
           <a:p>
             <a:fld id="{CA586F88-EEB5-4979-9532-C99075E35C56}" type="datetimeFigureOut">
               <a:rPr lang="en-US" smtClean="0"/>
-              <a:t>3/24/2016</a:t>
+              <a:t>3/25/2016</a:t>
             </a:fld>
             <a:endParaRPr lang="en-US"/>
           </a:p>
@@ -1997,7 +2001,7 @@
           <a:p>
             <a:fld id="{CA586F88-EEB5-4979-9532-C99075E35C56}" type="datetimeFigureOut">
               <a:rPr lang="en-US" smtClean="0"/>
-              <a:t>3/24/2016</a:t>
+              <a:t>3/25/2016</a:t>
             </a:fld>
             <a:endParaRPr lang="en-US"/>
           </a:p>
@@ -2115,7 +2119,7 @@
           <a:p>
             <a:fld id="{CA586F88-EEB5-4979-9532-C99075E35C56}" type="datetimeFigureOut">
               <a:rPr lang="en-US" smtClean="0"/>
-              <a:t>3/24/2016</a:t>
+              <a:t>3/25/2016</a:t>
             </a:fld>
             <a:endParaRPr lang="en-US"/>
           </a:p>
@@ -2286,7 +2290,7 @@
           <a:p>
             <a:fld id="{CA586F88-EEB5-4979-9532-C99075E35C56}" type="datetimeFigureOut">
               <a:rPr lang="en-US" smtClean="0"/>
-              <a:t>3/24/2016</a:t>
+              <a:t>3/25/2016</a:t>
             </a:fld>
             <a:endParaRPr lang="en-US"/>
           </a:p>
@@ -2640,7 +2644,7 @@
           <a:p>
             <a:fld id="{CA586F88-EEB5-4979-9532-C99075E35C56}" type="datetimeFigureOut">
               <a:rPr lang="en-US" smtClean="0"/>
-              <a:t>3/24/2016</a:t>
+              <a:t>3/25/2016</a:t>
             </a:fld>
             <a:endParaRPr lang="en-US"/>
           </a:p>
@@ -3022,7 +3026,7 @@
           <a:p>
             <a:fld id="{CA586F88-EEB5-4979-9532-C99075E35C56}" type="datetimeFigureOut">
               <a:rPr lang="en-US" smtClean="0"/>
-              <a:t>3/24/2016</a:t>
+              <a:t>3/25/2016</a:t>
             </a:fld>
             <a:endParaRPr lang="en-US"/>
           </a:p>
@@ -3308,7 +3312,7 @@
           <a:p>
             <a:fld id="{CA586F88-EEB5-4979-9532-C99075E35C56}" type="datetimeFigureOut">
               <a:rPr lang="en-US" smtClean="0"/>
-              <a:t>3/24/2016</a:t>
+              <a:t>3/25/2016</a:t>
             </a:fld>
             <a:endParaRPr lang="en-US"/>
           </a:p>
@@ -4093,6 +4097,149 @@
           <a:p>
             <a:r>
               <a:rPr lang="en-US" dirty="0"/>
+              <a:t>Methodology</a:t>
+            </a:r>
+          </a:p>
+        </p:txBody>
+      </p:sp>
+      <p:sp>
+        <p:nvSpPr>
+          <p:cNvPr id="3" name="Content Placeholder 2"/>
+          <p:cNvSpPr>
+            <a:spLocks noGrp="1"/>
+          </p:cNvSpPr>
+          <p:nvPr>
+            <p:ph idx="1"/>
+          </p:nvPr>
+        </p:nvSpPr>
+        <p:spPr/>
+        <p:txBody>
+          <a:bodyPr/>
+          <a:lstStyle/>
+          <a:p>
+            <a:pPr marL="573087" indent="-514350">
+              <a:buFont typeface="+mj-lt"/>
+              <a:buAutoNum type="arabicPeriod"/>
+            </a:pPr>
+            <a:r>
+              <a:rPr lang="en-US" dirty="0"/>
+              <a:t>Determine adequate projects stored in Boa.</a:t>
+            </a:r>
+          </a:p>
+          <a:p>
+            <a:pPr marL="573087" indent="-514350">
+              <a:buFont typeface="+mj-lt"/>
+              <a:buAutoNum type="arabicPeriod"/>
+            </a:pPr>
+            <a:r>
+              <a:rPr lang="en-US" dirty="0"/>
+              <a:t>Pull associated file, user, and commit information for a desired project.</a:t>
+            </a:r>
+          </a:p>
+          <a:p>
+            <a:pPr marL="573087" indent="-514350">
+              <a:buFont typeface="+mj-lt"/>
+              <a:buAutoNum type="arabicPeriod"/>
+            </a:pPr>
+            <a:r>
+              <a:rPr lang="en-US" dirty="0"/>
+              <a:t>Build contribution network from the project data.</a:t>
+            </a:r>
+          </a:p>
+          <a:p>
+            <a:pPr marL="573087" indent="-514350">
+              <a:buFont typeface="+mj-lt"/>
+              <a:buAutoNum type="arabicPeriod"/>
+            </a:pPr>
+            <a:r>
+              <a:rPr lang="en-US" dirty="0"/>
+              <a:t>Compute </a:t>
+            </a:r>
+            <a:r>
+              <a:rPr lang="en-US" dirty="0" err="1"/>
+              <a:t>betweenness</a:t>
+            </a:r>
+            <a:r>
+              <a:rPr lang="en-US" dirty="0"/>
+              <a:t>, closeness, and degree centrality.</a:t>
+            </a:r>
+          </a:p>
+          <a:p>
+            <a:pPr marL="573087" indent="-514350">
+              <a:buFont typeface="+mj-lt"/>
+              <a:buAutoNum type="arabicPeriod"/>
+            </a:pPr>
+            <a:r>
+              <a:rPr lang="en-US" dirty="0"/>
+              <a:t>Run logical regression on the social network and determine </a:t>
+            </a:r>
+            <a:r>
+              <a:rPr lang="en-US" b="1" dirty="0"/>
+              <a:t>precision</a:t>
+            </a:r>
+            <a:r>
+              <a:rPr lang="en-US" dirty="0"/>
+              <a:t> and </a:t>
+            </a:r>
+            <a:r>
+              <a:rPr lang="en-US" b="1" dirty="0"/>
+              <a:t>recall</a:t>
+            </a:r>
+            <a:r>
+              <a:rPr lang="en-US" dirty="0"/>
+              <a:t>.</a:t>
+            </a:r>
+            <a:endParaRPr lang="en-US" b="1" dirty="0"/>
+          </a:p>
+        </p:txBody>
+      </p:sp>
+    </p:spTree>
+    <p:extLst>
+      <p:ext uri="{BB962C8B-B14F-4D97-AF65-F5344CB8AC3E}">
+        <p14:creationId xmlns:p14="http://schemas.microsoft.com/office/powerpoint/2010/main" val="486631603"/>
+      </p:ext>
+    </p:extLst>
+  </p:cSld>
+  <p:clrMapOvr>
+    <a:masterClrMapping/>
+  </p:clrMapOvr>
+</p:sld>
+</file>
+
+<file path=ppt/slides/slide11.xml><?xml version="1.0" encoding="utf-8"?>
+<p:sld xmlns:a="http://schemas.openxmlformats.org/drawingml/2006/main" xmlns:r="http://schemas.openxmlformats.org/officeDocument/2006/relationships" xmlns:p="http://schemas.openxmlformats.org/presentationml/2006/main">
+  <p:cSld>
+    <p:spTree>
+      <p:nvGrpSpPr>
+        <p:cNvPr id="1" name=""/>
+        <p:cNvGrpSpPr/>
+        <p:nvPr/>
+      </p:nvGrpSpPr>
+      <p:grpSpPr>
+        <a:xfrm>
+          <a:off x="0" y="0"/>
+          <a:ext cx="0" cy="0"/>
+          <a:chOff x="0" y="0"/>
+          <a:chExt cx="0" cy="0"/>
+        </a:xfrm>
+      </p:grpSpPr>
+      <p:sp>
+        <p:nvSpPr>
+          <p:cNvPr id="2" name="Title 1"/>
+          <p:cNvSpPr>
+            <a:spLocks noGrp="1"/>
+          </p:cNvSpPr>
+          <p:nvPr>
+            <p:ph type="title"/>
+          </p:nvPr>
+        </p:nvSpPr>
+        <p:spPr/>
+        <p:txBody>
+          <a:bodyPr/>
+          <a:lstStyle/>
+          <a:p>
+            <a:r>
+              <a:rPr lang="en-US" dirty="0"/>
               <a:t>Software Tool: </a:t>
             </a:r>
             <a:r>
@@ -4537,7 +4684,7 @@
 </p:sld>
 </file>
 
-<file path=ppt/slides/slide11.xml><?xml version="1.0" encoding="utf-8"?>
+<file path=ppt/slides/slide12.xml><?xml version="1.0" encoding="utf-8"?>
 <p:sld xmlns:a="http://schemas.openxmlformats.org/drawingml/2006/main" xmlns:r="http://schemas.openxmlformats.org/officeDocument/2006/relationships" xmlns:p="http://schemas.openxmlformats.org/presentationml/2006/main">
   <p:cSld>
     <p:spTree>
@@ -4623,7 +4770,7 @@
 </p:sld>
 </file>
 
-<file path=ppt/slides/slide12.xml><?xml version="1.0" encoding="utf-8"?>
+<file path=ppt/slides/slide13.xml><?xml version="1.0" encoding="utf-8"?>
 <p:sld xmlns:a="http://schemas.openxmlformats.org/drawingml/2006/main" xmlns:r="http://schemas.openxmlformats.org/officeDocument/2006/relationships" xmlns:p="http://schemas.openxmlformats.org/presentationml/2006/main">
   <p:cSld>
     <p:spTree>
@@ -5195,7 +5342,7 @@
 </p:sld>
 </file>
 
-<file path=ppt/slides/slide13.xml><?xml version="1.0" encoding="utf-8"?>
+<file path=ppt/slides/slide14.xml><?xml version="1.0" encoding="utf-8"?>
 <p:sld xmlns:a="http://schemas.openxmlformats.org/drawingml/2006/main" xmlns:r="http://schemas.openxmlformats.org/officeDocument/2006/relationships" xmlns:p="http://schemas.openxmlformats.org/presentationml/2006/main">
   <p:cSld>
     <p:spTree>
@@ -5673,77 +5820,6 @@
 </p:sld>
 </file>
 
-<file path=ppt/slides/slide14.xml><?xml version="1.0" encoding="utf-8"?>
-<p:sld xmlns:a="http://schemas.openxmlformats.org/drawingml/2006/main" xmlns:r="http://schemas.openxmlformats.org/officeDocument/2006/relationships" xmlns:p="http://schemas.openxmlformats.org/presentationml/2006/main">
-  <p:cSld>
-    <p:spTree>
-      <p:nvGrpSpPr>
-        <p:cNvPr id="1" name=""/>
-        <p:cNvGrpSpPr/>
-        <p:nvPr/>
-      </p:nvGrpSpPr>
-      <p:grpSpPr>
-        <a:xfrm>
-          <a:off x="0" y="0"/>
-          <a:ext cx="0" cy="0"/>
-          <a:chOff x="0" y="0"/>
-          <a:chExt cx="0" cy="0"/>
-        </a:xfrm>
-      </p:grpSpPr>
-      <p:sp>
-        <p:nvSpPr>
-          <p:cNvPr id="2" name="Title 1"/>
-          <p:cNvSpPr>
-            <a:spLocks noGrp="1"/>
-          </p:cNvSpPr>
-          <p:nvPr>
-            <p:ph type="title"/>
-          </p:nvPr>
-        </p:nvSpPr>
-        <p:spPr/>
-        <p:txBody>
-          <a:bodyPr/>
-          <a:lstStyle/>
-          <a:p>
-            <a:r>
-              <a:rPr lang="en-US" dirty="0"/>
-              <a:t>Spearman Correlation Results</a:t>
-            </a:r>
-          </a:p>
-        </p:txBody>
-      </p:sp>
-      <p:sp>
-        <p:nvSpPr>
-          <p:cNvPr id="3" name="Content Placeholder 2"/>
-          <p:cNvSpPr>
-            <a:spLocks noGrp="1"/>
-          </p:cNvSpPr>
-          <p:nvPr>
-            <p:ph idx="1"/>
-          </p:nvPr>
-        </p:nvSpPr>
-        <p:spPr/>
-        <p:txBody>
-          <a:bodyPr/>
-          <a:lstStyle/>
-          <a:p>
-            <a:endParaRPr lang="en-US"/>
-          </a:p>
-        </p:txBody>
-      </p:sp>
-    </p:spTree>
-    <p:extLst>
-      <p:ext uri="{BB962C8B-B14F-4D97-AF65-F5344CB8AC3E}">
-        <p14:creationId xmlns:p14="http://schemas.microsoft.com/office/powerpoint/2010/main" val="1866251307"/>
-      </p:ext>
-    </p:extLst>
-  </p:cSld>
-  <p:clrMapOvr>
-    <a:masterClrMapping/>
-  </p:clrMapOvr>
-</p:sld>
-</file>
-
 <file path=ppt/slides/slide15.xml><?xml version="1.0" encoding="utf-8"?>
 <p:sld xmlns:a="http://schemas.openxmlformats.org/drawingml/2006/main" xmlns:r="http://schemas.openxmlformats.org/officeDocument/2006/relationships" xmlns:p="http://schemas.openxmlformats.org/presentationml/2006/main">
   <p:cSld>
@@ -5778,7 +5854,7 @@
           <a:p>
             <a:r>
               <a:rPr lang="en-US" dirty="0"/>
-              <a:t>Logistical Regression</a:t>
+              <a:t>Spearman Correlation Results</a:t>
             </a:r>
           </a:p>
         </p:txBody>
@@ -5798,14 +5874,807 @@
           <a:bodyPr/>
           <a:lstStyle/>
           <a:p>
-            <a:endParaRPr lang="en-US"/>
+            <a:r>
+              <a:rPr lang="en-US" dirty="0"/>
+              <a:t>Determines how data metrics correlate with each other.</a:t>
+            </a:r>
+          </a:p>
+          <a:p>
+            <a:r>
+              <a:rPr lang="en-US" dirty="0"/>
+              <a:t>Values +/-0.7 are considered significant.</a:t>
+            </a:r>
+          </a:p>
+          <a:p>
+            <a:pPr marL="58737" indent="0">
+              <a:buNone/>
+            </a:pPr>
+            <a:endParaRPr lang="en-US" dirty="0"/>
+          </a:p>
+        </p:txBody>
+      </p:sp>
+      <p:graphicFrame>
+        <p:nvGraphicFramePr>
+          <p:cNvPr id="4" name="Table 3"/>
+          <p:cNvGraphicFramePr>
+            <a:graphicFrameLocks noGrp="1"/>
+          </p:cNvGraphicFramePr>
+          <p:nvPr>
+            <p:extLst>
+              <p:ext uri="{D42A27DB-BD31-4B8C-83A1-F6EECF244321}">
+                <p14:modId xmlns:p14="http://schemas.microsoft.com/office/powerpoint/2010/main" val="3354129531"/>
+              </p:ext>
+            </p:extLst>
+          </p:nvPr>
+        </p:nvGraphicFramePr>
+        <p:xfrm>
+          <a:off x="2062479" y="3285885"/>
+          <a:ext cx="8128002" cy="2225040"/>
+        </p:xfrm>
+        <a:graphic>
+          <a:graphicData uri="http://schemas.openxmlformats.org/drawingml/2006/table">
+            <a:tbl>
+              <a:tblPr firstRow="1" bandRow="1">
+                <a:tableStyleId>{B301B821-A1FF-4177-AEE7-76D212191A09}</a:tableStyleId>
+              </a:tblPr>
+              <a:tblGrid>
+                <a:gridCol w="1477134">
+                  <a:extLst>
+                    <a:ext uri="{9D8B030D-6E8A-4147-A177-3AD203B41FA5}">
+                      <a16:colId xmlns:a16="http://schemas.microsoft.com/office/drawing/2014/main" val="1197910584"/>
+                    </a:ext>
+                  </a:extLst>
+                </a:gridCol>
+                <a:gridCol w="1232200">
+                  <a:extLst>
+                    <a:ext uri="{9D8B030D-6E8A-4147-A177-3AD203B41FA5}">
+                      <a16:colId xmlns:a16="http://schemas.microsoft.com/office/drawing/2014/main" val="4077819383"/>
+                    </a:ext>
+                  </a:extLst>
+                </a:gridCol>
+                <a:gridCol w="1354667">
+                  <a:extLst>
+                    <a:ext uri="{9D8B030D-6E8A-4147-A177-3AD203B41FA5}">
+                      <a16:colId xmlns:a16="http://schemas.microsoft.com/office/drawing/2014/main" val="1854535"/>
+                    </a:ext>
+                  </a:extLst>
+                </a:gridCol>
+                <a:gridCol w="1354667">
+                  <a:extLst>
+                    <a:ext uri="{9D8B030D-6E8A-4147-A177-3AD203B41FA5}">
+                      <a16:colId xmlns:a16="http://schemas.microsoft.com/office/drawing/2014/main" val="2762140783"/>
+                    </a:ext>
+                  </a:extLst>
+                </a:gridCol>
+                <a:gridCol w="1354667">
+                  <a:extLst>
+                    <a:ext uri="{9D8B030D-6E8A-4147-A177-3AD203B41FA5}">
+                      <a16:colId xmlns:a16="http://schemas.microsoft.com/office/drawing/2014/main" val="3246837622"/>
+                    </a:ext>
+                  </a:extLst>
+                </a:gridCol>
+                <a:gridCol w="1354667">
+                  <a:extLst>
+                    <a:ext uri="{9D8B030D-6E8A-4147-A177-3AD203B41FA5}">
+                      <a16:colId xmlns:a16="http://schemas.microsoft.com/office/drawing/2014/main" val="3082632850"/>
+                    </a:ext>
+                  </a:extLst>
+                </a:gridCol>
+              </a:tblGrid>
+              <a:tr h="370840">
+                <a:tc>
+                  <a:txBody>
+                    <a:bodyPr/>
+                    <a:lstStyle/>
+                    <a:p>
+                      <a:pPr algn="ctr"/>
+                      <a:endParaRPr lang="en-US" dirty="0"/>
+                    </a:p>
+                  </a:txBody>
+                  <a:tcPr>
+                    <a:lnL w="12700" cmpd="sng">
+                      <a:noFill/>
+                    </a:lnL>
+                    <a:lnR>
+                      <a:noFill/>
+                    </a:lnR>
+                    <a:lnT w="12700" cap="flat" cmpd="sng" algn="ctr">
+                      <a:noFill/>
+                      <a:prstDash val="solid"/>
+                      <a:round/>
+                      <a:headEnd type="none" w="med" len="med"/>
+                      <a:tailEnd type="none" w="med" len="med"/>
+                    </a:lnT>
+                    <a:lnB w="12700" cmpd="sng">
+                      <a:noFill/>
+                    </a:lnB>
+                    <a:lnTlToBr w="12700" cmpd="sng">
+                      <a:noFill/>
+                      <a:prstDash val="solid"/>
+                    </a:lnTlToBr>
+                    <a:lnBlToTr w="12700" cmpd="sng">
+                      <a:noFill/>
+                      <a:prstDash val="solid"/>
+                    </a:lnBlToTr>
+                    <a:solidFill>
+                      <a:schemeClr val="bg1"/>
+                    </a:solidFill>
+                  </a:tcPr>
+                </a:tc>
+                <a:tc>
+                  <a:txBody>
+                    <a:bodyPr/>
+                    <a:lstStyle/>
+                    <a:p>
+                      <a:pPr algn="ctr"/>
+                      <a:r>
+                        <a:rPr lang="en-US" dirty="0"/>
+                        <a:t>Commits</a:t>
+                      </a:r>
+                    </a:p>
+                  </a:txBody>
+                  <a:tcPr>
+                    <a:lnL>
+                      <a:noFill/>
+                    </a:lnL>
+                  </a:tcPr>
+                </a:tc>
+                <a:tc>
+                  <a:txBody>
+                    <a:bodyPr/>
+                    <a:lstStyle/>
+                    <a:p>
+                      <a:pPr algn="ctr"/>
+                      <a:r>
+                        <a:rPr lang="en-US" dirty="0"/>
+                        <a:t>Failures</a:t>
+                      </a:r>
+                    </a:p>
+                  </a:txBody>
+                  <a:tcPr/>
+                </a:tc>
+                <a:tc>
+                  <a:txBody>
+                    <a:bodyPr/>
+                    <a:lstStyle/>
+                    <a:p>
+                      <a:pPr algn="ctr"/>
+                      <a:r>
+                        <a:rPr lang="en-US" dirty="0" err="1"/>
+                        <a:t>Betweeness</a:t>
+                      </a:r>
+                      <a:endParaRPr lang="en-US" dirty="0"/>
+                    </a:p>
+                  </a:txBody>
+                  <a:tcPr/>
+                </a:tc>
+                <a:tc>
+                  <a:txBody>
+                    <a:bodyPr/>
+                    <a:lstStyle/>
+                    <a:p>
+                      <a:pPr algn="ctr"/>
+                      <a:r>
+                        <a:rPr lang="en-US" dirty="0"/>
+                        <a:t>Closeness</a:t>
+                      </a:r>
+                    </a:p>
+                  </a:txBody>
+                  <a:tcPr/>
+                </a:tc>
+                <a:tc>
+                  <a:txBody>
+                    <a:bodyPr/>
+                    <a:lstStyle/>
+                    <a:p>
+                      <a:pPr algn="ctr"/>
+                      <a:r>
+                        <a:rPr lang="en-US" dirty="0"/>
+                        <a:t>Degree</a:t>
+                      </a:r>
+                    </a:p>
+                  </a:txBody>
+                  <a:tcPr/>
+                </a:tc>
+                <a:extLst>
+                  <a:ext uri="{0D108BD9-81ED-4DB2-BD59-A6C34878D82A}">
+                    <a16:rowId xmlns:a16="http://schemas.microsoft.com/office/drawing/2014/main" val="2176593963"/>
+                  </a:ext>
+                </a:extLst>
+              </a:tr>
+              <a:tr h="370840">
+                <a:tc>
+                  <a:txBody>
+                    <a:bodyPr/>
+                    <a:lstStyle/>
+                    <a:p>
+                      <a:pPr algn="ctr"/>
+                      <a:r>
+                        <a:rPr lang="en-US" b="1" dirty="0">
+                          <a:solidFill>
+                            <a:schemeClr val="bg1"/>
+                          </a:solidFill>
+                        </a:rPr>
+                        <a:t>Commits</a:t>
+                      </a:r>
+                    </a:p>
+                  </a:txBody>
+                  <a:tcPr>
+                    <a:lnL w="12700" cmpd="sng">
+                      <a:noFill/>
+                    </a:lnL>
+                    <a:lnR>
+                      <a:noFill/>
+                    </a:lnR>
+                    <a:lnT w="12700" cmpd="sng">
+                      <a:noFill/>
+                    </a:lnT>
+                    <a:lnB w="12700" cmpd="sng">
+                      <a:noFill/>
+                    </a:lnB>
+                    <a:lnTlToBr w="12700" cmpd="sng">
+                      <a:noFill/>
+                      <a:prstDash val="solid"/>
+                    </a:lnTlToBr>
+                    <a:lnBlToTr w="12700" cmpd="sng">
+                      <a:noFill/>
+                      <a:prstDash val="solid"/>
+                    </a:lnBlToTr>
+                    <a:solidFill>
+                      <a:schemeClr val="accent1"/>
+                    </a:solidFill>
+                  </a:tcPr>
+                </a:tc>
+                <a:tc>
+                  <a:txBody>
+                    <a:bodyPr/>
+                    <a:lstStyle/>
+                    <a:p>
+                      <a:pPr algn="ctr"/>
+                      <a:r>
+                        <a:rPr lang="en-US" dirty="0"/>
+                        <a:t>1</a:t>
+                      </a:r>
+                    </a:p>
+                  </a:txBody>
+                  <a:tcPr>
+                    <a:lnL>
+                      <a:noFill/>
+                    </a:lnL>
+                  </a:tcPr>
+                </a:tc>
+                <a:tc>
+                  <a:txBody>
+                    <a:bodyPr/>
+                    <a:lstStyle/>
+                    <a:p>
+                      <a:pPr algn="ctr"/>
+                      <a:endParaRPr lang="en-US"/>
+                    </a:p>
+                  </a:txBody>
+                  <a:tcPr/>
+                </a:tc>
+                <a:tc>
+                  <a:txBody>
+                    <a:bodyPr/>
+                    <a:lstStyle/>
+                    <a:p>
+                      <a:pPr algn="ctr"/>
+                      <a:endParaRPr lang="en-US"/>
+                    </a:p>
+                  </a:txBody>
+                  <a:tcPr/>
+                </a:tc>
+                <a:tc>
+                  <a:txBody>
+                    <a:bodyPr/>
+                    <a:lstStyle/>
+                    <a:p>
+                      <a:pPr algn="ctr"/>
+                      <a:endParaRPr lang="en-US"/>
+                    </a:p>
+                  </a:txBody>
+                  <a:tcPr/>
+                </a:tc>
+                <a:tc>
+                  <a:txBody>
+                    <a:bodyPr/>
+                    <a:lstStyle/>
+                    <a:p>
+                      <a:pPr algn="ctr"/>
+                      <a:endParaRPr lang="en-US"/>
+                    </a:p>
+                  </a:txBody>
+                  <a:tcPr/>
+                </a:tc>
+                <a:extLst>
+                  <a:ext uri="{0D108BD9-81ED-4DB2-BD59-A6C34878D82A}">
+                    <a16:rowId xmlns:a16="http://schemas.microsoft.com/office/drawing/2014/main" val="1695581901"/>
+                  </a:ext>
+                </a:extLst>
+              </a:tr>
+              <a:tr h="370840">
+                <a:tc>
+                  <a:txBody>
+                    <a:bodyPr/>
+                    <a:lstStyle/>
+                    <a:p>
+                      <a:pPr algn="ctr"/>
+                      <a:r>
+                        <a:rPr lang="en-US" b="1" dirty="0">
+                          <a:solidFill>
+                            <a:schemeClr val="bg1"/>
+                          </a:solidFill>
+                        </a:rPr>
+                        <a:t>Failures</a:t>
+                      </a:r>
+                    </a:p>
+                  </a:txBody>
+                  <a:tcPr>
+                    <a:lnL w="12700" cmpd="sng">
+                      <a:noFill/>
+                    </a:lnL>
+                    <a:lnR>
+                      <a:noFill/>
+                    </a:lnR>
+                    <a:lnT w="12700" cmpd="sng">
+                      <a:noFill/>
+                    </a:lnT>
+                    <a:lnB w="12700" cmpd="sng">
+                      <a:noFill/>
+                    </a:lnB>
+                    <a:lnTlToBr w="12700" cmpd="sng">
+                      <a:noFill/>
+                      <a:prstDash val="solid"/>
+                    </a:lnTlToBr>
+                    <a:lnBlToTr w="12700" cmpd="sng">
+                      <a:noFill/>
+                      <a:prstDash val="solid"/>
+                    </a:lnBlToTr>
+                    <a:solidFill>
+                      <a:schemeClr val="accent1"/>
+                    </a:solidFill>
+                  </a:tcPr>
+                </a:tc>
+                <a:tc>
+                  <a:txBody>
+                    <a:bodyPr/>
+                    <a:lstStyle/>
+                    <a:p>
+                      <a:pPr algn="ctr"/>
+                      <a:endParaRPr lang="en-US" dirty="0"/>
+                    </a:p>
+                  </a:txBody>
+                  <a:tcPr>
+                    <a:lnL>
+                      <a:noFill/>
+                    </a:lnL>
+                  </a:tcPr>
+                </a:tc>
+                <a:tc>
+                  <a:txBody>
+                    <a:bodyPr/>
+                    <a:lstStyle/>
+                    <a:p>
+                      <a:pPr algn="ctr"/>
+                      <a:r>
+                        <a:rPr lang="en-US" dirty="0"/>
+                        <a:t>1</a:t>
+                      </a:r>
+                    </a:p>
+                  </a:txBody>
+                  <a:tcPr/>
+                </a:tc>
+                <a:tc>
+                  <a:txBody>
+                    <a:bodyPr/>
+                    <a:lstStyle/>
+                    <a:p>
+                      <a:pPr algn="ctr"/>
+                      <a:endParaRPr lang="en-US" dirty="0"/>
+                    </a:p>
+                  </a:txBody>
+                  <a:tcPr/>
+                </a:tc>
+                <a:tc>
+                  <a:txBody>
+                    <a:bodyPr/>
+                    <a:lstStyle/>
+                    <a:p>
+                      <a:pPr algn="ctr"/>
+                      <a:endParaRPr lang="en-US"/>
+                    </a:p>
+                  </a:txBody>
+                  <a:tcPr/>
+                </a:tc>
+                <a:tc>
+                  <a:txBody>
+                    <a:bodyPr/>
+                    <a:lstStyle/>
+                    <a:p>
+                      <a:pPr algn="ctr"/>
+                      <a:endParaRPr lang="en-US" dirty="0"/>
+                    </a:p>
+                  </a:txBody>
+                  <a:tcPr/>
+                </a:tc>
+                <a:extLst>
+                  <a:ext uri="{0D108BD9-81ED-4DB2-BD59-A6C34878D82A}">
+                    <a16:rowId xmlns:a16="http://schemas.microsoft.com/office/drawing/2014/main" val="752802374"/>
+                  </a:ext>
+                </a:extLst>
+              </a:tr>
+              <a:tr h="370840">
+                <a:tc>
+                  <a:txBody>
+                    <a:bodyPr/>
+                    <a:lstStyle/>
+                    <a:p>
+                      <a:pPr algn="ctr"/>
+                      <a:r>
+                        <a:rPr lang="en-US" b="1" dirty="0">
+                          <a:solidFill>
+                            <a:schemeClr val="bg1"/>
+                          </a:solidFill>
+                        </a:rPr>
+                        <a:t>Betweenness</a:t>
+                      </a:r>
+                    </a:p>
+                  </a:txBody>
+                  <a:tcPr>
+                    <a:lnL w="12700" cmpd="sng">
+                      <a:noFill/>
+                    </a:lnL>
+                    <a:lnR>
+                      <a:noFill/>
+                    </a:lnR>
+                    <a:lnT w="12700" cmpd="sng">
+                      <a:noFill/>
+                    </a:lnT>
+                    <a:lnB w="12700" cmpd="sng">
+                      <a:noFill/>
+                    </a:lnB>
+                    <a:lnTlToBr w="12700" cmpd="sng">
+                      <a:noFill/>
+                      <a:prstDash val="solid"/>
+                    </a:lnTlToBr>
+                    <a:lnBlToTr w="12700" cmpd="sng">
+                      <a:noFill/>
+                      <a:prstDash val="solid"/>
+                    </a:lnBlToTr>
+                    <a:solidFill>
+                      <a:schemeClr val="accent1"/>
+                    </a:solidFill>
+                  </a:tcPr>
+                </a:tc>
+                <a:tc>
+                  <a:txBody>
+                    <a:bodyPr/>
+                    <a:lstStyle/>
+                    <a:p>
+                      <a:pPr algn="ctr"/>
+                      <a:endParaRPr lang="en-US"/>
+                    </a:p>
+                  </a:txBody>
+                  <a:tcPr>
+                    <a:lnL>
+                      <a:noFill/>
+                    </a:lnL>
+                  </a:tcPr>
+                </a:tc>
+                <a:tc>
+                  <a:txBody>
+                    <a:bodyPr/>
+                    <a:lstStyle/>
+                    <a:p>
+                      <a:pPr algn="ctr"/>
+                      <a:endParaRPr lang="en-US" dirty="0"/>
+                    </a:p>
+                  </a:txBody>
+                  <a:tcPr/>
+                </a:tc>
+                <a:tc>
+                  <a:txBody>
+                    <a:bodyPr/>
+                    <a:lstStyle/>
+                    <a:p>
+                      <a:pPr algn="ctr"/>
+                      <a:r>
+                        <a:rPr lang="en-US" dirty="0"/>
+                        <a:t>1</a:t>
+                      </a:r>
+                    </a:p>
+                  </a:txBody>
+                  <a:tcPr/>
+                </a:tc>
+                <a:tc>
+                  <a:txBody>
+                    <a:bodyPr/>
+                    <a:lstStyle/>
+                    <a:p>
+                      <a:pPr algn="ctr"/>
+                      <a:endParaRPr lang="en-US" dirty="0"/>
+                    </a:p>
+                  </a:txBody>
+                  <a:tcPr/>
+                </a:tc>
+                <a:tc>
+                  <a:txBody>
+                    <a:bodyPr/>
+                    <a:lstStyle/>
+                    <a:p>
+                      <a:pPr algn="ctr"/>
+                      <a:endParaRPr lang="en-US" dirty="0"/>
+                    </a:p>
+                  </a:txBody>
+                  <a:tcPr/>
+                </a:tc>
+                <a:extLst>
+                  <a:ext uri="{0D108BD9-81ED-4DB2-BD59-A6C34878D82A}">
+                    <a16:rowId xmlns:a16="http://schemas.microsoft.com/office/drawing/2014/main" val="2259620122"/>
+                  </a:ext>
+                </a:extLst>
+              </a:tr>
+              <a:tr h="370840">
+                <a:tc>
+                  <a:txBody>
+                    <a:bodyPr/>
+                    <a:lstStyle/>
+                    <a:p>
+                      <a:pPr algn="ctr"/>
+                      <a:r>
+                        <a:rPr lang="en-US" b="1" dirty="0">
+                          <a:solidFill>
+                            <a:schemeClr val="bg1"/>
+                          </a:solidFill>
+                        </a:rPr>
+                        <a:t>Closeness</a:t>
+                      </a:r>
+                    </a:p>
+                  </a:txBody>
+                  <a:tcPr>
+                    <a:lnL w="12700" cmpd="sng">
+                      <a:noFill/>
+                    </a:lnL>
+                    <a:lnR>
+                      <a:noFill/>
+                    </a:lnR>
+                    <a:lnT w="12700" cmpd="sng">
+                      <a:noFill/>
+                    </a:lnT>
+                    <a:lnB w="12700" cmpd="sng">
+                      <a:noFill/>
+                    </a:lnB>
+                    <a:lnTlToBr w="12700" cmpd="sng">
+                      <a:noFill/>
+                      <a:prstDash val="solid"/>
+                    </a:lnTlToBr>
+                    <a:lnBlToTr w="12700" cmpd="sng">
+                      <a:noFill/>
+                      <a:prstDash val="solid"/>
+                    </a:lnBlToTr>
+                    <a:solidFill>
+                      <a:schemeClr val="accent1"/>
+                    </a:solidFill>
+                  </a:tcPr>
+                </a:tc>
+                <a:tc>
+                  <a:txBody>
+                    <a:bodyPr/>
+                    <a:lstStyle/>
+                    <a:p>
+                      <a:pPr algn="ctr"/>
+                      <a:endParaRPr lang="en-US"/>
+                    </a:p>
+                  </a:txBody>
+                  <a:tcPr>
+                    <a:lnL>
+                      <a:noFill/>
+                    </a:lnL>
+                  </a:tcPr>
+                </a:tc>
+                <a:tc>
+                  <a:txBody>
+                    <a:bodyPr/>
+                    <a:lstStyle/>
+                    <a:p>
+                      <a:pPr algn="ctr"/>
+                      <a:endParaRPr lang="en-US"/>
+                    </a:p>
+                  </a:txBody>
+                  <a:tcPr/>
+                </a:tc>
+                <a:tc>
+                  <a:txBody>
+                    <a:bodyPr/>
+                    <a:lstStyle/>
+                    <a:p>
+                      <a:pPr algn="ctr"/>
+                      <a:endParaRPr lang="en-US" dirty="0"/>
+                    </a:p>
+                  </a:txBody>
+                  <a:tcPr/>
+                </a:tc>
+                <a:tc>
+                  <a:txBody>
+                    <a:bodyPr/>
+                    <a:lstStyle/>
+                    <a:p>
+                      <a:pPr algn="ctr"/>
+                      <a:r>
+                        <a:rPr lang="en-US" dirty="0"/>
+                        <a:t>1</a:t>
+                      </a:r>
+                    </a:p>
+                  </a:txBody>
+                  <a:tcPr/>
+                </a:tc>
+                <a:tc>
+                  <a:txBody>
+                    <a:bodyPr/>
+                    <a:lstStyle/>
+                    <a:p>
+                      <a:pPr algn="ctr"/>
+                      <a:endParaRPr lang="en-US" dirty="0"/>
+                    </a:p>
+                  </a:txBody>
+                  <a:tcPr/>
+                </a:tc>
+                <a:extLst>
+                  <a:ext uri="{0D108BD9-81ED-4DB2-BD59-A6C34878D82A}">
+                    <a16:rowId xmlns:a16="http://schemas.microsoft.com/office/drawing/2014/main" val="677023775"/>
+                  </a:ext>
+                </a:extLst>
+              </a:tr>
+              <a:tr h="370840">
+                <a:tc>
+                  <a:txBody>
+                    <a:bodyPr/>
+                    <a:lstStyle/>
+                    <a:p>
+                      <a:pPr algn="ctr"/>
+                      <a:r>
+                        <a:rPr lang="en-US" b="1" dirty="0">
+                          <a:solidFill>
+                            <a:schemeClr val="bg1"/>
+                          </a:solidFill>
+                        </a:rPr>
+                        <a:t>Degree</a:t>
+                      </a:r>
+                    </a:p>
+                  </a:txBody>
+                  <a:tcPr>
+                    <a:lnL w="12700" cmpd="sng">
+                      <a:noFill/>
+                    </a:lnL>
+                    <a:lnR>
+                      <a:noFill/>
+                    </a:lnR>
+                    <a:lnT w="12700" cmpd="sng">
+                      <a:noFill/>
+                    </a:lnT>
+                    <a:lnB w="12700" cmpd="sng">
+                      <a:noFill/>
+                    </a:lnB>
+                    <a:lnTlToBr w="12700" cmpd="sng">
+                      <a:noFill/>
+                      <a:prstDash val="solid"/>
+                    </a:lnTlToBr>
+                    <a:lnBlToTr w="12700" cmpd="sng">
+                      <a:noFill/>
+                      <a:prstDash val="solid"/>
+                    </a:lnBlToTr>
+                    <a:solidFill>
+                      <a:schemeClr val="accent1"/>
+                    </a:solidFill>
+                  </a:tcPr>
+                </a:tc>
+                <a:tc>
+                  <a:txBody>
+                    <a:bodyPr/>
+                    <a:lstStyle/>
+                    <a:p>
+                      <a:pPr algn="ctr"/>
+                      <a:endParaRPr lang="en-US"/>
+                    </a:p>
+                  </a:txBody>
+                  <a:tcPr>
+                    <a:lnL>
+                      <a:noFill/>
+                    </a:lnL>
+                  </a:tcPr>
+                </a:tc>
+                <a:tc>
+                  <a:txBody>
+                    <a:bodyPr/>
+                    <a:lstStyle/>
+                    <a:p>
+                      <a:pPr algn="ctr"/>
+                      <a:endParaRPr lang="en-US"/>
+                    </a:p>
+                  </a:txBody>
+                  <a:tcPr/>
+                </a:tc>
+                <a:tc>
+                  <a:txBody>
+                    <a:bodyPr/>
+                    <a:lstStyle/>
+                    <a:p>
+                      <a:pPr algn="ctr"/>
+                      <a:endParaRPr lang="en-US"/>
+                    </a:p>
+                  </a:txBody>
+                  <a:tcPr/>
+                </a:tc>
+                <a:tc>
+                  <a:txBody>
+                    <a:bodyPr/>
+                    <a:lstStyle/>
+                    <a:p>
+                      <a:pPr algn="ctr"/>
+                      <a:endParaRPr lang="en-US" dirty="0"/>
+                    </a:p>
+                  </a:txBody>
+                  <a:tcPr/>
+                </a:tc>
+                <a:tc>
+                  <a:txBody>
+                    <a:bodyPr/>
+                    <a:lstStyle/>
+                    <a:p>
+                      <a:pPr algn="ctr"/>
+                      <a:r>
+                        <a:rPr lang="en-US" dirty="0"/>
+                        <a:t>1</a:t>
+                      </a:r>
+                    </a:p>
+                  </a:txBody>
+                  <a:tcPr/>
+                </a:tc>
+                <a:extLst>
+                  <a:ext uri="{0D108BD9-81ED-4DB2-BD59-A6C34878D82A}">
+                    <a16:rowId xmlns:a16="http://schemas.microsoft.com/office/drawing/2014/main" val="1905588825"/>
+                  </a:ext>
+                </a:extLst>
+              </a:tr>
+            </a:tbl>
+          </a:graphicData>
+        </a:graphic>
+      </p:graphicFrame>
+      <p:sp>
+        <p:nvSpPr>
+          <p:cNvPr id="5" name="TextBox 4"/>
+          <p:cNvSpPr txBox="1"/>
+          <p:nvPr/>
+        </p:nvSpPr>
+        <p:spPr>
+          <a:xfrm>
+            <a:off x="5496232" y="5594555"/>
+            <a:ext cx="4694249" cy="369332"/>
+          </a:xfrm>
+          <a:prstGeom prst="rect">
+            <a:avLst/>
+          </a:prstGeom>
+          <a:noFill/>
+        </p:spPr>
+        <p:txBody>
+          <a:bodyPr wrap="square" rtlCol="0">
+            <a:spAutoFit/>
+          </a:bodyPr>
+          <a:lstStyle/>
+          <a:p>
+            <a:pPr algn="r"/>
+            <a:r>
+              <a:rPr lang="en-US" dirty="0"/>
+              <a:t>Values are significant at the 0.01 level (2-tailed).</a:t>
+            </a:r>
           </a:p>
         </p:txBody>
       </p:sp>
     </p:spTree>
     <p:extLst>
       <p:ext uri="{BB962C8B-B14F-4D97-AF65-F5344CB8AC3E}">
-        <p14:creationId xmlns:p14="http://schemas.microsoft.com/office/powerpoint/2010/main" val="3340033311"/>
+        <p14:creationId xmlns:p14="http://schemas.microsoft.com/office/powerpoint/2010/main" val="1866251307"/>
       </p:ext>
     </p:extLst>
   </p:cSld>
@@ -5849,7 +6718,7 @@
           <a:p>
             <a:r>
               <a:rPr lang="en-US" dirty="0"/>
-              <a:t>Conclusion</a:t>
+              <a:t>Logistical Regression Results</a:t>
             </a:r>
           </a:p>
         </p:txBody>
@@ -5869,7 +6738,488 @@
           <a:bodyPr/>
           <a:lstStyle/>
           <a:p>
-            <a:endParaRPr lang="en-US"/>
+            <a:r>
+              <a:rPr lang="en-US" dirty="0"/>
+              <a:t>Performed 100 times on the data.</a:t>
+            </a:r>
+          </a:p>
+          <a:p>
+            <a:r>
+              <a:rPr lang="en-US" dirty="0"/>
+              <a:t>Each time, 66% of the graph was placed in a training set and 44% was placed in a test set. </a:t>
+            </a:r>
+          </a:p>
+        </p:txBody>
+      </p:sp>
+      <p:graphicFrame>
+        <p:nvGraphicFramePr>
+          <p:cNvPr id="4" name="Table 3"/>
+          <p:cNvGraphicFramePr>
+            <a:graphicFrameLocks noGrp="1"/>
+          </p:cNvGraphicFramePr>
+          <p:nvPr>
+            <p:extLst>
+              <p:ext uri="{D42A27DB-BD31-4B8C-83A1-F6EECF244321}">
+                <p14:modId xmlns:p14="http://schemas.microsoft.com/office/powerpoint/2010/main" val="2212549281"/>
+              </p:ext>
+            </p:extLst>
+          </p:nvPr>
+        </p:nvGraphicFramePr>
+        <p:xfrm>
+          <a:off x="2062480" y="3857414"/>
+          <a:ext cx="8127999" cy="1483360"/>
+        </p:xfrm>
+        <a:graphic>
+          <a:graphicData uri="http://schemas.openxmlformats.org/drawingml/2006/table">
+            <a:tbl>
+              <a:tblPr firstRow="1" bandRow="1">
+                <a:tableStyleId>{5C22544A-7EE6-4342-B048-85BDC9FD1C3A}</a:tableStyleId>
+              </a:tblPr>
+              <a:tblGrid>
+                <a:gridCol w="2709333">
+                  <a:extLst>
+                    <a:ext uri="{9D8B030D-6E8A-4147-A177-3AD203B41FA5}">
+                      <a16:colId xmlns:a16="http://schemas.microsoft.com/office/drawing/2014/main" val="319367461"/>
+                    </a:ext>
+                  </a:extLst>
+                </a:gridCol>
+                <a:gridCol w="2709333">
+                  <a:extLst>
+                    <a:ext uri="{9D8B030D-6E8A-4147-A177-3AD203B41FA5}">
+                      <a16:colId xmlns:a16="http://schemas.microsoft.com/office/drawing/2014/main" val="1169438278"/>
+                    </a:ext>
+                  </a:extLst>
+                </a:gridCol>
+                <a:gridCol w="2709333">
+                  <a:extLst>
+                    <a:ext uri="{9D8B030D-6E8A-4147-A177-3AD203B41FA5}">
+                      <a16:colId xmlns:a16="http://schemas.microsoft.com/office/drawing/2014/main" val="863087891"/>
+                    </a:ext>
+                  </a:extLst>
+                </a:gridCol>
+              </a:tblGrid>
+              <a:tr h="370840">
+                <a:tc>
+                  <a:txBody>
+                    <a:bodyPr/>
+                    <a:lstStyle/>
+                    <a:p>
+                      <a:endParaRPr lang="en-US" dirty="0"/>
+                    </a:p>
+                  </a:txBody>
+                  <a:tcPr>
+                    <a:lnL w="12700" cmpd="sng">
+                      <a:noFill/>
+                    </a:lnL>
+                    <a:lnR w="12700" cmpd="sng">
+                      <a:noFill/>
+                    </a:lnR>
+                    <a:lnT w="12700" cmpd="sng">
+                      <a:noFill/>
+                    </a:lnT>
+                    <a:lnB w="38100" cmpd="sng">
+                      <a:noFill/>
+                    </a:lnB>
+                    <a:lnTlToBr w="12700" cmpd="sng">
+                      <a:noFill/>
+                      <a:prstDash val="solid"/>
+                    </a:lnTlToBr>
+                    <a:lnBlToTr w="12700" cmpd="sng">
+                      <a:noFill/>
+                      <a:prstDash val="solid"/>
+                    </a:lnBlToTr>
+                    <a:solidFill>
+                      <a:schemeClr val="bg1"/>
+                    </a:solidFill>
+                  </a:tcPr>
+                </a:tc>
+                <a:tc>
+                  <a:txBody>
+                    <a:bodyPr/>
+                    <a:lstStyle/>
+                    <a:p>
+                      <a:pPr algn="ctr"/>
+                      <a:r>
+                        <a:rPr lang="en-US" dirty="0"/>
+                        <a:t>Precision</a:t>
+                      </a:r>
+                    </a:p>
+                  </a:txBody>
+                  <a:tcPr>
+                    <a:lnL w="12700" cmpd="sng">
+                      <a:noFill/>
+                    </a:lnL>
+                  </a:tcPr>
+                </a:tc>
+                <a:tc>
+                  <a:txBody>
+                    <a:bodyPr/>
+                    <a:lstStyle/>
+                    <a:p>
+                      <a:pPr algn="ctr"/>
+                      <a:r>
+                        <a:rPr lang="en-US" dirty="0"/>
+                        <a:t>Recall</a:t>
+                      </a:r>
+                    </a:p>
+                  </a:txBody>
+                  <a:tcPr/>
+                </a:tc>
+                <a:extLst>
+                  <a:ext uri="{0D108BD9-81ED-4DB2-BD59-A6C34878D82A}">
+                    <a16:rowId xmlns:a16="http://schemas.microsoft.com/office/drawing/2014/main" val="647352893"/>
+                  </a:ext>
+                </a:extLst>
+              </a:tr>
+              <a:tr h="370840">
+                <a:tc>
+                  <a:txBody>
+                    <a:bodyPr/>
+                    <a:lstStyle/>
+                    <a:p>
+                      <a:pPr algn="r"/>
+                      <a:r>
+                        <a:rPr lang="en-US" b="1" dirty="0">
+                          <a:solidFill>
+                            <a:schemeClr val="bg1"/>
+                          </a:solidFill>
+                        </a:rPr>
+                        <a:t>Average</a:t>
+                      </a:r>
+                      <a:r>
+                        <a:rPr lang="en-US" b="1" baseline="0" dirty="0">
+                          <a:solidFill>
+                            <a:schemeClr val="bg1"/>
+                          </a:solidFill>
+                        </a:rPr>
+                        <a:t> (Mean)</a:t>
+                      </a:r>
+                      <a:endParaRPr lang="en-US" b="1" dirty="0">
+                        <a:solidFill>
+                          <a:schemeClr val="bg1"/>
+                        </a:solidFill>
+                      </a:endParaRPr>
+                    </a:p>
+                  </a:txBody>
+                  <a:tcPr>
+                    <a:lnT w="38100" cmpd="sng">
+                      <a:noFill/>
+                    </a:lnT>
+                    <a:solidFill>
+                      <a:schemeClr val="accent1"/>
+                    </a:solidFill>
+                  </a:tcPr>
+                </a:tc>
+                <a:tc>
+                  <a:txBody>
+                    <a:bodyPr/>
+                    <a:lstStyle/>
+                    <a:p>
+                      <a:endParaRPr lang="en-US" dirty="0"/>
+                    </a:p>
+                  </a:txBody>
+                  <a:tcPr/>
+                </a:tc>
+                <a:tc>
+                  <a:txBody>
+                    <a:bodyPr/>
+                    <a:lstStyle/>
+                    <a:p>
+                      <a:endParaRPr lang="en-US" dirty="0"/>
+                    </a:p>
+                  </a:txBody>
+                  <a:tcPr/>
+                </a:tc>
+                <a:extLst>
+                  <a:ext uri="{0D108BD9-81ED-4DB2-BD59-A6C34878D82A}">
+                    <a16:rowId xmlns:a16="http://schemas.microsoft.com/office/drawing/2014/main" val="2524732511"/>
+                  </a:ext>
+                </a:extLst>
+              </a:tr>
+              <a:tr h="370840">
+                <a:tc>
+                  <a:txBody>
+                    <a:bodyPr/>
+                    <a:lstStyle/>
+                    <a:p>
+                      <a:pPr algn="r"/>
+                      <a:r>
+                        <a:rPr lang="en-US" b="1" dirty="0">
+                          <a:solidFill>
+                            <a:schemeClr val="bg1"/>
+                          </a:solidFill>
+                        </a:rPr>
+                        <a:t>Median</a:t>
+                      </a:r>
+                    </a:p>
+                  </a:txBody>
+                  <a:tcPr>
+                    <a:solidFill>
+                      <a:schemeClr val="accent1"/>
+                    </a:solidFill>
+                  </a:tcPr>
+                </a:tc>
+                <a:tc>
+                  <a:txBody>
+                    <a:bodyPr/>
+                    <a:lstStyle/>
+                    <a:p>
+                      <a:endParaRPr lang="en-US" dirty="0"/>
+                    </a:p>
+                  </a:txBody>
+                  <a:tcPr/>
+                </a:tc>
+                <a:tc>
+                  <a:txBody>
+                    <a:bodyPr/>
+                    <a:lstStyle/>
+                    <a:p>
+                      <a:endParaRPr lang="en-US"/>
+                    </a:p>
+                  </a:txBody>
+                  <a:tcPr/>
+                </a:tc>
+                <a:extLst>
+                  <a:ext uri="{0D108BD9-81ED-4DB2-BD59-A6C34878D82A}">
+                    <a16:rowId xmlns:a16="http://schemas.microsoft.com/office/drawing/2014/main" val="2768752752"/>
+                  </a:ext>
+                </a:extLst>
+              </a:tr>
+              <a:tr h="370840">
+                <a:tc>
+                  <a:txBody>
+                    <a:bodyPr/>
+                    <a:lstStyle/>
+                    <a:p>
+                      <a:pPr algn="r"/>
+                      <a:r>
+                        <a:rPr lang="en-US" b="1" dirty="0">
+                          <a:solidFill>
+                            <a:schemeClr val="bg1"/>
+                          </a:solidFill>
+                        </a:rPr>
+                        <a:t>Standard Deviation</a:t>
+                      </a:r>
+                    </a:p>
+                  </a:txBody>
+                  <a:tcPr>
+                    <a:solidFill>
+                      <a:schemeClr val="accent1"/>
+                    </a:solidFill>
+                  </a:tcPr>
+                </a:tc>
+                <a:tc>
+                  <a:txBody>
+                    <a:bodyPr/>
+                    <a:lstStyle/>
+                    <a:p>
+                      <a:endParaRPr lang="en-US"/>
+                    </a:p>
+                  </a:txBody>
+                  <a:tcPr/>
+                </a:tc>
+                <a:tc>
+                  <a:txBody>
+                    <a:bodyPr/>
+                    <a:lstStyle/>
+                    <a:p>
+                      <a:endParaRPr lang="en-US" dirty="0"/>
+                    </a:p>
+                  </a:txBody>
+                  <a:tcPr/>
+                </a:tc>
+                <a:extLst>
+                  <a:ext uri="{0D108BD9-81ED-4DB2-BD59-A6C34878D82A}">
+                    <a16:rowId xmlns:a16="http://schemas.microsoft.com/office/drawing/2014/main" val="1933214928"/>
+                  </a:ext>
+                </a:extLst>
+              </a:tr>
+            </a:tbl>
+          </a:graphicData>
+        </a:graphic>
+      </p:graphicFrame>
+    </p:spTree>
+    <p:extLst>
+      <p:ext uri="{BB962C8B-B14F-4D97-AF65-F5344CB8AC3E}">
+        <p14:creationId xmlns:p14="http://schemas.microsoft.com/office/powerpoint/2010/main" val="3340033311"/>
+      </p:ext>
+    </p:extLst>
+  </p:cSld>
+  <p:clrMapOvr>
+    <a:masterClrMapping/>
+  </p:clrMapOvr>
+</p:sld>
+</file>
+
+<file path=ppt/slides/slide17.xml><?xml version="1.0" encoding="utf-8"?>
+<p:sld xmlns:a="http://schemas.openxmlformats.org/drawingml/2006/main" xmlns:r="http://schemas.openxmlformats.org/officeDocument/2006/relationships" xmlns:p="http://schemas.openxmlformats.org/presentationml/2006/main">
+  <p:cSld>
+    <p:spTree>
+      <p:nvGrpSpPr>
+        <p:cNvPr id="1" name=""/>
+        <p:cNvGrpSpPr/>
+        <p:nvPr/>
+      </p:nvGrpSpPr>
+      <p:grpSpPr>
+        <a:xfrm>
+          <a:off x="0" y="0"/>
+          <a:ext cx="0" cy="0"/>
+          <a:chOff x="0" y="0"/>
+          <a:chExt cx="0" cy="0"/>
+        </a:xfrm>
+      </p:grpSpPr>
+      <p:sp>
+        <p:nvSpPr>
+          <p:cNvPr id="2" name="Title 1"/>
+          <p:cNvSpPr>
+            <a:spLocks noGrp="1"/>
+          </p:cNvSpPr>
+          <p:nvPr>
+            <p:ph type="title"/>
+          </p:nvPr>
+        </p:nvSpPr>
+        <p:spPr/>
+        <p:txBody>
+          <a:bodyPr/>
+          <a:lstStyle/>
+          <a:p>
+            <a:r>
+              <a:rPr lang="en-US" dirty="0"/>
+              <a:t>Logistical Regression Results</a:t>
+            </a:r>
+          </a:p>
+        </p:txBody>
+      </p:sp>
+      <p:sp>
+        <p:nvSpPr>
+          <p:cNvPr id="3" name="Content Placeholder 2"/>
+          <p:cNvSpPr>
+            <a:spLocks noGrp="1"/>
+          </p:cNvSpPr>
+          <p:nvPr>
+            <p:ph idx="1"/>
+          </p:nvPr>
+        </p:nvSpPr>
+        <p:spPr/>
+        <p:txBody>
+          <a:bodyPr/>
+          <a:lstStyle/>
+          <a:p>
+            <a:endParaRPr lang="en-US" dirty="0"/>
+          </a:p>
+        </p:txBody>
+      </p:sp>
+    </p:spTree>
+    <p:extLst>
+      <p:ext uri="{BB962C8B-B14F-4D97-AF65-F5344CB8AC3E}">
+        <p14:creationId xmlns:p14="http://schemas.microsoft.com/office/powerpoint/2010/main" val="2319084904"/>
+      </p:ext>
+    </p:extLst>
+  </p:cSld>
+  <p:clrMapOvr>
+    <a:masterClrMapping/>
+  </p:clrMapOvr>
+</p:sld>
+</file>
+
+<file path=ppt/slides/slide18.xml><?xml version="1.0" encoding="utf-8"?>
+<p:sld xmlns:a="http://schemas.openxmlformats.org/drawingml/2006/main" xmlns:r="http://schemas.openxmlformats.org/officeDocument/2006/relationships" xmlns:p="http://schemas.openxmlformats.org/presentationml/2006/main">
+  <p:cSld>
+    <p:spTree>
+      <p:nvGrpSpPr>
+        <p:cNvPr id="1" name=""/>
+        <p:cNvGrpSpPr/>
+        <p:nvPr/>
+      </p:nvGrpSpPr>
+      <p:grpSpPr>
+        <a:xfrm>
+          <a:off x="0" y="0"/>
+          <a:ext cx="0" cy="0"/>
+          <a:chOff x="0" y="0"/>
+          <a:chExt cx="0" cy="0"/>
+        </a:xfrm>
+      </p:grpSpPr>
+      <p:sp>
+        <p:nvSpPr>
+          <p:cNvPr id="2" name="Title 1"/>
+          <p:cNvSpPr>
+            <a:spLocks noGrp="1"/>
+          </p:cNvSpPr>
+          <p:nvPr>
+            <p:ph type="title"/>
+          </p:nvPr>
+        </p:nvSpPr>
+        <p:spPr/>
+        <p:txBody>
+          <a:bodyPr/>
+          <a:lstStyle/>
+          <a:p>
+            <a:r>
+              <a:rPr lang="en-US" dirty="0"/>
+              <a:t>Conclusion</a:t>
+            </a:r>
+          </a:p>
+        </p:txBody>
+      </p:sp>
+      <p:sp>
+        <p:nvSpPr>
+          <p:cNvPr id="3" name="Content Placeholder 2"/>
+          <p:cNvSpPr>
+            <a:spLocks noGrp="1"/>
+          </p:cNvSpPr>
+          <p:nvPr>
+            <p:ph idx="1"/>
+          </p:nvPr>
+        </p:nvSpPr>
+        <p:spPr/>
+        <p:txBody>
+          <a:bodyPr/>
+          <a:lstStyle/>
+          <a:p>
+            <a:r>
+              <a:rPr lang="en-US" dirty="0"/>
+              <a:t>We show that </a:t>
+            </a:r>
+            <a:r>
+              <a:rPr lang="en-US"/>
+              <a:t>GitHub projects can</a:t>
+            </a:r>
+            <a:endParaRPr lang="en-US" dirty="0"/>
+          </a:p>
+          <a:p>
+            <a:r>
+              <a:rPr lang="en-US" dirty="0"/>
+              <a:t>Lots of future work!</a:t>
+            </a:r>
+          </a:p>
+          <a:p>
+            <a:pPr lvl="1"/>
+            <a:r>
+              <a:rPr lang="en-US" dirty="0"/>
+              <a:t>Use linear regression to predict </a:t>
+            </a:r>
+            <a:r>
+              <a:rPr lang="en-US" b="1" dirty="0"/>
+              <a:t>number</a:t>
+            </a:r>
+            <a:r>
+              <a:rPr lang="en-US" dirty="0"/>
+              <a:t> of bugs.</a:t>
+            </a:r>
+          </a:p>
+          <a:p>
+            <a:pPr lvl="1"/>
+            <a:r>
+              <a:rPr lang="en-US" dirty="0"/>
+              <a:t>Tool improvements.</a:t>
+            </a:r>
+          </a:p>
+          <a:p>
+            <a:pPr lvl="1"/>
+            <a:r>
+              <a:rPr lang="en-US" dirty="0"/>
+              <a:t>Change data source to speed up data mining.</a:t>
+            </a:r>
           </a:p>
         </p:txBody>
       </p:sp>
@@ -5886,7 +7236,7 @@
 </p:sld>
 </file>
 
-<file path=ppt/slides/slide17.xml><?xml version="1.0" encoding="utf-8"?>
+<file path=ppt/slides/slide19.xml><?xml version="1.0" encoding="utf-8"?>
 <p:sld xmlns:a="http://schemas.openxmlformats.org/drawingml/2006/main" xmlns:r="http://schemas.openxmlformats.org/officeDocument/2006/relationships" xmlns:p="http://schemas.openxmlformats.org/presentationml/2006/main">
   <p:cSld>
     <p:spTree>
@@ -6678,6 +8028,102 @@
           <a:p>
             <a:r>
               <a:rPr lang="en-US" dirty="0"/>
+              <a:t>Research Questions</a:t>
+            </a:r>
+          </a:p>
+        </p:txBody>
+      </p:sp>
+      <p:sp>
+        <p:nvSpPr>
+          <p:cNvPr id="3" name="Content Placeholder 2"/>
+          <p:cNvSpPr>
+            <a:spLocks noGrp="1"/>
+          </p:cNvSpPr>
+          <p:nvPr>
+            <p:ph idx="1"/>
+          </p:nvPr>
+        </p:nvSpPr>
+        <p:spPr>
+          <a:xfrm>
+            <a:off x="1097280" y="3854244"/>
+            <a:ext cx="10058400" cy="2014849"/>
+          </a:xfrm>
+        </p:spPr>
+        <p:txBody>
+          <a:bodyPr>
+            <a:normAutofit lnSpcReduction="10000"/>
+          </a:bodyPr>
+          <a:lstStyle/>
+          <a:p>
+            <a:r>
+              <a:rPr lang="en-US" b="1" dirty="0"/>
+              <a:t>RQ1: </a:t>
+            </a:r>
+            <a:r>
+              <a:rPr lang="en-US" i="1" dirty="0"/>
+              <a:t>Is the centrality of a file related to the number of commits and bug fixes in a file?</a:t>
+            </a:r>
+          </a:p>
+          <a:p>
+            <a:r>
+              <a:rPr lang="en-US" b="1" dirty="0"/>
+              <a:t>RQ2: </a:t>
+            </a:r>
+            <a:r>
+              <a:rPr lang="en-US" i="1" dirty="0"/>
+              <a:t>Can centrality be used as a valid predictor for defects?</a:t>
+            </a:r>
+            <a:endParaRPr lang="en-US" b="1" dirty="0"/>
+          </a:p>
+        </p:txBody>
+      </p:sp>
+    </p:spTree>
+    <p:extLst>
+      <p:ext uri="{BB962C8B-B14F-4D97-AF65-F5344CB8AC3E}">
+        <p14:creationId xmlns:p14="http://schemas.microsoft.com/office/powerpoint/2010/main" val="149220707"/>
+      </p:ext>
+    </p:extLst>
+  </p:cSld>
+  <p:clrMapOvr>
+    <a:masterClrMapping/>
+  </p:clrMapOvr>
+</p:sld>
+</file>
+
+<file path=ppt/slides/slide8.xml><?xml version="1.0" encoding="utf-8"?>
+<p:sld xmlns:a="http://schemas.openxmlformats.org/drawingml/2006/main" xmlns:r="http://schemas.openxmlformats.org/officeDocument/2006/relationships" xmlns:p="http://schemas.openxmlformats.org/presentationml/2006/main">
+  <p:cSld>
+    <p:spTree>
+      <p:nvGrpSpPr>
+        <p:cNvPr id="1" name=""/>
+        <p:cNvGrpSpPr/>
+        <p:nvPr/>
+      </p:nvGrpSpPr>
+      <p:grpSpPr>
+        <a:xfrm>
+          <a:off x="0" y="0"/>
+          <a:ext cx="0" cy="0"/>
+          <a:chOff x="0" y="0"/>
+          <a:chExt cx="0" cy="0"/>
+        </a:xfrm>
+      </p:grpSpPr>
+      <p:sp>
+        <p:nvSpPr>
+          <p:cNvPr id="2" name="Title 1"/>
+          <p:cNvSpPr>
+            <a:spLocks noGrp="1"/>
+          </p:cNvSpPr>
+          <p:nvPr>
+            <p:ph type="title"/>
+          </p:nvPr>
+        </p:nvSpPr>
+        <p:spPr/>
+        <p:txBody>
+          <a:bodyPr/>
+          <a:lstStyle/>
+          <a:p>
+            <a:r>
+              <a:rPr lang="en-US" dirty="0"/>
               <a:t>The Boa Project</a:t>
             </a:r>
           </a:p>
@@ -6768,7 +8214,7 @@
 </p:sld>
 </file>
 
-<file path=ppt/slides/slide8.xml><?xml version="1.0" encoding="utf-8"?>
+<file path=ppt/slides/slide9.xml><?xml version="1.0" encoding="utf-8"?>
 <p:sld xmlns:a="http://schemas.openxmlformats.org/drawingml/2006/main" xmlns:r="http://schemas.openxmlformats.org/officeDocument/2006/relationships" xmlns:p="http://schemas.openxmlformats.org/presentationml/2006/main">
   <p:cSld>
     <p:spTree>
@@ -6840,149 +8286,6 @@
     <p:extLst>
       <p:ext uri="{BB962C8B-B14F-4D97-AF65-F5344CB8AC3E}">
         <p14:creationId xmlns:p14="http://schemas.microsoft.com/office/powerpoint/2010/main" val="875459587"/>
-      </p:ext>
-    </p:extLst>
-  </p:cSld>
-  <p:clrMapOvr>
-    <a:masterClrMapping/>
-  </p:clrMapOvr>
-</p:sld>
-</file>
-
-<file path=ppt/slides/slide9.xml><?xml version="1.0" encoding="utf-8"?>
-<p:sld xmlns:a="http://schemas.openxmlformats.org/drawingml/2006/main" xmlns:r="http://schemas.openxmlformats.org/officeDocument/2006/relationships" xmlns:p="http://schemas.openxmlformats.org/presentationml/2006/main">
-  <p:cSld>
-    <p:spTree>
-      <p:nvGrpSpPr>
-        <p:cNvPr id="1" name=""/>
-        <p:cNvGrpSpPr/>
-        <p:nvPr/>
-      </p:nvGrpSpPr>
-      <p:grpSpPr>
-        <a:xfrm>
-          <a:off x="0" y="0"/>
-          <a:ext cx="0" cy="0"/>
-          <a:chOff x="0" y="0"/>
-          <a:chExt cx="0" cy="0"/>
-        </a:xfrm>
-      </p:grpSpPr>
-      <p:sp>
-        <p:nvSpPr>
-          <p:cNvPr id="2" name="Title 1"/>
-          <p:cNvSpPr>
-            <a:spLocks noGrp="1"/>
-          </p:cNvSpPr>
-          <p:nvPr>
-            <p:ph type="title"/>
-          </p:nvPr>
-        </p:nvSpPr>
-        <p:spPr/>
-        <p:txBody>
-          <a:bodyPr/>
-          <a:lstStyle/>
-          <a:p>
-            <a:r>
-              <a:rPr lang="en-US" dirty="0"/>
-              <a:t>Methodology</a:t>
-            </a:r>
-          </a:p>
-        </p:txBody>
-      </p:sp>
-      <p:sp>
-        <p:nvSpPr>
-          <p:cNvPr id="3" name="Content Placeholder 2"/>
-          <p:cNvSpPr>
-            <a:spLocks noGrp="1"/>
-          </p:cNvSpPr>
-          <p:nvPr>
-            <p:ph idx="1"/>
-          </p:nvPr>
-        </p:nvSpPr>
-        <p:spPr/>
-        <p:txBody>
-          <a:bodyPr/>
-          <a:lstStyle/>
-          <a:p>
-            <a:pPr marL="573087" indent="-514350">
-              <a:buFont typeface="+mj-lt"/>
-              <a:buAutoNum type="arabicPeriod"/>
-            </a:pPr>
-            <a:r>
-              <a:rPr lang="en-US" dirty="0"/>
-              <a:t>Determine adequate projects stored in Boa.</a:t>
-            </a:r>
-          </a:p>
-          <a:p>
-            <a:pPr marL="573087" indent="-514350">
-              <a:buFont typeface="+mj-lt"/>
-              <a:buAutoNum type="arabicPeriod"/>
-            </a:pPr>
-            <a:r>
-              <a:rPr lang="en-US" dirty="0"/>
-              <a:t>Pull associated file, user, and commit information for a desired project.</a:t>
-            </a:r>
-          </a:p>
-          <a:p>
-            <a:pPr marL="573087" indent="-514350">
-              <a:buFont typeface="+mj-lt"/>
-              <a:buAutoNum type="arabicPeriod"/>
-            </a:pPr>
-            <a:r>
-              <a:rPr lang="en-US" dirty="0"/>
-              <a:t>Build contribution network from the project data.</a:t>
-            </a:r>
-          </a:p>
-          <a:p>
-            <a:pPr marL="573087" indent="-514350">
-              <a:buFont typeface="+mj-lt"/>
-              <a:buAutoNum type="arabicPeriod"/>
-            </a:pPr>
-            <a:r>
-              <a:rPr lang="en-US" dirty="0"/>
-              <a:t>Compute </a:t>
-            </a:r>
-            <a:r>
-              <a:rPr lang="en-US" dirty="0" err="1"/>
-              <a:t>betweenness</a:t>
-            </a:r>
-            <a:r>
-              <a:rPr lang="en-US" dirty="0"/>
-              <a:t>, closeness, and degree centrality.</a:t>
-            </a:r>
-          </a:p>
-          <a:p>
-            <a:pPr marL="573087" indent="-514350">
-              <a:buFont typeface="+mj-lt"/>
-              <a:buAutoNum type="arabicPeriod"/>
-            </a:pPr>
-            <a:r>
-              <a:rPr lang="en-US" dirty="0"/>
-              <a:t>Run logical regression on the social network and determine </a:t>
-            </a:r>
-            <a:r>
-              <a:rPr lang="en-US" b="1" dirty="0"/>
-              <a:t>precision</a:t>
-            </a:r>
-            <a:r>
-              <a:rPr lang="en-US" dirty="0"/>
-              <a:t> and </a:t>
-            </a:r>
-            <a:r>
-              <a:rPr lang="en-US" b="1" dirty="0"/>
-              <a:t>recall</a:t>
-            </a:r>
-            <a:r>
-              <a:rPr lang="en-US" dirty="0"/>
-              <a:t>.</a:t>
-            </a:r>
-            <a:endParaRPr lang="en-US" b="1" dirty="0"/>
-          </a:p>
-        </p:txBody>
-      </p:sp>
-    </p:spTree>
-    <p:extLst>
-      <p:ext uri="{BB962C8B-B14F-4D97-AF65-F5344CB8AC3E}">
-        <p14:creationId xmlns:p14="http://schemas.microsoft.com/office/powerpoint/2010/main" val="486631603"/>
       </p:ext>
     </p:extLst>
   </p:cSld>

</xml_diff>

<commit_message>
Added results directory w/ results and chnages
</commit_message>
<xml_diff>
--- a/Final-Presentation/Presentation.pptx
+++ b/Final-Presentation/Presentation.pptx
@@ -136,11 +136,11 @@
             <p14:sldId id="266"/>
             <p14:sldId id="264"/>
             <p14:sldId id="267"/>
+            <p14:sldId id="262"/>
           </p14:sldIdLst>
         </p14:section>
         <p14:section name="Methodology" id="{04ADD487-94DA-47EC-AF72-3116CF1CA6D9}">
           <p14:sldIdLst>
-            <p14:sldId id="262"/>
             <p14:sldId id="276"/>
             <p14:sldId id="257"/>
             <p14:sldId id="259"/>
@@ -397,7 +397,7 @@
           <a:p>
             <a:fld id="{CA586F88-EEB5-4979-9532-C99075E35C56}" type="datetimeFigureOut">
               <a:rPr lang="en-US" smtClean="0"/>
-              <a:t>3/25/2016</a:t>
+              <a:t>3/27/2016</a:t>
             </a:fld>
             <a:endParaRPr lang="en-US"/>
           </a:p>
@@ -571,7 +571,7 @@
           <a:p>
             <a:fld id="{CA586F88-EEB5-4979-9532-C99075E35C56}" type="datetimeFigureOut">
               <a:rPr lang="en-US" smtClean="0"/>
-              <a:t>3/25/2016</a:t>
+              <a:t>3/27/2016</a:t>
             </a:fld>
             <a:endParaRPr lang="en-US"/>
           </a:p>
@@ -827,7 +827,7 @@
           <a:p>
             <a:fld id="{CA586F88-EEB5-4979-9532-C99075E35C56}" type="datetimeFigureOut">
               <a:rPr lang="en-US" smtClean="0"/>
-              <a:t>3/25/2016</a:t>
+              <a:t>3/27/2016</a:t>
             </a:fld>
             <a:endParaRPr lang="en-US"/>
           </a:p>
@@ -1004,7 +1004,7 @@
           <a:p>
             <a:fld id="{CA586F88-EEB5-4979-9532-C99075E35C56}" type="datetimeFigureOut">
               <a:rPr lang="en-US" smtClean="0"/>
-              <a:t>3/25/2016</a:t>
+              <a:t>3/27/2016</a:t>
             </a:fld>
             <a:endParaRPr lang="en-US"/>
           </a:p>
@@ -1347,7 +1347,7 @@
           <a:p>
             <a:fld id="{CA586F88-EEB5-4979-9532-C99075E35C56}" type="datetimeFigureOut">
               <a:rPr lang="en-US" smtClean="0"/>
-              <a:t>3/25/2016</a:t>
+              <a:t>3/27/2016</a:t>
             </a:fld>
             <a:endParaRPr lang="en-US"/>
           </a:p>
@@ -1622,7 +1622,7 @@
           <a:p>
             <a:fld id="{CA586F88-EEB5-4979-9532-C99075E35C56}" type="datetimeFigureOut">
               <a:rPr lang="en-US" smtClean="0"/>
-              <a:t>3/25/2016</a:t>
+              <a:t>3/27/2016</a:t>
             </a:fld>
             <a:endParaRPr lang="en-US"/>
           </a:p>
@@ -2001,7 +2001,7 @@
           <a:p>
             <a:fld id="{CA586F88-EEB5-4979-9532-C99075E35C56}" type="datetimeFigureOut">
               <a:rPr lang="en-US" smtClean="0"/>
-              <a:t>3/25/2016</a:t>
+              <a:t>3/27/2016</a:t>
             </a:fld>
             <a:endParaRPr lang="en-US"/>
           </a:p>
@@ -2119,7 +2119,7 @@
           <a:p>
             <a:fld id="{CA586F88-EEB5-4979-9532-C99075E35C56}" type="datetimeFigureOut">
               <a:rPr lang="en-US" smtClean="0"/>
-              <a:t>3/25/2016</a:t>
+              <a:t>3/27/2016</a:t>
             </a:fld>
             <a:endParaRPr lang="en-US"/>
           </a:p>
@@ -2290,7 +2290,7 @@
           <a:p>
             <a:fld id="{CA586F88-EEB5-4979-9532-C99075E35C56}" type="datetimeFigureOut">
               <a:rPr lang="en-US" smtClean="0"/>
-              <a:t>3/25/2016</a:t>
+              <a:t>3/27/2016</a:t>
             </a:fld>
             <a:endParaRPr lang="en-US"/>
           </a:p>
@@ -2644,7 +2644,7 @@
           <a:p>
             <a:fld id="{CA586F88-EEB5-4979-9532-C99075E35C56}" type="datetimeFigureOut">
               <a:rPr lang="en-US" smtClean="0"/>
-              <a:t>3/25/2016</a:t>
+              <a:t>3/27/2016</a:t>
             </a:fld>
             <a:endParaRPr lang="en-US"/>
           </a:p>
@@ -3026,7 +3026,7 @@
           <a:p>
             <a:fld id="{CA586F88-EEB5-4979-9532-C99075E35C56}" type="datetimeFigureOut">
               <a:rPr lang="en-US" smtClean="0"/>
-              <a:t>3/25/2016</a:t>
+              <a:t>3/27/2016</a:t>
             </a:fld>
             <a:endParaRPr lang="en-US"/>
           </a:p>
@@ -3312,7 +3312,7 @@
           <a:p>
             <a:fld id="{CA586F88-EEB5-4979-9532-C99075E35C56}" type="datetimeFigureOut">
               <a:rPr lang="en-US" smtClean="0"/>
-              <a:t>3/25/2016</a:t>
+              <a:t>3/27/2016</a:t>
             </a:fld>
             <a:endParaRPr lang="en-US"/>
           </a:p>
@@ -5398,8 +5398,13 @@
           <a:p>
             <a:r>
               <a:rPr lang="en-US" dirty="0"/>
-              <a:t>We performed our methodology on 15 different GitHub projects.</a:t>
-            </a:r>
+              <a:t>We performed our methodology on 15 different </a:t>
+            </a:r>
+            <a:r>
+              <a:rPr lang="en-US"/>
+              <a:t>GitHub projects.</a:t>
+            </a:r>
+            <a:endParaRPr lang="en-US" dirty="0"/>
           </a:p>
           <a:p>
             <a:pPr marL="58737" indent="0">
@@ -5433,7 +5438,7 @@
           <p:nvPr>
             <p:extLst>
               <p:ext uri="{D42A27DB-BD31-4B8C-83A1-F6EECF244321}">
-                <p14:modId xmlns:p14="http://schemas.microsoft.com/office/powerpoint/2010/main" val="1872906644"/>
+                <p14:modId xmlns:p14="http://schemas.microsoft.com/office/powerpoint/2010/main" val="104669928"/>
               </p:ext>
             </p:extLst>
           </p:nvPr>
@@ -5534,7 +5539,7 @@
                       <a:pPr algn="ctr"/>
                       <a:r>
                         <a:rPr lang="en-US" dirty="0"/>
-                        <a:t>614</a:t>
+                        <a:t>353</a:t>
                       </a:r>
                     </a:p>
                   </a:txBody>
@@ -5548,7 +5553,7 @@
                       <a:pPr algn="ctr"/>
                       <a:r>
                         <a:rPr lang="en-US" dirty="0"/>
-                        <a:t>255</a:t>
+                        <a:t>102</a:t>
                       </a:r>
                     </a:p>
                   </a:txBody>
@@ -8045,8 +8050,8 @@
         </p:nvSpPr>
         <p:spPr>
           <a:xfrm>
-            <a:off x="1097280" y="3854244"/>
-            <a:ext cx="10058400" cy="2014849"/>
+            <a:off x="1097280" y="2625212"/>
+            <a:ext cx="10058400" cy="2526892"/>
           </a:xfrm>
         </p:spPr>
         <p:txBody>
@@ -8063,6 +8068,12 @@
               <a:rPr lang="en-US" i="1" dirty="0"/>
               <a:t>Is the centrality of a file related to the number of commits and bug fixes in a file?</a:t>
             </a:r>
+          </a:p>
+          <a:p>
+            <a:pPr marL="58737" indent="0">
+              <a:buNone/>
+            </a:pPr>
+            <a:endParaRPr lang="en-US" i="1" dirty="0"/>
           </a:p>
           <a:p>
             <a:r>

</xml_diff>